<commit_message>
Blade counter layout updated, WTG input parameters card layout updated,
Existing issue:
to revise overall structure
to add simulation controls tab
to add warnings
to add logos
to add System stats
</commit_message>
<xml_diff>
--- a/New Microsoft PowerPoint Presentation.pptx
+++ b/New Microsoft PowerPoint Presentation.pptx
@@ -10,6 +10,9 @@
     <p:sldId id="257" r:id="rId4"/>
     <p:sldId id="258" r:id="rId5"/>
     <p:sldId id="259" r:id="rId6"/>
+    <p:sldId id="263" r:id="rId7"/>
+    <p:sldId id="261" r:id="rId8"/>
+    <p:sldId id="262" r:id="rId9"/>
   </p:sldIdLst>
   <p:sldSz cx="12192000" cy="6858000"/>
   <p:notesSz cx="6858000" cy="9144000"/>
@@ -4415,8 +4418,8 @@
         </p:nvSpPr>
         <p:spPr>
           <a:xfrm>
-            <a:off x="7086599" y="1658571"/>
-            <a:ext cx="1546121" cy="3876990"/>
+            <a:off x="7086600" y="1668979"/>
+            <a:ext cx="1568547" cy="3520041"/>
           </a:xfrm>
           <a:prstGeom prst="roundRect">
             <a:avLst/>
@@ -4548,8 +4551,8 @@
         </p:nvSpPr>
         <p:spPr>
           <a:xfrm>
-            <a:off x="7086599" y="1121797"/>
-            <a:ext cx="1546121" cy="3479215"/>
+            <a:off x="7086600" y="1121797"/>
+            <a:ext cx="1568547" cy="3479215"/>
           </a:xfrm>
           <a:prstGeom prst="roundRect">
             <a:avLst>
@@ -4580,327 +4583,6 @@
           </a:p>
         </p:txBody>
       </p:sp>
-      <p:grpSp>
-        <p:nvGrpSpPr>
-          <p:cNvPr id="47" name="Group 46">
-            <a:extLst>
-              <a:ext uri="{FF2B5EF4-FFF2-40B4-BE49-F238E27FC236}">
-                <a16:creationId xmlns:a16="http://schemas.microsoft.com/office/drawing/2014/main" id="{665E739C-C269-8125-8413-873AD23BBDA1}"/>
-              </a:ext>
-            </a:extLst>
-          </p:cNvPr>
-          <p:cNvGrpSpPr/>
-          <p:nvPr/>
-        </p:nvGrpSpPr>
-        <p:grpSpPr>
-          <a:xfrm>
-            <a:off x="7303929" y="2140673"/>
-            <a:ext cx="572730" cy="462117"/>
-            <a:chOff x="7303929" y="2187088"/>
-            <a:chExt cx="572730" cy="462117"/>
-          </a:xfrm>
-        </p:grpSpPr>
-        <p:sp>
-          <p:nvSpPr>
-            <p:cNvPr id="8" name="Oval 7">
-              <a:extLst>
-                <a:ext uri="{FF2B5EF4-FFF2-40B4-BE49-F238E27FC236}">
-                  <a16:creationId xmlns:a16="http://schemas.microsoft.com/office/drawing/2014/main" id="{435F31FA-7B00-0AAA-226B-13FDF8BA6202}"/>
-                </a:ext>
-              </a:extLst>
-            </p:cNvPr>
-            <p:cNvSpPr/>
-            <p:nvPr/>
-          </p:nvSpPr>
-          <p:spPr>
-            <a:xfrm>
-              <a:off x="7310281" y="2187088"/>
-              <a:ext cx="462117" cy="462117"/>
-            </a:xfrm>
-            <a:prstGeom prst="ellipse">
-              <a:avLst/>
-            </a:prstGeom>
-            <a:solidFill>
-              <a:srgbClr val="C00000"/>
-            </a:solidFill>
-          </p:spPr>
-          <p:style>
-            <a:lnRef idx="2">
-              <a:schemeClr val="accent1">
-                <a:shade val="15000"/>
-              </a:schemeClr>
-            </a:lnRef>
-            <a:fillRef idx="1">
-              <a:schemeClr val="accent1"/>
-            </a:fillRef>
-            <a:effectRef idx="0">
-              <a:schemeClr val="accent1"/>
-            </a:effectRef>
-            <a:fontRef idx="minor">
-              <a:schemeClr val="lt1"/>
-            </a:fontRef>
-          </p:style>
-          <p:txBody>
-            <a:bodyPr rtlCol="0" anchor="ctr"/>
-            <a:lstStyle/>
-            <a:p>
-              <a:pPr algn="ctr"/>
-              <a:endParaRPr lang="en-GB"/>
-            </a:p>
-          </p:txBody>
-        </p:sp>
-        <p:sp>
-          <p:nvSpPr>
-            <p:cNvPr id="11" name="TextBox 10">
-              <a:extLst>
-                <a:ext uri="{FF2B5EF4-FFF2-40B4-BE49-F238E27FC236}">
-                  <a16:creationId xmlns:a16="http://schemas.microsoft.com/office/drawing/2014/main" id="{2B077EC9-A156-8CED-639D-5F23AAAFC99C}"/>
-                </a:ext>
-              </a:extLst>
-            </p:cNvPr>
-            <p:cNvSpPr txBox="1"/>
-            <p:nvPr/>
-          </p:nvSpPr>
-          <p:spPr>
-            <a:xfrm>
-              <a:off x="7303929" y="2216629"/>
-              <a:ext cx="572730" cy="400110"/>
-            </a:xfrm>
-            <a:prstGeom prst="rect">
-              <a:avLst/>
-            </a:prstGeom>
-            <a:noFill/>
-          </p:spPr>
-          <p:txBody>
-            <a:bodyPr wrap="square" rtlCol="0">
-              <a:spAutoFit/>
-            </a:bodyPr>
-            <a:lstStyle/>
-            <a:p>
-              <a:r>
-                <a:rPr lang="en-GB" sz="2000" b="1" dirty="0"/>
-                <a:t>B1</a:t>
-              </a:r>
-            </a:p>
-          </p:txBody>
-        </p:sp>
-      </p:grpSp>
-      <p:grpSp>
-        <p:nvGrpSpPr>
-          <p:cNvPr id="48" name="Group 47">
-            <a:extLst>
-              <a:ext uri="{FF2B5EF4-FFF2-40B4-BE49-F238E27FC236}">
-                <a16:creationId xmlns:a16="http://schemas.microsoft.com/office/drawing/2014/main" id="{4A92425D-F94F-5950-E519-05666A369267}"/>
-              </a:ext>
-            </a:extLst>
-          </p:cNvPr>
-          <p:cNvGrpSpPr/>
-          <p:nvPr/>
-        </p:nvGrpSpPr>
-        <p:grpSpPr>
-          <a:xfrm>
-            <a:off x="7303929" y="2941299"/>
-            <a:ext cx="572730" cy="462117"/>
-            <a:chOff x="7303929" y="2987714"/>
-            <a:chExt cx="572730" cy="462117"/>
-          </a:xfrm>
-        </p:grpSpPr>
-        <p:sp>
-          <p:nvSpPr>
-            <p:cNvPr id="9" name="Oval 8">
-              <a:extLst>
-                <a:ext uri="{FF2B5EF4-FFF2-40B4-BE49-F238E27FC236}">
-                  <a16:creationId xmlns:a16="http://schemas.microsoft.com/office/drawing/2014/main" id="{785DAECF-9612-34D7-0348-C4BCAD5A189B}"/>
-                </a:ext>
-              </a:extLst>
-            </p:cNvPr>
-            <p:cNvSpPr/>
-            <p:nvPr/>
-          </p:nvSpPr>
-          <p:spPr>
-            <a:xfrm>
-              <a:off x="7310281" y="2987714"/>
-              <a:ext cx="462117" cy="462117"/>
-            </a:xfrm>
-            <a:prstGeom prst="ellipse">
-              <a:avLst/>
-            </a:prstGeom>
-            <a:solidFill>
-              <a:schemeClr val="accent6">
-                <a:lumMod val="40000"/>
-                <a:lumOff val="60000"/>
-              </a:schemeClr>
-            </a:solidFill>
-          </p:spPr>
-          <p:style>
-            <a:lnRef idx="2">
-              <a:schemeClr val="accent1">
-                <a:shade val="15000"/>
-              </a:schemeClr>
-            </a:lnRef>
-            <a:fillRef idx="1">
-              <a:schemeClr val="accent1"/>
-            </a:fillRef>
-            <a:effectRef idx="0">
-              <a:schemeClr val="accent1"/>
-            </a:effectRef>
-            <a:fontRef idx="minor">
-              <a:schemeClr val="lt1"/>
-            </a:fontRef>
-          </p:style>
-          <p:txBody>
-            <a:bodyPr rtlCol="0" anchor="ctr"/>
-            <a:lstStyle/>
-            <a:p>
-              <a:pPr algn="ctr"/>
-              <a:endParaRPr lang="en-GB"/>
-            </a:p>
-          </p:txBody>
-        </p:sp>
-        <p:sp>
-          <p:nvSpPr>
-            <p:cNvPr id="12" name="TextBox 11">
-              <a:extLst>
-                <a:ext uri="{FF2B5EF4-FFF2-40B4-BE49-F238E27FC236}">
-                  <a16:creationId xmlns:a16="http://schemas.microsoft.com/office/drawing/2014/main" id="{8BB5A9E2-C7FF-19BC-2D5A-B840608DABD8}"/>
-                </a:ext>
-              </a:extLst>
-            </p:cNvPr>
-            <p:cNvSpPr txBox="1"/>
-            <p:nvPr/>
-          </p:nvSpPr>
-          <p:spPr>
-            <a:xfrm>
-              <a:off x="7303929" y="3018010"/>
-              <a:ext cx="572730" cy="400110"/>
-            </a:xfrm>
-            <a:prstGeom prst="rect">
-              <a:avLst/>
-            </a:prstGeom>
-            <a:noFill/>
-          </p:spPr>
-          <p:txBody>
-            <a:bodyPr wrap="square" rtlCol="0">
-              <a:spAutoFit/>
-            </a:bodyPr>
-            <a:lstStyle/>
-            <a:p>
-              <a:r>
-                <a:rPr lang="en-GB" sz="2000" b="1" dirty="0"/>
-                <a:t>B2</a:t>
-              </a:r>
-            </a:p>
-          </p:txBody>
-        </p:sp>
-      </p:grpSp>
-      <p:grpSp>
-        <p:nvGrpSpPr>
-          <p:cNvPr id="49" name="Group 48">
-            <a:extLst>
-              <a:ext uri="{FF2B5EF4-FFF2-40B4-BE49-F238E27FC236}">
-                <a16:creationId xmlns:a16="http://schemas.microsoft.com/office/drawing/2014/main" id="{C11BC2E9-68A9-3DE6-6C3F-7056A3704595}"/>
-              </a:ext>
-            </a:extLst>
-          </p:cNvPr>
-          <p:cNvGrpSpPr/>
-          <p:nvPr/>
-        </p:nvGrpSpPr>
-        <p:grpSpPr>
-          <a:xfrm>
-            <a:off x="7303929" y="3741925"/>
-            <a:ext cx="572730" cy="462117"/>
-            <a:chOff x="7303929" y="3788340"/>
-            <a:chExt cx="572730" cy="462117"/>
-          </a:xfrm>
-        </p:grpSpPr>
-        <p:sp>
-          <p:nvSpPr>
-            <p:cNvPr id="10" name="Oval 9">
-              <a:extLst>
-                <a:ext uri="{FF2B5EF4-FFF2-40B4-BE49-F238E27FC236}">
-                  <a16:creationId xmlns:a16="http://schemas.microsoft.com/office/drawing/2014/main" id="{A2A23908-896F-D4AA-663E-73A8A5E9C964}"/>
-                </a:ext>
-              </a:extLst>
-            </p:cNvPr>
-            <p:cNvSpPr/>
-            <p:nvPr/>
-          </p:nvSpPr>
-          <p:spPr>
-            <a:xfrm>
-              <a:off x="7310281" y="3788340"/>
-              <a:ext cx="462117" cy="462117"/>
-            </a:xfrm>
-            <a:prstGeom prst="ellipse">
-              <a:avLst/>
-            </a:prstGeom>
-            <a:solidFill>
-              <a:schemeClr val="tx2">
-                <a:lumMod val="25000"/>
-                <a:lumOff val="75000"/>
-              </a:schemeClr>
-            </a:solidFill>
-          </p:spPr>
-          <p:style>
-            <a:lnRef idx="2">
-              <a:schemeClr val="accent1">
-                <a:shade val="15000"/>
-              </a:schemeClr>
-            </a:lnRef>
-            <a:fillRef idx="1">
-              <a:schemeClr val="accent1"/>
-            </a:fillRef>
-            <a:effectRef idx="0">
-              <a:schemeClr val="accent1"/>
-            </a:effectRef>
-            <a:fontRef idx="minor">
-              <a:schemeClr val="lt1"/>
-            </a:fontRef>
-          </p:style>
-          <p:txBody>
-            <a:bodyPr rtlCol="0" anchor="ctr"/>
-            <a:lstStyle/>
-            <a:p>
-              <a:pPr algn="ctr"/>
-              <a:endParaRPr lang="en-GB"/>
-            </a:p>
-          </p:txBody>
-        </p:sp>
-        <p:sp>
-          <p:nvSpPr>
-            <p:cNvPr id="13" name="TextBox 12">
-              <a:extLst>
-                <a:ext uri="{FF2B5EF4-FFF2-40B4-BE49-F238E27FC236}">
-                  <a16:creationId xmlns:a16="http://schemas.microsoft.com/office/drawing/2014/main" id="{6B6A10BC-84E0-B0F4-D8C1-FFFBA7DFE1E7}"/>
-                </a:ext>
-              </a:extLst>
-            </p:cNvPr>
-            <p:cNvSpPr txBox="1"/>
-            <p:nvPr/>
-          </p:nvSpPr>
-          <p:spPr>
-            <a:xfrm>
-              <a:off x="7303929" y="3819391"/>
-              <a:ext cx="572730" cy="400110"/>
-            </a:xfrm>
-            <a:prstGeom prst="rect">
-              <a:avLst/>
-            </a:prstGeom>
-            <a:noFill/>
-          </p:spPr>
-          <p:txBody>
-            <a:bodyPr wrap="square" rtlCol="0">
-              <a:spAutoFit/>
-            </a:bodyPr>
-            <a:lstStyle/>
-            <a:p>
-              <a:r>
-                <a:rPr lang="en-GB" sz="2000" b="1" dirty="0"/>
-                <a:t>B3</a:t>
-              </a:r>
-            </a:p>
-          </p:txBody>
-        </p:sp>
-      </p:grpSp>
       <p:sp>
         <p:nvSpPr>
           <p:cNvPr id="14" name="Rectangle 13">
@@ -5093,8 +4775,8 @@
         </p:nvSpPr>
         <p:spPr>
           <a:xfrm>
-            <a:off x="7086599" y="961550"/>
-            <a:ext cx="1546121" cy="911490"/>
+            <a:off x="7086600" y="961550"/>
+            <a:ext cx="1568547" cy="911490"/>
           </a:xfrm>
           <a:prstGeom prst="roundRect">
             <a:avLst/>
@@ -5119,7 +4801,7 @@
           <a:lstStyle/>
           <a:p>
             <a:r>
-              <a:rPr lang="en-GB" b="1" dirty="0"/>
+              <a:rPr lang="en-GB" sz="1200" b="1" dirty="0"/>
               <a:t>BLADE COUNTER</a:t>
             </a:r>
           </a:p>
@@ -5139,8 +4821,8 @@
         </p:nvSpPr>
         <p:spPr>
           <a:xfrm>
-            <a:off x="7946982" y="2191758"/>
-            <a:ext cx="400430" cy="359946"/>
+            <a:off x="7642425" y="2191758"/>
+            <a:ext cx="572730" cy="359946"/>
           </a:xfrm>
           <a:prstGeom prst="rect">
             <a:avLst/>
@@ -5186,8 +4868,8 @@
         </p:nvSpPr>
         <p:spPr>
           <a:xfrm>
-            <a:off x="7946982" y="2992384"/>
-            <a:ext cx="400430" cy="359946"/>
+            <a:off x="7642425" y="2992384"/>
+            <a:ext cx="572730" cy="359946"/>
           </a:xfrm>
           <a:prstGeom prst="rect">
             <a:avLst/>
@@ -5233,8 +4915,8 @@
         </p:nvSpPr>
         <p:spPr>
           <a:xfrm>
-            <a:off x="7946982" y="3793010"/>
-            <a:ext cx="400430" cy="359946"/>
+            <a:off x="7642425" y="3793010"/>
+            <a:ext cx="572730" cy="359946"/>
           </a:xfrm>
           <a:prstGeom prst="rect">
             <a:avLst/>
@@ -5280,8 +4962,8 @@
         </p:nvSpPr>
         <p:spPr>
           <a:xfrm>
-            <a:off x="7127191" y="4673008"/>
-            <a:ext cx="1546121" cy="338554"/>
+            <a:off x="7156637" y="4648148"/>
+            <a:ext cx="1845693" cy="338554"/>
           </a:xfrm>
           <a:prstGeom prst="rect">
             <a:avLst/>
@@ -5296,7 +4978,7 @@
           <a:p>
             <a:r>
               <a:rPr lang="en-GB" sz="1600" b="1" dirty="0"/>
-              <a:t>TOTAL COUNT</a:t>
+              <a:t>TOTAL</a:t>
             </a:r>
           </a:p>
         </p:txBody>
@@ -5315,7 +4997,7 @@
         </p:nvSpPr>
         <p:spPr>
           <a:xfrm>
-            <a:off x="7597140" y="5067750"/>
+            <a:off x="7952638" y="4648148"/>
             <a:ext cx="525034" cy="346408"/>
           </a:xfrm>
           <a:prstGeom prst="rect">
@@ -5362,8 +5044,8 @@
         </p:nvSpPr>
         <p:spPr>
           <a:xfrm>
-            <a:off x="7115175" y="4487113"/>
-            <a:ext cx="1495425" cy="168552"/>
+            <a:off x="7108988" y="4525455"/>
+            <a:ext cx="1509232" cy="92265"/>
           </a:xfrm>
           <a:prstGeom prst="rect">
             <a:avLst/>
@@ -5416,8 +5098,8 @@
         </p:nvCxnSpPr>
         <p:spPr>
           <a:xfrm>
-            <a:off x="7097930" y="4543670"/>
-            <a:ext cx="1517545" cy="0"/>
+            <a:off x="7086600" y="4538609"/>
+            <a:ext cx="1568547" cy="0"/>
           </a:xfrm>
           <a:prstGeom prst="line">
             <a:avLst/>
@@ -5459,8 +5141,8 @@
         </p:nvSpPr>
         <p:spPr>
           <a:xfrm>
-            <a:off x="7108989" y="1776483"/>
-            <a:ext cx="1495425" cy="168552"/>
+            <a:off x="7095841" y="1791786"/>
+            <a:ext cx="1559306" cy="205508"/>
           </a:xfrm>
           <a:prstGeom prst="rect">
             <a:avLst/>
@@ -5513,8 +5195,8 @@
         </p:nvCxnSpPr>
         <p:spPr>
           <a:xfrm>
-            <a:off x="7090319" y="1803205"/>
-            <a:ext cx="1517545" cy="0"/>
+            <a:off x="7086600" y="1783646"/>
+            <a:ext cx="1568547" cy="0"/>
           </a:xfrm>
           <a:prstGeom prst="line">
             <a:avLst/>
@@ -5967,6 +5649,327 @@
               <a:r>
                 <a:rPr lang="en-GB" sz="1600" b="1" dirty="0"/>
                 <a:t>23</a:t>
+              </a:r>
+            </a:p>
+          </p:txBody>
+        </p:sp>
+      </p:grpSp>
+      <p:grpSp>
+        <p:nvGrpSpPr>
+          <p:cNvPr id="47" name="Group 46">
+            <a:extLst>
+              <a:ext uri="{FF2B5EF4-FFF2-40B4-BE49-F238E27FC236}">
+                <a16:creationId xmlns:a16="http://schemas.microsoft.com/office/drawing/2014/main" id="{665E739C-C269-8125-8413-873AD23BBDA1}"/>
+              </a:ext>
+            </a:extLst>
+          </p:cNvPr>
+          <p:cNvGrpSpPr/>
+          <p:nvPr/>
+        </p:nvGrpSpPr>
+        <p:grpSpPr>
+          <a:xfrm>
+            <a:off x="7303929" y="2140673"/>
+            <a:ext cx="572730" cy="462117"/>
+            <a:chOff x="7303929" y="2187088"/>
+            <a:chExt cx="572730" cy="462117"/>
+          </a:xfrm>
+        </p:grpSpPr>
+        <p:sp>
+          <p:nvSpPr>
+            <p:cNvPr id="8" name="Oval 7">
+              <a:extLst>
+                <a:ext uri="{FF2B5EF4-FFF2-40B4-BE49-F238E27FC236}">
+                  <a16:creationId xmlns:a16="http://schemas.microsoft.com/office/drawing/2014/main" id="{435F31FA-7B00-0AAA-226B-13FDF8BA6202}"/>
+                </a:ext>
+              </a:extLst>
+            </p:cNvPr>
+            <p:cNvSpPr/>
+            <p:nvPr/>
+          </p:nvSpPr>
+          <p:spPr>
+            <a:xfrm>
+              <a:off x="7310281" y="2187088"/>
+              <a:ext cx="462117" cy="462117"/>
+            </a:xfrm>
+            <a:prstGeom prst="ellipse">
+              <a:avLst/>
+            </a:prstGeom>
+            <a:solidFill>
+              <a:srgbClr val="C00000"/>
+            </a:solidFill>
+          </p:spPr>
+          <p:style>
+            <a:lnRef idx="2">
+              <a:schemeClr val="accent1">
+                <a:shade val="15000"/>
+              </a:schemeClr>
+            </a:lnRef>
+            <a:fillRef idx="1">
+              <a:schemeClr val="accent1"/>
+            </a:fillRef>
+            <a:effectRef idx="0">
+              <a:schemeClr val="accent1"/>
+            </a:effectRef>
+            <a:fontRef idx="minor">
+              <a:schemeClr val="lt1"/>
+            </a:fontRef>
+          </p:style>
+          <p:txBody>
+            <a:bodyPr rtlCol="0" anchor="ctr"/>
+            <a:lstStyle/>
+            <a:p>
+              <a:pPr algn="ctr"/>
+              <a:endParaRPr lang="en-GB"/>
+            </a:p>
+          </p:txBody>
+        </p:sp>
+        <p:sp>
+          <p:nvSpPr>
+            <p:cNvPr id="11" name="TextBox 10">
+              <a:extLst>
+                <a:ext uri="{FF2B5EF4-FFF2-40B4-BE49-F238E27FC236}">
+                  <a16:creationId xmlns:a16="http://schemas.microsoft.com/office/drawing/2014/main" id="{2B077EC9-A156-8CED-639D-5F23AAAFC99C}"/>
+                </a:ext>
+              </a:extLst>
+            </p:cNvPr>
+            <p:cNvSpPr txBox="1"/>
+            <p:nvPr/>
+          </p:nvSpPr>
+          <p:spPr>
+            <a:xfrm>
+              <a:off x="7303929" y="2216629"/>
+              <a:ext cx="572730" cy="400110"/>
+            </a:xfrm>
+            <a:prstGeom prst="rect">
+              <a:avLst/>
+            </a:prstGeom>
+            <a:noFill/>
+          </p:spPr>
+          <p:txBody>
+            <a:bodyPr wrap="square" rtlCol="0">
+              <a:spAutoFit/>
+            </a:bodyPr>
+            <a:lstStyle/>
+            <a:p>
+              <a:r>
+                <a:rPr lang="en-GB" sz="2000" b="1" dirty="0"/>
+                <a:t>B1</a:t>
+              </a:r>
+            </a:p>
+          </p:txBody>
+        </p:sp>
+      </p:grpSp>
+      <p:grpSp>
+        <p:nvGrpSpPr>
+          <p:cNvPr id="48" name="Group 47">
+            <a:extLst>
+              <a:ext uri="{FF2B5EF4-FFF2-40B4-BE49-F238E27FC236}">
+                <a16:creationId xmlns:a16="http://schemas.microsoft.com/office/drawing/2014/main" id="{4A92425D-F94F-5950-E519-05666A369267}"/>
+              </a:ext>
+            </a:extLst>
+          </p:cNvPr>
+          <p:cNvGrpSpPr/>
+          <p:nvPr/>
+        </p:nvGrpSpPr>
+        <p:grpSpPr>
+          <a:xfrm>
+            <a:off x="7303929" y="2941299"/>
+            <a:ext cx="572730" cy="462117"/>
+            <a:chOff x="7303929" y="2987714"/>
+            <a:chExt cx="572730" cy="462117"/>
+          </a:xfrm>
+        </p:grpSpPr>
+        <p:sp>
+          <p:nvSpPr>
+            <p:cNvPr id="9" name="Oval 8">
+              <a:extLst>
+                <a:ext uri="{FF2B5EF4-FFF2-40B4-BE49-F238E27FC236}">
+                  <a16:creationId xmlns:a16="http://schemas.microsoft.com/office/drawing/2014/main" id="{785DAECF-9612-34D7-0348-C4BCAD5A189B}"/>
+                </a:ext>
+              </a:extLst>
+            </p:cNvPr>
+            <p:cNvSpPr/>
+            <p:nvPr/>
+          </p:nvSpPr>
+          <p:spPr>
+            <a:xfrm>
+              <a:off x="7310281" y="2987714"/>
+              <a:ext cx="462117" cy="462117"/>
+            </a:xfrm>
+            <a:prstGeom prst="ellipse">
+              <a:avLst/>
+            </a:prstGeom>
+            <a:solidFill>
+              <a:schemeClr val="accent6">
+                <a:lumMod val="40000"/>
+                <a:lumOff val="60000"/>
+              </a:schemeClr>
+            </a:solidFill>
+          </p:spPr>
+          <p:style>
+            <a:lnRef idx="2">
+              <a:schemeClr val="accent1">
+                <a:shade val="15000"/>
+              </a:schemeClr>
+            </a:lnRef>
+            <a:fillRef idx="1">
+              <a:schemeClr val="accent1"/>
+            </a:fillRef>
+            <a:effectRef idx="0">
+              <a:schemeClr val="accent1"/>
+            </a:effectRef>
+            <a:fontRef idx="minor">
+              <a:schemeClr val="lt1"/>
+            </a:fontRef>
+          </p:style>
+          <p:txBody>
+            <a:bodyPr rtlCol="0" anchor="ctr"/>
+            <a:lstStyle/>
+            <a:p>
+              <a:pPr algn="ctr"/>
+              <a:endParaRPr lang="en-GB"/>
+            </a:p>
+          </p:txBody>
+        </p:sp>
+        <p:sp>
+          <p:nvSpPr>
+            <p:cNvPr id="12" name="TextBox 11">
+              <a:extLst>
+                <a:ext uri="{FF2B5EF4-FFF2-40B4-BE49-F238E27FC236}">
+                  <a16:creationId xmlns:a16="http://schemas.microsoft.com/office/drawing/2014/main" id="{8BB5A9E2-C7FF-19BC-2D5A-B840608DABD8}"/>
+                </a:ext>
+              </a:extLst>
+            </p:cNvPr>
+            <p:cNvSpPr txBox="1"/>
+            <p:nvPr/>
+          </p:nvSpPr>
+          <p:spPr>
+            <a:xfrm>
+              <a:off x="7303929" y="3018010"/>
+              <a:ext cx="572730" cy="400110"/>
+            </a:xfrm>
+            <a:prstGeom prst="rect">
+              <a:avLst/>
+            </a:prstGeom>
+            <a:noFill/>
+          </p:spPr>
+          <p:txBody>
+            <a:bodyPr wrap="square" rtlCol="0">
+              <a:spAutoFit/>
+            </a:bodyPr>
+            <a:lstStyle/>
+            <a:p>
+              <a:r>
+                <a:rPr lang="en-GB" sz="2000" b="1" dirty="0"/>
+                <a:t>B2</a:t>
+              </a:r>
+            </a:p>
+          </p:txBody>
+        </p:sp>
+      </p:grpSp>
+      <p:grpSp>
+        <p:nvGrpSpPr>
+          <p:cNvPr id="49" name="Group 48">
+            <a:extLst>
+              <a:ext uri="{FF2B5EF4-FFF2-40B4-BE49-F238E27FC236}">
+                <a16:creationId xmlns:a16="http://schemas.microsoft.com/office/drawing/2014/main" id="{C11BC2E9-68A9-3DE6-6C3F-7056A3704595}"/>
+              </a:ext>
+            </a:extLst>
+          </p:cNvPr>
+          <p:cNvGrpSpPr/>
+          <p:nvPr/>
+        </p:nvGrpSpPr>
+        <p:grpSpPr>
+          <a:xfrm>
+            <a:off x="7303929" y="3741925"/>
+            <a:ext cx="572730" cy="462117"/>
+            <a:chOff x="7303929" y="3788340"/>
+            <a:chExt cx="572730" cy="462117"/>
+          </a:xfrm>
+        </p:grpSpPr>
+        <p:sp>
+          <p:nvSpPr>
+            <p:cNvPr id="10" name="Oval 9">
+              <a:extLst>
+                <a:ext uri="{FF2B5EF4-FFF2-40B4-BE49-F238E27FC236}">
+                  <a16:creationId xmlns:a16="http://schemas.microsoft.com/office/drawing/2014/main" id="{A2A23908-896F-D4AA-663E-73A8A5E9C964}"/>
+                </a:ext>
+              </a:extLst>
+            </p:cNvPr>
+            <p:cNvSpPr/>
+            <p:nvPr/>
+          </p:nvSpPr>
+          <p:spPr>
+            <a:xfrm>
+              <a:off x="7310281" y="3788340"/>
+              <a:ext cx="462117" cy="462117"/>
+            </a:xfrm>
+            <a:prstGeom prst="ellipse">
+              <a:avLst/>
+            </a:prstGeom>
+            <a:solidFill>
+              <a:schemeClr val="tx2">
+                <a:lumMod val="25000"/>
+                <a:lumOff val="75000"/>
+              </a:schemeClr>
+            </a:solidFill>
+          </p:spPr>
+          <p:style>
+            <a:lnRef idx="2">
+              <a:schemeClr val="accent1">
+                <a:shade val="15000"/>
+              </a:schemeClr>
+            </a:lnRef>
+            <a:fillRef idx="1">
+              <a:schemeClr val="accent1"/>
+            </a:fillRef>
+            <a:effectRef idx="0">
+              <a:schemeClr val="accent1"/>
+            </a:effectRef>
+            <a:fontRef idx="minor">
+              <a:schemeClr val="lt1"/>
+            </a:fontRef>
+          </p:style>
+          <p:txBody>
+            <a:bodyPr rtlCol="0" anchor="ctr"/>
+            <a:lstStyle/>
+            <a:p>
+              <a:pPr algn="ctr"/>
+              <a:endParaRPr lang="en-GB"/>
+            </a:p>
+          </p:txBody>
+        </p:sp>
+        <p:sp>
+          <p:nvSpPr>
+            <p:cNvPr id="13" name="TextBox 12">
+              <a:extLst>
+                <a:ext uri="{FF2B5EF4-FFF2-40B4-BE49-F238E27FC236}">
+                  <a16:creationId xmlns:a16="http://schemas.microsoft.com/office/drawing/2014/main" id="{6B6A10BC-84E0-B0F4-D8C1-FFFBA7DFE1E7}"/>
+                </a:ext>
+              </a:extLst>
+            </p:cNvPr>
+            <p:cNvSpPr txBox="1"/>
+            <p:nvPr/>
+          </p:nvSpPr>
+          <p:spPr>
+            <a:xfrm>
+              <a:off x="7303929" y="3819391"/>
+              <a:ext cx="572730" cy="400110"/>
+            </a:xfrm>
+            <a:prstGeom prst="rect">
+              <a:avLst/>
+            </a:prstGeom>
+            <a:noFill/>
+          </p:spPr>
+          <p:txBody>
+            <a:bodyPr wrap="square" rtlCol="0">
+              <a:spAutoFit/>
+            </a:bodyPr>
+            <a:lstStyle/>
+            <a:p>
+              <a:r>
+                <a:rPr lang="en-GB" sz="2000" b="1" dirty="0"/>
+                <a:t>B3</a:t>
               </a:r>
             </a:p>
           </p:txBody>
@@ -10758,6 +10761,1784 @@
 </p:sld>
 </file>
 
+<file path=ppt/slides/slide6.xml><?xml version="1.0" encoding="utf-8"?>
+<p:sld xmlns:a="http://schemas.openxmlformats.org/drawingml/2006/main" xmlns:r="http://schemas.openxmlformats.org/officeDocument/2006/relationships" xmlns:p="http://schemas.openxmlformats.org/presentationml/2006/main">
+  <p:cSld>
+    <p:spTree>
+      <p:nvGrpSpPr>
+        <p:cNvPr id="1" name=""/>
+        <p:cNvGrpSpPr/>
+        <p:nvPr/>
+      </p:nvGrpSpPr>
+      <p:grpSpPr>
+        <a:xfrm>
+          <a:off x="0" y="0"/>
+          <a:ext cx="0" cy="0"/>
+          <a:chOff x="0" y="0"/>
+          <a:chExt cx="0" cy="0"/>
+        </a:xfrm>
+      </p:grpSpPr>
+      <p:grpSp>
+        <p:nvGrpSpPr>
+          <p:cNvPr id="6" name="Group 5">
+            <a:extLst>
+              <a:ext uri="{FF2B5EF4-FFF2-40B4-BE49-F238E27FC236}">
+                <a16:creationId xmlns:a16="http://schemas.microsoft.com/office/drawing/2014/main" id="{1FFFFB4A-9C85-8FD3-521A-2A35975472B1}"/>
+              </a:ext>
+            </a:extLst>
+          </p:cNvPr>
+          <p:cNvGrpSpPr/>
+          <p:nvPr/>
+        </p:nvGrpSpPr>
+        <p:grpSpPr>
+          <a:xfrm>
+            <a:off x="813667" y="968734"/>
+            <a:ext cx="1519316" cy="2279292"/>
+            <a:chOff x="2798944" y="591059"/>
+            <a:chExt cx="3313897" cy="4971541"/>
+          </a:xfrm>
+        </p:grpSpPr>
+        <p:grpSp>
+          <p:nvGrpSpPr>
+            <p:cNvPr id="15" name="Group 14">
+              <a:extLst>
+                <a:ext uri="{FF2B5EF4-FFF2-40B4-BE49-F238E27FC236}">
+                  <a16:creationId xmlns:a16="http://schemas.microsoft.com/office/drawing/2014/main" id="{8A408A3E-A75F-F92C-1B2A-BCDAAC618E30}"/>
+                </a:ext>
+              </a:extLst>
+            </p:cNvPr>
+            <p:cNvGrpSpPr/>
+            <p:nvPr/>
+          </p:nvGrpSpPr>
+          <p:grpSpPr>
+            <a:xfrm>
+              <a:off x="2979892" y="647701"/>
+              <a:ext cx="2997721" cy="4914899"/>
+              <a:chOff x="2979892" y="647701"/>
+              <a:chExt cx="2997721" cy="4914899"/>
+            </a:xfrm>
+          </p:grpSpPr>
+          <p:sp>
+            <p:nvSpPr>
+              <p:cNvPr id="17" name="Rectangle 16">
+                <a:extLst>
+                  <a:ext uri="{FF2B5EF4-FFF2-40B4-BE49-F238E27FC236}">
+                    <a16:creationId xmlns:a16="http://schemas.microsoft.com/office/drawing/2014/main" id="{288F0570-7F14-CDE4-F87C-16FA0A1489C6}"/>
+                  </a:ext>
+                </a:extLst>
+              </p:cNvPr>
+              <p:cNvSpPr/>
+              <p:nvPr/>
+            </p:nvSpPr>
+            <p:spPr>
+              <a:xfrm>
+                <a:off x="4429957" y="2247899"/>
+                <a:ext cx="97593" cy="3314701"/>
+              </a:xfrm>
+              <a:prstGeom prst="rect">
+                <a:avLst/>
+              </a:prstGeom>
+              <a:noFill/>
+              <a:ln>
+                <a:solidFill>
+                  <a:schemeClr val="tx1"/>
+                </a:solidFill>
+              </a:ln>
+            </p:spPr>
+            <p:style>
+              <a:lnRef idx="2">
+                <a:schemeClr val="accent1">
+                  <a:shade val="50000"/>
+                </a:schemeClr>
+              </a:lnRef>
+              <a:fillRef idx="1">
+                <a:schemeClr val="accent1"/>
+              </a:fillRef>
+              <a:effectRef idx="0">
+                <a:schemeClr val="accent1"/>
+              </a:effectRef>
+              <a:fontRef idx="minor">
+                <a:schemeClr val="lt1"/>
+              </a:fontRef>
+            </p:style>
+            <p:txBody>
+              <a:bodyPr rtlCol="0" anchor="ctr"/>
+              <a:lstStyle/>
+              <a:p>
+                <a:pPr algn="ctr"/>
+                <a:endParaRPr lang="en-GB"/>
+              </a:p>
+            </p:txBody>
+          </p:sp>
+          <p:grpSp>
+            <p:nvGrpSpPr>
+              <p:cNvPr id="18" name="Group 17">
+                <a:extLst>
+                  <a:ext uri="{FF2B5EF4-FFF2-40B4-BE49-F238E27FC236}">
+                    <a16:creationId xmlns:a16="http://schemas.microsoft.com/office/drawing/2014/main" id="{28C895E9-5454-2AEE-D5A1-A0C092A40038}"/>
+                  </a:ext>
+                </a:extLst>
+              </p:cNvPr>
+              <p:cNvGrpSpPr/>
+              <p:nvPr/>
+            </p:nvGrpSpPr>
+            <p:grpSpPr>
+              <a:xfrm>
+                <a:off x="4418073" y="2195589"/>
+                <a:ext cx="121360" cy="104620"/>
+                <a:chOff x="4418073" y="2195589"/>
+                <a:chExt cx="121360" cy="104620"/>
+              </a:xfrm>
+              <a:noFill/>
+            </p:grpSpPr>
+            <p:sp>
+              <p:nvSpPr>
+                <p:cNvPr id="22" name="Hexagon 21">
+                  <a:extLst>
+                    <a:ext uri="{FF2B5EF4-FFF2-40B4-BE49-F238E27FC236}">
+                      <a16:creationId xmlns:a16="http://schemas.microsoft.com/office/drawing/2014/main" id="{F958D235-D9D5-1868-7E2F-18FFE4AF9A16}"/>
+                    </a:ext>
+                  </a:extLst>
+                </p:cNvPr>
+                <p:cNvSpPr/>
+                <p:nvPr/>
+              </p:nvSpPr>
+              <p:spPr>
+                <a:xfrm>
+                  <a:off x="4418073" y="2195589"/>
+                  <a:ext cx="121360" cy="104620"/>
+                </a:xfrm>
+                <a:prstGeom prst="hexagon">
+                  <a:avLst/>
+                </a:prstGeom>
+                <a:grpFill/>
+                <a:ln>
+                  <a:solidFill>
+                    <a:schemeClr val="tx1"/>
+                  </a:solidFill>
+                </a:ln>
+              </p:spPr>
+              <p:style>
+                <a:lnRef idx="2">
+                  <a:schemeClr val="accent1">
+                    <a:shade val="50000"/>
+                  </a:schemeClr>
+                </a:lnRef>
+                <a:fillRef idx="1">
+                  <a:schemeClr val="accent1"/>
+                </a:fillRef>
+                <a:effectRef idx="0">
+                  <a:schemeClr val="accent1"/>
+                </a:effectRef>
+                <a:fontRef idx="minor">
+                  <a:schemeClr val="lt1"/>
+                </a:fontRef>
+              </p:style>
+              <p:txBody>
+                <a:bodyPr rtlCol="0" anchor="ctr"/>
+                <a:lstStyle/>
+                <a:p>
+                  <a:pPr algn="ctr"/>
+                  <a:endParaRPr lang="en-GB"/>
+                </a:p>
+              </p:txBody>
+            </p:sp>
+            <p:sp>
+              <p:nvSpPr>
+                <p:cNvPr id="23" name="Oval 22">
+                  <a:extLst>
+                    <a:ext uri="{FF2B5EF4-FFF2-40B4-BE49-F238E27FC236}">
+                      <a16:creationId xmlns:a16="http://schemas.microsoft.com/office/drawing/2014/main" id="{55DA4B4B-A2C6-36DA-5B4B-D9ABE6FB1921}"/>
+                    </a:ext>
+                  </a:extLst>
+                </p:cNvPr>
+                <p:cNvSpPr/>
+                <p:nvPr/>
+              </p:nvSpPr>
+              <p:spPr>
+                <a:xfrm>
+                  <a:off x="4455893" y="2225039"/>
+                  <a:ext cx="45719" cy="45719"/>
+                </a:xfrm>
+                <a:prstGeom prst="ellipse">
+                  <a:avLst/>
+                </a:prstGeom>
+                <a:grpFill/>
+                <a:ln>
+                  <a:solidFill>
+                    <a:schemeClr val="tx1"/>
+                  </a:solidFill>
+                </a:ln>
+              </p:spPr>
+              <p:style>
+                <a:lnRef idx="2">
+                  <a:schemeClr val="accent1">
+                    <a:shade val="50000"/>
+                  </a:schemeClr>
+                </a:lnRef>
+                <a:fillRef idx="1">
+                  <a:schemeClr val="accent1"/>
+                </a:fillRef>
+                <a:effectRef idx="0">
+                  <a:schemeClr val="accent1"/>
+                </a:effectRef>
+                <a:fontRef idx="minor">
+                  <a:schemeClr val="lt1"/>
+                </a:fontRef>
+              </p:style>
+              <p:txBody>
+                <a:bodyPr rtlCol="0" anchor="ctr"/>
+                <a:lstStyle/>
+                <a:p>
+                  <a:pPr algn="ctr"/>
+                  <a:endParaRPr lang="en-GB"/>
+                </a:p>
+              </p:txBody>
+            </p:sp>
+          </p:grpSp>
+          <p:sp>
+            <p:nvSpPr>
+              <p:cNvPr id="19" name="Isosceles Triangle 18">
+                <a:extLst>
+                  <a:ext uri="{FF2B5EF4-FFF2-40B4-BE49-F238E27FC236}">
+                    <a16:creationId xmlns:a16="http://schemas.microsoft.com/office/drawing/2014/main" id="{3CC79088-60F3-F8E9-3D55-666C10183374}"/>
+                  </a:ext>
+                </a:extLst>
+              </p:cNvPr>
+              <p:cNvSpPr/>
+              <p:nvPr/>
+            </p:nvSpPr>
+            <p:spPr>
+              <a:xfrm>
+                <a:off x="4443944" y="647701"/>
+                <a:ext cx="60719" cy="1547887"/>
+              </a:xfrm>
+              <a:prstGeom prst="triangle">
+                <a:avLst>
+                  <a:gd name="adj" fmla="val 55802"/>
+                </a:avLst>
+              </a:prstGeom>
+              <a:noFill/>
+              <a:ln>
+                <a:solidFill>
+                  <a:schemeClr val="tx1"/>
+                </a:solidFill>
+              </a:ln>
+            </p:spPr>
+            <p:style>
+              <a:lnRef idx="2">
+                <a:schemeClr val="accent1">
+                  <a:shade val="50000"/>
+                </a:schemeClr>
+              </a:lnRef>
+              <a:fillRef idx="1">
+                <a:schemeClr val="accent1"/>
+              </a:fillRef>
+              <a:effectRef idx="0">
+                <a:schemeClr val="accent1"/>
+              </a:effectRef>
+              <a:fontRef idx="minor">
+                <a:schemeClr val="lt1"/>
+              </a:fontRef>
+            </p:style>
+            <p:txBody>
+              <a:bodyPr rtlCol="0" anchor="ctr"/>
+              <a:lstStyle/>
+              <a:p>
+                <a:pPr algn="ctr"/>
+                <a:endParaRPr lang="en-GB"/>
+              </a:p>
+            </p:txBody>
+          </p:sp>
+          <p:sp>
+            <p:nvSpPr>
+              <p:cNvPr id="20" name="Isosceles Triangle 19">
+                <a:extLst>
+                  <a:ext uri="{FF2B5EF4-FFF2-40B4-BE49-F238E27FC236}">
+                    <a16:creationId xmlns:a16="http://schemas.microsoft.com/office/drawing/2014/main" id="{469C71B8-EFC1-A378-42E6-94C7E35F4C2E}"/>
+                  </a:ext>
+                </a:extLst>
+              </p:cNvPr>
+              <p:cNvSpPr/>
+              <p:nvPr/>
+            </p:nvSpPr>
+            <p:spPr>
+              <a:xfrm rot="7175090">
+                <a:off x="5173310" y="1877699"/>
+                <a:ext cx="60719" cy="1547887"/>
+              </a:xfrm>
+              <a:prstGeom prst="triangle">
+                <a:avLst>
+                  <a:gd name="adj" fmla="val 55802"/>
+                </a:avLst>
+              </a:prstGeom>
+              <a:noFill/>
+              <a:ln>
+                <a:solidFill>
+                  <a:schemeClr val="tx1"/>
+                </a:solidFill>
+              </a:ln>
+            </p:spPr>
+            <p:style>
+              <a:lnRef idx="2">
+                <a:schemeClr val="accent1">
+                  <a:shade val="50000"/>
+                </a:schemeClr>
+              </a:lnRef>
+              <a:fillRef idx="1">
+                <a:schemeClr val="accent1"/>
+              </a:fillRef>
+              <a:effectRef idx="0">
+                <a:schemeClr val="accent1"/>
+              </a:effectRef>
+              <a:fontRef idx="minor">
+                <a:schemeClr val="lt1"/>
+              </a:fontRef>
+            </p:style>
+            <p:txBody>
+              <a:bodyPr rtlCol="0" anchor="ctr"/>
+              <a:lstStyle/>
+              <a:p>
+                <a:pPr algn="ctr"/>
+                <a:endParaRPr lang="en-GB"/>
+              </a:p>
+            </p:txBody>
+          </p:sp>
+          <p:sp>
+            <p:nvSpPr>
+              <p:cNvPr id="21" name="Isosceles Triangle 20">
+                <a:extLst>
+                  <a:ext uri="{FF2B5EF4-FFF2-40B4-BE49-F238E27FC236}">
+                    <a16:creationId xmlns:a16="http://schemas.microsoft.com/office/drawing/2014/main" id="{4DACFA19-B5D7-60B6-385E-F0854AB798BE}"/>
+                  </a:ext>
+                </a:extLst>
+              </p:cNvPr>
+              <p:cNvSpPr/>
+              <p:nvPr/>
+            </p:nvSpPr>
+            <p:spPr>
+              <a:xfrm rot="14424910" flipH="1">
+                <a:off x="3723476" y="1877699"/>
+                <a:ext cx="60719" cy="1547887"/>
+              </a:xfrm>
+              <a:prstGeom prst="triangle">
+                <a:avLst>
+                  <a:gd name="adj" fmla="val 55802"/>
+                </a:avLst>
+              </a:prstGeom>
+              <a:noFill/>
+              <a:ln>
+                <a:solidFill>
+                  <a:schemeClr val="tx1"/>
+                </a:solidFill>
+              </a:ln>
+            </p:spPr>
+            <p:style>
+              <a:lnRef idx="2">
+                <a:schemeClr val="accent1">
+                  <a:shade val="50000"/>
+                </a:schemeClr>
+              </a:lnRef>
+              <a:fillRef idx="1">
+                <a:schemeClr val="accent1"/>
+              </a:fillRef>
+              <a:effectRef idx="0">
+                <a:schemeClr val="accent1"/>
+              </a:effectRef>
+              <a:fontRef idx="minor">
+                <a:schemeClr val="lt1"/>
+              </a:fontRef>
+            </p:style>
+            <p:txBody>
+              <a:bodyPr rtlCol="0" anchor="ctr"/>
+              <a:lstStyle/>
+              <a:p>
+                <a:pPr algn="ctr"/>
+                <a:endParaRPr lang="en-GB"/>
+              </a:p>
+            </p:txBody>
+          </p:sp>
+        </p:grpSp>
+        <p:sp>
+          <p:nvSpPr>
+            <p:cNvPr id="16" name="Oval 15">
+              <a:extLst>
+                <a:ext uri="{FF2B5EF4-FFF2-40B4-BE49-F238E27FC236}">
+                  <a16:creationId xmlns:a16="http://schemas.microsoft.com/office/drawing/2014/main" id="{1A8C191F-A2A6-6D6A-CB18-69D4C2436B0D}"/>
+                </a:ext>
+              </a:extLst>
+            </p:cNvPr>
+            <p:cNvSpPr/>
+            <p:nvPr/>
+          </p:nvSpPr>
+          <p:spPr>
+            <a:xfrm>
+              <a:off x="2798944" y="591059"/>
+              <a:ext cx="3313897" cy="3304154"/>
+            </a:xfrm>
+            <a:prstGeom prst="ellipse">
+              <a:avLst/>
+            </a:prstGeom>
+            <a:noFill/>
+            <a:ln>
+              <a:solidFill>
+                <a:schemeClr val="tx1"/>
+              </a:solidFill>
+              <a:prstDash val="lgDash"/>
+            </a:ln>
+          </p:spPr>
+          <p:style>
+            <a:lnRef idx="2">
+              <a:schemeClr val="accent1">
+                <a:shade val="50000"/>
+              </a:schemeClr>
+            </a:lnRef>
+            <a:fillRef idx="1">
+              <a:schemeClr val="accent1"/>
+            </a:fillRef>
+            <a:effectRef idx="0">
+              <a:schemeClr val="accent1"/>
+            </a:effectRef>
+            <a:fontRef idx="minor">
+              <a:schemeClr val="lt1"/>
+            </a:fontRef>
+          </p:style>
+          <p:txBody>
+            <a:bodyPr rtlCol="0" anchor="ctr"/>
+            <a:lstStyle/>
+            <a:p>
+              <a:pPr algn="ctr"/>
+              <a:endParaRPr lang="en-GB"/>
+            </a:p>
+          </p:txBody>
+        </p:sp>
+      </p:grpSp>
+      <p:grpSp>
+        <p:nvGrpSpPr>
+          <p:cNvPr id="27" name="Group 26">
+            <a:extLst>
+              <a:ext uri="{FF2B5EF4-FFF2-40B4-BE49-F238E27FC236}">
+                <a16:creationId xmlns:a16="http://schemas.microsoft.com/office/drawing/2014/main" id="{37B516B6-9947-07C3-DCD1-7C43BCA424CF}"/>
+              </a:ext>
+            </a:extLst>
+          </p:cNvPr>
+          <p:cNvGrpSpPr/>
+          <p:nvPr/>
+        </p:nvGrpSpPr>
+        <p:grpSpPr>
+          <a:xfrm>
+            <a:off x="794023" y="3815312"/>
+            <a:ext cx="1630212" cy="2408102"/>
+            <a:chOff x="4297933" y="1706588"/>
+            <a:chExt cx="2775920" cy="4100510"/>
+          </a:xfrm>
+        </p:grpSpPr>
+        <p:grpSp>
+          <p:nvGrpSpPr>
+            <p:cNvPr id="28" name="Group 27">
+              <a:extLst>
+                <a:ext uri="{FF2B5EF4-FFF2-40B4-BE49-F238E27FC236}">
+                  <a16:creationId xmlns:a16="http://schemas.microsoft.com/office/drawing/2014/main" id="{7905E593-BA3E-F3EF-C546-554496A611BA}"/>
+                </a:ext>
+              </a:extLst>
+            </p:cNvPr>
+            <p:cNvGrpSpPr/>
+            <p:nvPr/>
+          </p:nvGrpSpPr>
+          <p:grpSpPr>
+            <a:xfrm>
+              <a:off x="4297933" y="2192066"/>
+              <a:ext cx="2775920" cy="2775920"/>
+              <a:chOff x="1274406" y="2588306"/>
+              <a:chExt cx="2775920" cy="2775920"/>
+            </a:xfrm>
+          </p:grpSpPr>
+          <p:grpSp>
+            <p:nvGrpSpPr>
+              <p:cNvPr id="30" name="Group 29">
+                <a:extLst>
+                  <a:ext uri="{FF2B5EF4-FFF2-40B4-BE49-F238E27FC236}">
+                    <a16:creationId xmlns:a16="http://schemas.microsoft.com/office/drawing/2014/main" id="{514EC13A-929A-1BD8-7D41-79E080B4C4E4}"/>
+                  </a:ext>
+                </a:extLst>
+              </p:cNvPr>
+              <p:cNvGrpSpPr/>
+              <p:nvPr/>
+            </p:nvGrpSpPr>
+            <p:grpSpPr>
+              <a:xfrm>
+                <a:off x="1369161" y="2988330"/>
+                <a:ext cx="2500210" cy="2126726"/>
+                <a:chOff x="1778178" y="3096280"/>
+                <a:chExt cx="2500210" cy="2126726"/>
+              </a:xfrm>
+            </p:grpSpPr>
+            <p:grpSp>
+              <p:nvGrpSpPr>
+                <p:cNvPr id="32" name="Group 31">
+                  <a:extLst>
+                    <a:ext uri="{FF2B5EF4-FFF2-40B4-BE49-F238E27FC236}">
+                      <a16:creationId xmlns:a16="http://schemas.microsoft.com/office/drawing/2014/main" id="{29C94AD1-D195-D884-7208-FCB0DAB8EA68}"/>
+                    </a:ext>
+                  </a:extLst>
+                </p:cNvPr>
+                <p:cNvGrpSpPr/>
+                <p:nvPr/>
+              </p:nvGrpSpPr>
+              <p:grpSpPr>
+                <a:xfrm>
+                  <a:off x="1778178" y="3211212"/>
+                  <a:ext cx="2500210" cy="1862497"/>
+                  <a:chOff x="1791709" y="3162118"/>
+                  <a:chExt cx="2500210" cy="1862497"/>
+                </a:xfrm>
+              </p:grpSpPr>
+              <p:pic>
+                <p:nvPicPr>
+                  <p:cNvPr id="39" name="Picture 38">
+                    <a:extLst>
+                      <a:ext uri="{FF2B5EF4-FFF2-40B4-BE49-F238E27FC236}">
+                        <a16:creationId xmlns:a16="http://schemas.microsoft.com/office/drawing/2014/main" id="{E96C245F-B908-2F73-0081-B9E6C9328FA1}"/>
+                      </a:ext>
+                    </a:extLst>
+                  </p:cNvPr>
+                  <p:cNvPicPr>
+                    <a:picLocks noChangeAspect="1"/>
+                  </p:cNvPicPr>
+                  <p:nvPr/>
+                </p:nvPicPr>
+                <p:blipFill>
+                  <a:blip r:embed="rId2"/>
+                  <a:stretch>
+                    <a:fillRect/>
+                  </a:stretch>
+                </p:blipFill>
+                <p:spPr>
+                  <a:xfrm>
+                    <a:off x="1791709" y="3531376"/>
+                    <a:ext cx="2500210" cy="758322"/>
+                  </a:xfrm>
+                  <a:prstGeom prst="rect">
+                    <a:avLst/>
+                  </a:prstGeom>
+                </p:spPr>
+              </p:pic>
+              <p:sp>
+                <p:nvSpPr>
+                  <p:cNvPr id="40" name="Oval 39">
+                    <a:extLst>
+                      <a:ext uri="{FF2B5EF4-FFF2-40B4-BE49-F238E27FC236}">
+                        <a16:creationId xmlns:a16="http://schemas.microsoft.com/office/drawing/2014/main" id="{8811D40E-BE85-9C76-4964-BB48412F5479}"/>
+                      </a:ext>
+                    </a:extLst>
+                  </p:cNvPr>
+                  <p:cNvSpPr/>
+                  <p:nvPr/>
+                </p:nvSpPr>
+                <p:spPr>
+                  <a:xfrm>
+                    <a:off x="3522719" y="4187649"/>
+                    <a:ext cx="84143" cy="84143"/>
+                  </a:xfrm>
+                  <a:prstGeom prst="ellipse">
+                    <a:avLst/>
+                  </a:prstGeom>
+                  <a:solidFill>
+                    <a:srgbClr val="410C01"/>
+                  </a:solidFill>
+                  <a:ln>
+                    <a:noFill/>
+                  </a:ln>
+                </p:spPr>
+                <p:style>
+                  <a:lnRef idx="2">
+                    <a:schemeClr val="accent1">
+                      <a:shade val="50000"/>
+                    </a:schemeClr>
+                  </a:lnRef>
+                  <a:fillRef idx="1">
+                    <a:schemeClr val="accent1"/>
+                  </a:fillRef>
+                  <a:effectRef idx="0">
+                    <a:schemeClr val="accent1"/>
+                  </a:effectRef>
+                  <a:fontRef idx="minor">
+                    <a:schemeClr val="lt1"/>
+                  </a:fontRef>
+                </p:style>
+                <p:txBody>
+                  <a:bodyPr rtlCol="0" anchor="ctr"/>
+                  <a:lstStyle/>
+                  <a:p>
+                    <a:pPr algn="ctr"/>
+                    <a:endParaRPr lang="en-GB"/>
+                  </a:p>
+                </p:txBody>
+              </p:sp>
+              <p:sp>
+                <p:nvSpPr>
+                  <p:cNvPr id="41" name="Oval 40">
+                    <a:extLst>
+                      <a:ext uri="{FF2B5EF4-FFF2-40B4-BE49-F238E27FC236}">
+                        <a16:creationId xmlns:a16="http://schemas.microsoft.com/office/drawing/2014/main" id="{D4469BC7-7B05-F855-4362-CF0D7B505135}"/>
+                      </a:ext>
+                    </a:extLst>
+                  </p:cNvPr>
+                  <p:cNvSpPr/>
+                  <p:nvPr/>
+                </p:nvSpPr>
+                <p:spPr>
+                  <a:xfrm>
+                    <a:off x="3522719" y="3162118"/>
+                    <a:ext cx="84143" cy="84143"/>
+                  </a:xfrm>
+                  <a:prstGeom prst="ellipse">
+                    <a:avLst/>
+                  </a:prstGeom>
+                  <a:solidFill>
+                    <a:srgbClr val="410C01"/>
+                  </a:solidFill>
+                  <a:ln>
+                    <a:noFill/>
+                  </a:ln>
+                </p:spPr>
+                <p:style>
+                  <a:lnRef idx="2">
+                    <a:schemeClr val="accent1">
+                      <a:shade val="50000"/>
+                    </a:schemeClr>
+                  </a:lnRef>
+                  <a:fillRef idx="1">
+                    <a:schemeClr val="accent1"/>
+                  </a:fillRef>
+                  <a:effectRef idx="0">
+                    <a:schemeClr val="accent1"/>
+                  </a:effectRef>
+                  <a:fontRef idx="minor">
+                    <a:schemeClr val="lt1"/>
+                  </a:fontRef>
+                </p:style>
+                <p:txBody>
+                  <a:bodyPr rtlCol="0" anchor="ctr"/>
+                  <a:lstStyle/>
+                  <a:p>
+                    <a:pPr algn="ctr"/>
+                    <a:endParaRPr lang="en-GB"/>
+                  </a:p>
+                </p:txBody>
+              </p:sp>
+              <p:sp>
+                <p:nvSpPr>
+                  <p:cNvPr id="42" name="Oval 41">
+                    <a:extLst>
+                      <a:ext uri="{FF2B5EF4-FFF2-40B4-BE49-F238E27FC236}">
+                        <a16:creationId xmlns:a16="http://schemas.microsoft.com/office/drawing/2014/main" id="{F7195771-2776-6057-4B55-21FDCEC5F1A7}"/>
+                      </a:ext>
+                    </a:extLst>
+                  </p:cNvPr>
+                  <p:cNvSpPr/>
+                  <p:nvPr/>
+                </p:nvSpPr>
+                <p:spPr>
+                  <a:xfrm>
+                    <a:off x="3522719" y="4937368"/>
+                    <a:ext cx="84143" cy="84143"/>
+                  </a:xfrm>
+                  <a:prstGeom prst="ellipse">
+                    <a:avLst/>
+                  </a:prstGeom>
+                  <a:solidFill>
+                    <a:srgbClr val="410C01"/>
+                  </a:solidFill>
+                  <a:ln>
+                    <a:noFill/>
+                  </a:ln>
+                </p:spPr>
+                <p:style>
+                  <a:lnRef idx="2">
+                    <a:schemeClr val="accent1">
+                      <a:shade val="50000"/>
+                    </a:schemeClr>
+                  </a:lnRef>
+                  <a:fillRef idx="1">
+                    <a:schemeClr val="accent1"/>
+                  </a:fillRef>
+                  <a:effectRef idx="0">
+                    <a:schemeClr val="accent1"/>
+                  </a:effectRef>
+                  <a:fontRef idx="minor">
+                    <a:schemeClr val="lt1"/>
+                  </a:fontRef>
+                </p:style>
+                <p:txBody>
+                  <a:bodyPr rtlCol="0" anchor="ctr"/>
+                  <a:lstStyle/>
+                  <a:p>
+                    <a:pPr algn="ctr"/>
+                    <a:endParaRPr lang="en-GB"/>
+                  </a:p>
+                </p:txBody>
+              </p:sp>
+              <p:sp>
+                <p:nvSpPr>
+                  <p:cNvPr id="43" name="Oval 42">
+                    <a:extLst>
+                      <a:ext uri="{FF2B5EF4-FFF2-40B4-BE49-F238E27FC236}">
+                        <a16:creationId xmlns:a16="http://schemas.microsoft.com/office/drawing/2014/main" id="{3BF18313-E749-7399-831C-DE30A3EFD031}"/>
+                      </a:ext>
+                    </a:extLst>
+                  </p:cNvPr>
+                  <p:cNvSpPr/>
+                  <p:nvPr/>
+                </p:nvSpPr>
+                <p:spPr>
+                  <a:xfrm>
+                    <a:off x="2473951" y="3878586"/>
+                    <a:ext cx="84143" cy="84143"/>
+                  </a:xfrm>
+                  <a:prstGeom prst="ellipse">
+                    <a:avLst/>
+                  </a:prstGeom>
+                  <a:solidFill>
+                    <a:srgbClr val="410C01"/>
+                  </a:solidFill>
+                  <a:ln>
+                    <a:noFill/>
+                  </a:ln>
+                </p:spPr>
+                <p:style>
+                  <a:lnRef idx="2">
+                    <a:schemeClr val="accent1">
+                      <a:shade val="50000"/>
+                    </a:schemeClr>
+                  </a:lnRef>
+                  <a:fillRef idx="1">
+                    <a:schemeClr val="accent1"/>
+                  </a:fillRef>
+                  <a:effectRef idx="0">
+                    <a:schemeClr val="accent1"/>
+                  </a:effectRef>
+                  <a:fontRef idx="minor">
+                    <a:schemeClr val="lt1"/>
+                  </a:fontRef>
+                </p:style>
+                <p:txBody>
+                  <a:bodyPr rtlCol="0" anchor="ctr"/>
+                  <a:lstStyle/>
+                  <a:p>
+                    <a:pPr algn="ctr"/>
+                    <a:endParaRPr lang="en-GB"/>
+                  </a:p>
+                </p:txBody>
+              </p:sp>
+              <p:sp>
+                <p:nvSpPr>
+                  <p:cNvPr id="44" name="Oval 43">
+                    <a:extLst>
+                      <a:ext uri="{FF2B5EF4-FFF2-40B4-BE49-F238E27FC236}">
+                        <a16:creationId xmlns:a16="http://schemas.microsoft.com/office/drawing/2014/main" id="{7F97986D-068A-FDEC-2C32-E768E3F34C3B}"/>
+                      </a:ext>
+                    </a:extLst>
+                  </p:cNvPr>
+                  <p:cNvSpPr/>
+                  <p:nvPr/>
+                </p:nvSpPr>
+                <p:spPr>
+                  <a:xfrm>
+                    <a:off x="3022241" y="4937369"/>
+                    <a:ext cx="87246" cy="87246"/>
+                  </a:xfrm>
+                  <a:prstGeom prst="ellipse">
+                    <a:avLst/>
+                  </a:prstGeom>
+                  <a:solidFill>
+                    <a:schemeClr val="accent1">
+                      <a:lumMod val="50000"/>
+                    </a:schemeClr>
+                  </a:solidFill>
+                  <a:ln>
+                    <a:solidFill>
+                      <a:schemeClr val="accent1">
+                        <a:lumMod val="50000"/>
+                      </a:schemeClr>
+                    </a:solidFill>
+                  </a:ln>
+                </p:spPr>
+                <p:style>
+                  <a:lnRef idx="2">
+                    <a:schemeClr val="accent1">
+                      <a:shade val="50000"/>
+                    </a:schemeClr>
+                  </a:lnRef>
+                  <a:fillRef idx="1">
+                    <a:schemeClr val="accent1"/>
+                  </a:fillRef>
+                  <a:effectRef idx="0">
+                    <a:schemeClr val="accent1"/>
+                  </a:effectRef>
+                  <a:fontRef idx="minor">
+                    <a:schemeClr val="lt1"/>
+                  </a:fontRef>
+                </p:style>
+                <p:txBody>
+                  <a:bodyPr rtlCol="0" anchor="ctr"/>
+                  <a:lstStyle/>
+                  <a:p>
+                    <a:pPr algn="ctr"/>
+                    <a:endParaRPr lang="en-GB"/>
+                  </a:p>
+                </p:txBody>
+              </p:sp>
+            </p:grpSp>
+            <p:sp>
+              <p:nvSpPr>
+                <p:cNvPr id="33" name="TextBox 32">
+                  <a:extLst>
+                    <a:ext uri="{FF2B5EF4-FFF2-40B4-BE49-F238E27FC236}">
+                      <a16:creationId xmlns:a16="http://schemas.microsoft.com/office/drawing/2014/main" id="{E8217FA8-6DE7-FF35-34E2-BFB469B6C7C3}"/>
+                    </a:ext>
+                  </a:extLst>
+                </p:cNvPr>
+                <p:cNvSpPr txBox="1"/>
+                <p:nvPr/>
+              </p:nvSpPr>
+              <p:spPr>
+                <a:xfrm>
+                  <a:off x="3551257" y="3096280"/>
+                  <a:ext cx="727125" cy="277873"/>
+                </a:xfrm>
+                <a:prstGeom prst="rect">
+                  <a:avLst/>
+                </a:prstGeom>
+                <a:noFill/>
+              </p:spPr>
+              <p:txBody>
+                <a:bodyPr wrap="square" rtlCol="0">
+                  <a:spAutoFit/>
+                </a:bodyPr>
+                <a:lstStyle/>
+                <a:p>
+                  <a:r>
+                    <a:rPr lang="en-GB" sz="900" b="1" dirty="0"/>
+                    <a:t>SP_3</a:t>
+                  </a:r>
+                </a:p>
+              </p:txBody>
+            </p:sp>
+            <p:sp>
+              <p:nvSpPr>
+                <p:cNvPr id="34" name="TextBox 33">
+                  <a:extLst>
+                    <a:ext uri="{FF2B5EF4-FFF2-40B4-BE49-F238E27FC236}">
+                      <a16:creationId xmlns:a16="http://schemas.microsoft.com/office/drawing/2014/main" id="{732A3C47-9F1F-0FD0-5784-2AADEE26FA53}"/>
+                    </a:ext>
+                  </a:extLst>
+                </p:cNvPr>
+                <p:cNvSpPr txBox="1"/>
+                <p:nvPr/>
+              </p:nvSpPr>
+              <p:spPr>
+                <a:xfrm>
+                  <a:off x="3551257" y="4195805"/>
+                  <a:ext cx="603789" cy="277873"/>
+                </a:xfrm>
+                <a:prstGeom prst="rect">
+                  <a:avLst/>
+                </a:prstGeom>
+                <a:noFill/>
+              </p:spPr>
+              <p:txBody>
+                <a:bodyPr wrap="square" rtlCol="0">
+                  <a:spAutoFit/>
+                </a:bodyPr>
+                <a:lstStyle/>
+                <a:p>
+                  <a:r>
+                    <a:rPr lang="en-GB" sz="900" b="1" dirty="0"/>
+                    <a:t>SP_2</a:t>
+                  </a:r>
+                </a:p>
+              </p:txBody>
+            </p:sp>
+            <p:sp>
+              <p:nvSpPr>
+                <p:cNvPr id="35" name="TextBox 34">
+                  <a:extLst>
+                    <a:ext uri="{FF2B5EF4-FFF2-40B4-BE49-F238E27FC236}">
+                      <a16:creationId xmlns:a16="http://schemas.microsoft.com/office/drawing/2014/main" id="{11C34C7C-1B64-FDAB-1559-286A8283F9D2}"/>
+                    </a:ext>
+                  </a:extLst>
+                </p:cNvPr>
+                <p:cNvSpPr txBox="1"/>
+                <p:nvPr/>
+              </p:nvSpPr>
+              <p:spPr>
+                <a:xfrm>
+                  <a:off x="3551257" y="4916222"/>
+                  <a:ext cx="603786" cy="277873"/>
+                </a:xfrm>
+                <a:prstGeom prst="rect">
+                  <a:avLst/>
+                </a:prstGeom>
+                <a:noFill/>
+              </p:spPr>
+              <p:txBody>
+                <a:bodyPr wrap="square" rtlCol="0">
+                  <a:spAutoFit/>
+                </a:bodyPr>
+                <a:lstStyle/>
+                <a:p>
+                  <a:r>
+                    <a:rPr lang="en-GB" sz="900" b="1" dirty="0"/>
+                    <a:t>SP_1</a:t>
+                  </a:r>
+                </a:p>
+              </p:txBody>
+            </p:sp>
+            <p:sp>
+              <p:nvSpPr>
+                <p:cNvPr id="36" name="TextBox 35">
+                  <a:extLst>
+                    <a:ext uri="{FF2B5EF4-FFF2-40B4-BE49-F238E27FC236}">
+                      <a16:creationId xmlns:a16="http://schemas.microsoft.com/office/drawing/2014/main" id="{B9A7C761-65EA-2497-2D8B-327930A2C0B0}"/>
+                    </a:ext>
+                  </a:extLst>
+                </p:cNvPr>
+                <p:cNvSpPr txBox="1"/>
+                <p:nvPr/>
+              </p:nvSpPr>
+              <p:spPr>
+                <a:xfrm>
+                  <a:off x="1949610" y="3733950"/>
+                  <a:ext cx="779747" cy="277873"/>
+                </a:xfrm>
+                <a:prstGeom prst="rect">
+                  <a:avLst/>
+                </a:prstGeom>
+                <a:noFill/>
+              </p:spPr>
+              <p:txBody>
+                <a:bodyPr wrap="square" rtlCol="0">
+                  <a:spAutoFit/>
+                </a:bodyPr>
+                <a:lstStyle/>
+                <a:p>
+                  <a:r>
+                    <a:rPr lang="en-GB" sz="900" b="1" dirty="0"/>
+                    <a:t>SP_4</a:t>
+                  </a:r>
+                </a:p>
+              </p:txBody>
+            </p:sp>
+            <p:sp>
+              <p:nvSpPr>
+                <p:cNvPr id="37" name="TextBox 36">
+                  <a:extLst>
+                    <a:ext uri="{FF2B5EF4-FFF2-40B4-BE49-F238E27FC236}">
+                      <a16:creationId xmlns:a16="http://schemas.microsoft.com/office/drawing/2014/main" id="{CC0EE3F4-C250-608F-C85E-CDCEBBD08FD6}"/>
+                    </a:ext>
+                  </a:extLst>
+                </p:cNvPr>
+                <p:cNvSpPr txBox="1"/>
+                <p:nvPr/>
+              </p:nvSpPr>
+              <p:spPr>
+                <a:xfrm>
+                  <a:off x="2182806" y="4963657"/>
+                  <a:ext cx="925123" cy="259349"/>
+                </a:xfrm>
+                <a:prstGeom prst="rect">
+                  <a:avLst/>
+                </a:prstGeom>
+                <a:noFill/>
+              </p:spPr>
+              <p:txBody>
+                <a:bodyPr wrap="square" rtlCol="0">
+                  <a:spAutoFit/>
+                </a:bodyPr>
+                <a:lstStyle/>
+                <a:p>
+                  <a:r>
+                    <a:rPr lang="en-GB" sz="800" b="1" dirty="0"/>
+                    <a:t>TRACKER</a:t>
+                  </a:r>
+                </a:p>
+              </p:txBody>
+            </p:sp>
+          </p:grpSp>
+          <p:sp>
+            <p:nvSpPr>
+              <p:cNvPr id="31" name="Oval 30">
+                <a:extLst>
+                  <a:ext uri="{FF2B5EF4-FFF2-40B4-BE49-F238E27FC236}">
+                    <a16:creationId xmlns:a16="http://schemas.microsoft.com/office/drawing/2014/main" id="{F2C925C2-1B4A-5AC8-236A-40FF5ECEEEEC}"/>
+                  </a:ext>
+                </a:extLst>
+              </p:cNvPr>
+              <p:cNvSpPr/>
+              <p:nvPr/>
+            </p:nvSpPr>
+            <p:spPr>
+              <a:xfrm>
+                <a:off x="1274406" y="2588306"/>
+                <a:ext cx="2775920" cy="2775920"/>
+              </a:xfrm>
+              <a:prstGeom prst="ellipse">
+                <a:avLst/>
+              </a:prstGeom>
+              <a:noFill/>
+              <a:ln w="9525" cap="flat" cmpd="sng" algn="ctr">
+                <a:solidFill>
+                  <a:schemeClr val="accent1"/>
+                </a:solidFill>
+                <a:prstDash val="solid"/>
+                <a:round/>
+                <a:headEnd type="none" w="med" len="med"/>
+                <a:tailEnd type="none" w="med" len="med"/>
+              </a:ln>
+            </p:spPr>
+            <p:style>
+              <a:lnRef idx="0">
+                <a:scrgbClr r="0" g="0" b="0"/>
+              </a:lnRef>
+              <a:fillRef idx="0">
+                <a:scrgbClr r="0" g="0" b="0"/>
+              </a:fillRef>
+              <a:effectRef idx="0">
+                <a:scrgbClr r="0" g="0" b="0"/>
+              </a:effectRef>
+              <a:fontRef idx="minor">
+                <a:schemeClr val="accent1"/>
+              </a:fontRef>
+            </p:style>
+            <p:txBody>
+              <a:bodyPr rtlCol="0" anchor="ctr"/>
+              <a:lstStyle/>
+              <a:p>
+                <a:pPr algn="ctr"/>
+                <a:endParaRPr lang="en-GB" dirty="0"/>
+              </a:p>
+            </p:txBody>
+          </p:sp>
+        </p:grpSp>
+        <p:cxnSp>
+          <p:nvCxnSpPr>
+            <p:cNvPr id="29" name="Straight Connector 28">
+              <a:extLst>
+                <a:ext uri="{FF2B5EF4-FFF2-40B4-BE49-F238E27FC236}">
+                  <a16:creationId xmlns:a16="http://schemas.microsoft.com/office/drawing/2014/main" id="{E9ABEFC0-4F64-FA10-2346-D4B864F1B527}"/>
+                </a:ext>
+              </a:extLst>
+            </p:cNvPr>
+            <p:cNvCxnSpPr/>
+            <p:nvPr/>
+          </p:nvCxnSpPr>
+          <p:spPr>
+            <a:xfrm>
+              <a:off x="5666843" y="1706588"/>
+              <a:ext cx="0" cy="4100510"/>
+            </a:xfrm>
+            <a:prstGeom prst="line">
+              <a:avLst/>
+            </a:prstGeom>
+            <a:ln>
+              <a:prstDash val="dash"/>
+            </a:ln>
+          </p:spPr>
+          <p:style>
+            <a:lnRef idx="1">
+              <a:schemeClr val="accent1"/>
+            </a:lnRef>
+            <a:fillRef idx="0">
+              <a:schemeClr val="accent1"/>
+            </a:fillRef>
+            <a:effectRef idx="0">
+              <a:schemeClr val="accent1"/>
+            </a:effectRef>
+            <a:fontRef idx="minor">
+              <a:schemeClr val="tx1"/>
+            </a:fontRef>
+          </p:style>
+        </p:cxnSp>
+      </p:grpSp>
+    </p:spTree>
+    <p:extLst>
+      <p:ext uri="{BB962C8B-B14F-4D97-AF65-F5344CB8AC3E}">
+        <p14:creationId xmlns:p14="http://schemas.microsoft.com/office/powerpoint/2010/main" val="2211283607"/>
+      </p:ext>
+    </p:extLst>
+  </p:cSld>
+  <p:clrMapOvr>
+    <a:masterClrMapping/>
+  </p:clrMapOvr>
+</p:sld>
+</file>
+
+<file path=ppt/slides/slide7.xml><?xml version="1.0" encoding="utf-8"?>
+<p:sld xmlns:a="http://schemas.openxmlformats.org/drawingml/2006/main" xmlns:r="http://schemas.openxmlformats.org/officeDocument/2006/relationships" xmlns:p="http://schemas.openxmlformats.org/presentationml/2006/main">
+  <p:cSld>
+    <p:spTree>
+      <p:nvGrpSpPr>
+        <p:cNvPr id="1" name=""/>
+        <p:cNvGrpSpPr/>
+        <p:nvPr/>
+      </p:nvGrpSpPr>
+      <p:grpSpPr>
+        <a:xfrm>
+          <a:off x="0" y="0"/>
+          <a:ext cx="0" cy="0"/>
+          <a:chOff x="0" y="0"/>
+          <a:chExt cx="0" cy="0"/>
+        </a:xfrm>
+      </p:grpSpPr>
+      <p:sp>
+        <p:nvSpPr>
+          <p:cNvPr id="4" name="Rectangle: Rounded Corners 3">
+            <a:extLst>
+              <a:ext uri="{FF2B5EF4-FFF2-40B4-BE49-F238E27FC236}">
+                <a16:creationId xmlns:a16="http://schemas.microsoft.com/office/drawing/2014/main" id="{4B841600-822D-3A9A-6C86-BE89FAC5AE25}"/>
+              </a:ext>
+            </a:extLst>
+          </p:cNvPr>
+          <p:cNvSpPr/>
+          <p:nvPr/>
+        </p:nvSpPr>
+        <p:spPr>
+          <a:xfrm>
+            <a:off x="703006" y="383458"/>
+            <a:ext cx="10785987" cy="629265"/>
+          </a:xfrm>
+          <a:prstGeom prst="roundRect">
+            <a:avLst/>
+          </a:prstGeom>
+        </p:spPr>
+        <p:style>
+          <a:lnRef idx="2">
+            <a:schemeClr val="dk1"/>
+          </a:lnRef>
+          <a:fillRef idx="1">
+            <a:schemeClr val="lt1"/>
+          </a:fillRef>
+          <a:effectRef idx="0">
+            <a:schemeClr val="dk1"/>
+          </a:effectRef>
+          <a:fontRef idx="minor">
+            <a:schemeClr val="dk1"/>
+          </a:fontRef>
+        </p:style>
+        <p:txBody>
+          <a:bodyPr rtlCol="0" anchor="ctr"/>
+          <a:lstStyle/>
+          <a:p>
+            <a:pPr algn="ctr"/>
+            <a:endParaRPr lang="en-GB"/>
+          </a:p>
+        </p:txBody>
+      </p:sp>
+      <p:sp>
+        <p:nvSpPr>
+          <p:cNvPr id="5" name="Rectangle: Rounded Corners 4">
+            <a:extLst>
+              <a:ext uri="{FF2B5EF4-FFF2-40B4-BE49-F238E27FC236}">
+                <a16:creationId xmlns:a16="http://schemas.microsoft.com/office/drawing/2014/main" id="{56A82F33-5D19-D8FC-50FC-0FE5332F9223}"/>
+              </a:ext>
+            </a:extLst>
+          </p:cNvPr>
+          <p:cNvSpPr/>
+          <p:nvPr/>
+        </p:nvSpPr>
+        <p:spPr>
+          <a:xfrm>
+            <a:off x="4463843" y="1288025"/>
+            <a:ext cx="3087331" cy="2812026"/>
+          </a:xfrm>
+          <a:prstGeom prst="roundRect">
+            <a:avLst/>
+          </a:prstGeom>
+          <a:ln/>
+        </p:spPr>
+        <p:style>
+          <a:lnRef idx="2">
+            <a:schemeClr val="dk1"/>
+          </a:lnRef>
+          <a:fillRef idx="1">
+            <a:schemeClr val="lt1"/>
+          </a:fillRef>
+          <a:effectRef idx="0">
+            <a:schemeClr val="dk1"/>
+          </a:effectRef>
+          <a:fontRef idx="minor">
+            <a:schemeClr val="dk1"/>
+          </a:fontRef>
+        </p:style>
+        <p:txBody>
+          <a:bodyPr rtlCol="0" anchor="ctr"/>
+          <a:lstStyle/>
+          <a:p>
+            <a:pPr algn="ctr"/>
+            <a:endParaRPr lang="en-GB"/>
+          </a:p>
+        </p:txBody>
+      </p:sp>
+      <p:sp>
+        <p:nvSpPr>
+          <p:cNvPr id="7" name="Rectangle: Top Corners Rounded 6">
+            <a:extLst>
+              <a:ext uri="{FF2B5EF4-FFF2-40B4-BE49-F238E27FC236}">
+                <a16:creationId xmlns:a16="http://schemas.microsoft.com/office/drawing/2014/main" id="{7981C54E-E04E-5486-35E9-BACBEC46B69D}"/>
+              </a:ext>
+            </a:extLst>
+          </p:cNvPr>
+          <p:cNvSpPr/>
+          <p:nvPr/>
+        </p:nvSpPr>
+        <p:spPr>
+          <a:xfrm rot="16200000">
+            <a:off x="390834" y="1600199"/>
+            <a:ext cx="2733368" cy="2109022"/>
+          </a:xfrm>
+          <a:prstGeom prst="round2SameRect">
+            <a:avLst/>
+          </a:prstGeom>
+        </p:spPr>
+        <p:style>
+          <a:lnRef idx="2">
+            <a:schemeClr val="dk1"/>
+          </a:lnRef>
+          <a:fillRef idx="1">
+            <a:schemeClr val="lt1"/>
+          </a:fillRef>
+          <a:effectRef idx="0">
+            <a:schemeClr val="dk1"/>
+          </a:effectRef>
+          <a:fontRef idx="minor">
+            <a:schemeClr val="dk1"/>
+          </a:fontRef>
+        </p:style>
+        <p:txBody>
+          <a:bodyPr rtlCol="0" anchor="ctr"/>
+          <a:lstStyle/>
+          <a:p>
+            <a:pPr algn="ctr"/>
+            <a:endParaRPr lang="en-GB"/>
+          </a:p>
+        </p:txBody>
+      </p:sp>
+      <p:sp>
+        <p:nvSpPr>
+          <p:cNvPr id="8" name="Rectangle: Top Corners Rounded 7">
+            <a:extLst>
+              <a:ext uri="{FF2B5EF4-FFF2-40B4-BE49-F238E27FC236}">
+                <a16:creationId xmlns:a16="http://schemas.microsoft.com/office/drawing/2014/main" id="{790422C3-5C56-89CE-E28C-F6F97C0710AA}"/>
+              </a:ext>
+            </a:extLst>
+          </p:cNvPr>
+          <p:cNvSpPr/>
+          <p:nvPr/>
+        </p:nvSpPr>
+        <p:spPr>
+          <a:xfrm rot="5400000">
+            <a:off x="2271252" y="2101644"/>
+            <a:ext cx="2733368" cy="1106132"/>
+          </a:xfrm>
+          <a:prstGeom prst="round2SameRect">
+            <a:avLst/>
+          </a:prstGeom>
+        </p:spPr>
+        <p:style>
+          <a:lnRef idx="2">
+            <a:schemeClr val="dk1"/>
+          </a:lnRef>
+          <a:fillRef idx="1">
+            <a:schemeClr val="lt1"/>
+          </a:fillRef>
+          <a:effectRef idx="0">
+            <a:schemeClr val="dk1"/>
+          </a:effectRef>
+          <a:fontRef idx="minor">
+            <a:schemeClr val="dk1"/>
+          </a:fontRef>
+        </p:style>
+        <p:txBody>
+          <a:bodyPr rtlCol="0" anchor="ctr"/>
+          <a:lstStyle/>
+          <a:p>
+            <a:pPr algn="ctr"/>
+            <a:endParaRPr lang="en-GB"/>
+          </a:p>
+        </p:txBody>
+      </p:sp>
+      <p:sp>
+        <p:nvSpPr>
+          <p:cNvPr id="9" name="Rectangle: Rounded Corners 8">
+            <a:extLst>
+              <a:ext uri="{FF2B5EF4-FFF2-40B4-BE49-F238E27FC236}">
+                <a16:creationId xmlns:a16="http://schemas.microsoft.com/office/drawing/2014/main" id="{81484ACC-C79E-95D2-96B2-C666C88C0E33}"/>
+              </a:ext>
+            </a:extLst>
+          </p:cNvPr>
+          <p:cNvSpPr/>
+          <p:nvPr/>
+        </p:nvSpPr>
+        <p:spPr>
+          <a:xfrm>
+            <a:off x="7777316" y="1794386"/>
+            <a:ext cx="3711677" cy="1720646"/>
+          </a:xfrm>
+          <a:prstGeom prst="roundRect">
+            <a:avLst/>
+          </a:prstGeom>
+          <a:ln/>
+        </p:spPr>
+        <p:style>
+          <a:lnRef idx="2">
+            <a:schemeClr val="dk1"/>
+          </a:lnRef>
+          <a:fillRef idx="1">
+            <a:schemeClr val="lt1"/>
+          </a:fillRef>
+          <a:effectRef idx="0">
+            <a:schemeClr val="dk1"/>
+          </a:effectRef>
+          <a:fontRef idx="minor">
+            <a:schemeClr val="dk1"/>
+          </a:fontRef>
+        </p:style>
+        <p:txBody>
+          <a:bodyPr rtlCol="0" anchor="ctr"/>
+          <a:lstStyle/>
+          <a:p>
+            <a:pPr algn="ctr"/>
+            <a:endParaRPr lang="en-GB"/>
+          </a:p>
+        </p:txBody>
+      </p:sp>
+      <p:cxnSp>
+        <p:nvCxnSpPr>
+          <p:cNvPr id="12" name="Straight Connector 11">
+            <a:extLst>
+              <a:ext uri="{FF2B5EF4-FFF2-40B4-BE49-F238E27FC236}">
+                <a16:creationId xmlns:a16="http://schemas.microsoft.com/office/drawing/2014/main" id="{4D27C84D-9ED0-5220-8722-B9E004128127}"/>
+              </a:ext>
+            </a:extLst>
+          </p:cNvPr>
+          <p:cNvCxnSpPr>
+            <a:cxnSpLocks/>
+          </p:cNvCxnSpPr>
+          <p:nvPr/>
+        </p:nvCxnSpPr>
+        <p:spPr>
+          <a:xfrm>
+            <a:off x="703006" y="4532671"/>
+            <a:ext cx="10785987" cy="0"/>
+          </a:xfrm>
+          <a:prstGeom prst="line">
+            <a:avLst/>
+          </a:prstGeom>
+        </p:spPr>
+        <p:style>
+          <a:lnRef idx="2">
+            <a:schemeClr val="accent1"/>
+          </a:lnRef>
+          <a:fillRef idx="0">
+            <a:schemeClr val="accent1"/>
+          </a:fillRef>
+          <a:effectRef idx="1">
+            <a:schemeClr val="accent1"/>
+          </a:effectRef>
+          <a:fontRef idx="minor">
+            <a:schemeClr val="tx1"/>
+          </a:fontRef>
+        </p:style>
+      </p:cxnSp>
+      <p:sp>
+        <p:nvSpPr>
+          <p:cNvPr id="16" name="TextBox 15">
+            <a:extLst>
+              <a:ext uri="{FF2B5EF4-FFF2-40B4-BE49-F238E27FC236}">
+                <a16:creationId xmlns:a16="http://schemas.microsoft.com/office/drawing/2014/main" id="{41751DB7-7652-8B5B-400F-5C0B31C04CAA}"/>
+              </a:ext>
+            </a:extLst>
+          </p:cNvPr>
+          <p:cNvSpPr txBox="1"/>
+          <p:nvPr/>
+        </p:nvSpPr>
+        <p:spPr>
+          <a:xfrm>
+            <a:off x="589940" y="4649415"/>
+            <a:ext cx="2222090" cy="369332"/>
+          </a:xfrm>
+          <a:prstGeom prst="rect">
+            <a:avLst/>
+          </a:prstGeom>
+          <a:noFill/>
+        </p:spPr>
+        <p:txBody>
+          <a:bodyPr wrap="square" rtlCol="0">
+            <a:spAutoFit/>
+          </a:bodyPr>
+          <a:lstStyle/>
+          <a:p>
+            <a:r>
+              <a:rPr lang="en-GB" dirty="0"/>
+              <a:t>DIAGNOSTIC DATA</a:t>
+            </a:r>
+          </a:p>
+        </p:txBody>
+      </p:sp>
+      <p:sp>
+        <p:nvSpPr>
+          <p:cNvPr id="18" name="Rectangle: Rounded Corners 17">
+            <a:extLst>
+              <a:ext uri="{FF2B5EF4-FFF2-40B4-BE49-F238E27FC236}">
+                <a16:creationId xmlns:a16="http://schemas.microsoft.com/office/drawing/2014/main" id="{25BAA682-C428-E022-FEF3-12F9C43721B5}"/>
+              </a:ext>
+            </a:extLst>
+          </p:cNvPr>
+          <p:cNvSpPr/>
+          <p:nvPr/>
+        </p:nvSpPr>
+        <p:spPr>
+          <a:xfrm>
+            <a:off x="764461" y="5018746"/>
+            <a:ext cx="2738285" cy="1760595"/>
+          </a:xfrm>
+          <a:prstGeom prst="roundRect">
+            <a:avLst/>
+          </a:prstGeom>
+          <a:ln/>
+        </p:spPr>
+        <p:style>
+          <a:lnRef idx="2">
+            <a:schemeClr val="dk1"/>
+          </a:lnRef>
+          <a:fillRef idx="1">
+            <a:schemeClr val="lt1"/>
+          </a:fillRef>
+          <a:effectRef idx="0">
+            <a:schemeClr val="dk1"/>
+          </a:effectRef>
+          <a:fontRef idx="minor">
+            <a:schemeClr val="dk1"/>
+          </a:fontRef>
+        </p:style>
+        <p:txBody>
+          <a:bodyPr rtlCol="0" anchor="ctr"/>
+          <a:lstStyle/>
+          <a:p>
+            <a:pPr algn="ctr"/>
+            <a:endParaRPr lang="en-GB"/>
+          </a:p>
+        </p:txBody>
+      </p:sp>
+      <p:sp>
+        <p:nvSpPr>
+          <p:cNvPr id="19" name="Rectangle: Rounded Corners 18">
+            <a:extLst>
+              <a:ext uri="{FF2B5EF4-FFF2-40B4-BE49-F238E27FC236}">
+                <a16:creationId xmlns:a16="http://schemas.microsoft.com/office/drawing/2014/main" id="{54D751FB-46E0-FA25-9784-5FCB2DE035D9}"/>
+              </a:ext>
+            </a:extLst>
+          </p:cNvPr>
+          <p:cNvSpPr/>
+          <p:nvPr/>
+        </p:nvSpPr>
+        <p:spPr>
+          <a:xfrm>
+            <a:off x="3792797" y="5018746"/>
+            <a:ext cx="2738285" cy="1760595"/>
+          </a:xfrm>
+          <a:prstGeom prst="roundRect">
+            <a:avLst/>
+          </a:prstGeom>
+          <a:ln/>
+        </p:spPr>
+        <p:style>
+          <a:lnRef idx="2">
+            <a:schemeClr val="dk1"/>
+          </a:lnRef>
+          <a:fillRef idx="1">
+            <a:schemeClr val="lt1"/>
+          </a:fillRef>
+          <a:effectRef idx="0">
+            <a:schemeClr val="dk1"/>
+          </a:effectRef>
+          <a:fontRef idx="minor">
+            <a:schemeClr val="dk1"/>
+          </a:fontRef>
+        </p:style>
+        <p:txBody>
+          <a:bodyPr rtlCol="0" anchor="ctr"/>
+          <a:lstStyle/>
+          <a:p>
+            <a:pPr algn="ctr"/>
+            <a:endParaRPr lang="en-GB"/>
+          </a:p>
+        </p:txBody>
+      </p:sp>
+    </p:spTree>
+    <p:extLst>
+      <p:ext uri="{BB962C8B-B14F-4D97-AF65-F5344CB8AC3E}">
+        <p14:creationId xmlns:p14="http://schemas.microsoft.com/office/powerpoint/2010/main" val="3761254245"/>
+      </p:ext>
+    </p:extLst>
+  </p:cSld>
+  <p:clrMapOvr>
+    <a:masterClrMapping/>
+  </p:clrMapOvr>
+</p:sld>
+</file>
+
+<file path=ppt/slides/slide8.xml><?xml version="1.0" encoding="utf-8"?>
+<p:sld xmlns:a="http://schemas.openxmlformats.org/drawingml/2006/main" xmlns:r="http://schemas.openxmlformats.org/officeDocument/2006/relationships" xmlns:p="http://schemas.openxmlformats.org/presentationml/2006/main">
+  <p:cSld>
+    <p:spTree>
+      <p:nvGrpSpPr>
+        <p:cNvPr id="1" name="">
+          <a:extLst>
+            <a:ext uri="{FF2B5EF4-FFF2-40B4-BE49-F238E27FC236}">
+              <a16:creationId xmlns:a16="http://schemas.microsoft.com/office/drawing/2014/main" id="{12E18A76-541D-02F5-6E23-7BF114278D9F}"/>
+            </a:ext>
+          </a:extLst>
+        </p:cNvPr>
+        <p:cNvGrpSpPr/>
+        <p:nvPr/>
+      </p:nvGrpSpPr>
+      <p:grpSpPr>
+        <a:xfrm>
+          <a:off x="0" y="0"/>
+          <a:ext cx="0" cy="0"/>
+          <a:chOff x="0" y="0"/>
+          <a:chExt cx="0" cy="0"/>
+        </a:xfrm>
+      </p:grpSpPr>
+      <p:sp>
+        <p:nvSpPr>
+          <p:cNvPr id="4" name="Rectangle: Rounded Corners 3">
+            <a:extLst>
+              <a:ext uri="{FF2B5EF4-FFF2-40B4-BE49-F238E27FC236}">
+                <a16:creationId xmlns:a16="http://schemas.microsoft.com/office/drawing/2014/main" id="{02671E5E-3841-B41B-C992-8368A6837B62}"/>
+              </a:ext>
+            </a:extLst>
+          </p:cNvPr>
+          <p:cNvSpPr/>
+          <p:nvPr/>
+        </p:nvSpPr>
+        <p:spPr>
+          <a:xfrm>
+            <a:off x="703006" y="383458"/>
+            <a:ext cx="10785987" cy="629265"/>
+          </a:xfrm>
+          <a:prstGeom prst="roundRect">
+            <a:avLst/>
+          </a:prstGeom>
+        </p:spPr>
+        <p:style>
+          <a:lnRef idx="2">
+            <a:schemeClr val="dk1"/>
+          </a:lnRef>
+          <a:fillRef idx="1">
+            <a:schemeClr val="lt1"/>
+          </a:fillRef>
+          <a:effectRef idx="0">
+            <a:schemeClr val="dk1"/>
+          </a:effectRef>
+          <a:fontRef idx="minor">
+            <a:schemeClr val="dk1"/>
+          </a:fontRef>
+        </p:style>
+        <p:txBody>
+          <a:bodyPr rtlCol="0" anchor="ctr"/>
+          <a:lstStyle/>
+          <a:p>
+            <a:pPr algn="ctr"/>
+            <a:endParaRPr lang="en-GB"/>
+          </a:p>
+        </p:txBody>
+      </p:sp>
+      <p:sp>
+        <p:nvSpPr>
+          <p:cNvPr id="5" name="Rectangle: Rounded Corners 4">
+            <a:extLst>
+              <a:ext uri="{FF2B5EF4-FFF2-40B4-BE49-F238E27FC236}">
+                <a16:creationId xmlns:a16="http://schemas.microsoft.com/office/drawing/2014/main" id="{4F408152-6920-171F-4C35-84CA4622483A}"/>
+              </a:ext>
+            </a:extLst>
+          </p:cNvPr>
+          <p:cNvSpPr/>
+          <p:nvPr/>
+        </p:nvSpPr>
+        <p:spPr>
+          <a:xfrm>
+            <a:off x="626805" y="1882879"/>
+            <a:ext cx="7250369" cy="3727346"/>
+          </a:xfrm>
+          <a:prstGeom prst="roundRect">
+            <a:avLst/>
+          </a:prstGeom>
+          <a:ln/>
+        </p:spPr>
+        <p:style>
+          <a:lnRef idx="2">
+            <a:schemeClr val="dk1"/>
+          </a:lnRef>
+          <a:fillRef idx="1">
+            <a:schemeClr val="lt1"/>
+          </a:fillRef>
+          <a:effectRef idx="0">
+            <a:schemeClr val="dk1"/>
+          </a:effectRef>
+          <a:fontRef idx="minor">
+            <a:schemeClr val="dk1"/>
+          </a:fontRef>
+        </p:style>
+        <p:txBody>
+          <a:bodyPr rtlCol="0" anchor="ctr"/>
+          <a:lstStyle/>
+          <a:p>
+            <a:pPr algn="ctr"/>
+            <a:endParaRPr lang="en-GB"/>
+          </a:p>
+        </p:txBody>
+      </p:sp>
+      <p:sp>
+        <p:nvSpPr>
+          <p:cNvPr id="9" name="Rectangle: Rounded Corners 8">
+            <a:extLst>
+              <a:ext uri="{FF2B5EF4-FFF2-40B4-BE49-F238E27FC236}">
+                <a16:creationId xmlns:a16="http://schemas.microsoft.com/office/drawing/2014/main" id="{B9F7406A-6577-D0A4-8E0B-666CADCC4778}"/>
+              </a:ext>
+            </a:extLst>
+          </p:cNvPr>
+          <p:cNvSpPr/>
+          <p:nvPr/>
+        </p:nvSpPr>
+        <p:spPr>
+          <a:xfrm>
+            <a:off x="828064" y="2568677"/>
+            <a:ext cx="6090769" cy="1720646"/>
+          </a:xfrm>
+          <a:prstGeom prst="roundRect">
+            <a:avLst/>
+          </a:prstGeom>
+          <a:ln/>
+        </p:spPr>
+        <p:style>
+          <a:lnRef idx="2">
+            <a:schemeClr val="dk1"/>
+          </a:lnRef>
+          <a:fillRef idx="1">
+            <a:schemeClr val="lt1"/>
+          </a:fillRef>
+          <a:effectRef idx="0">
+            <a:schemeClr val="dk1"/>
+          </a:effectRef>
+          <a:fontRef idx="minor">
+            <a:schemeClr val="dk1"/>
+          </a:fontRef>
+        </p:style>
+        <p:txBody>
+          <a:bodyPr rtlCol="0" anchor="ctr"/>
+          <a:lstStyle/>
+          <a:p>
+            <a:pPr algn="ctr"/>
+            <a:endParaRPr lang="en-GB"/>
+          </a:p>
+        </p:txBody>
+      </p:sp>
+      <p:sp>
+        <p:nvSpPr>
+          <p:cNvPr id="10" name="Rectangle: Rounded Corners 9">
+            <a:extLst>
+              <a:ext uri="{FF2B5EF4-FFF2-40B4-BE49-F238E27FC236}">
+                <a16:creationId xmlns:a16="http://schemas.microsoft.com/office/drawing/2014/main" id="{05D4FCE5-19D0-D317-197A-3372702530DF}"/>
+              </a:ext>
+            </a:extLst>
+          </p:cNvPr>
+          <p:cNvSpPr/>
+          <p:nvPr/>
+        </p:nvSpPr>
+        <p:spPr>
+          <a:xfrm>
+            <a:off x="1003809" y="4535126"/>
+            <a:ext cx="5997065" cy="879989"/>
+          </a:xfrm>
+          <a:prstGeom prst="roundRect">
+            <a:avLst/>
+          </a:prstGeom>
+          <a:ln/>
+        </p:spPr>
+        <p:style>
+          <a:lnRef idx="2">
+            <a:schemeClr val="dk1"/>
+          </a:lnRef>
+          <a:fillRef idx="1">
+            <a:schemeClr val="lt1"/>
+          </a:fillRef>
+          <a:effectRef idx="0">
+            <a:schemeClr val="dk1"/>
+          </a:effectRef>
+          <a:fontRef idx="minor">
+            <a:schemeClr val="dk1"/>
+          </a:fontRef>
+        </p:style>
+        <p:txBody>
+          <a:bodyPr rtlCol="0" anchor="ctr"/>
+          <a:lstStyle/>
+          <a:p>
+            <a:pPr algn="ctr"/>
+            <a:endParaRPr lang="en-GB"/>
+          </a:p>
+        </p:txBody>
+      </p:sp>
+      <p:sp>
+        <p:nvSpPr>
+          <p:cNvPr id="17" name="TextBox 16">
+            <a:extLst>
+              <a:ext uri="{FF2B5EF4-FFF2-40B4-BE49-F238E27FC236}">
+                <a16:creationId xmlns:a16="http://schemas.microsoft.com/office/drawing/2014/main" id="{9AD91184-7105-E8E9-D7EF-6E91EFDD55F3}"/>
+              </a:ext>
+            </a:extLst>
+          </p:cNvPr>
+          <p:cNvSpPr txBox="1"/>
+          <p:nvPr/>
+        </p:nvSpPr>
+        <p:spPr>
+          <a:xfrm>
+            <a:off x="828065" y="2085963"/>
+            <a:ext cx="2846439" cy="369332"/>
+          </a:xfrm>
+          <a:prstGeom prst="rect">
+            <a:avLst/>
+          </a:prstGeom>
+          <a:noFill/>
+        </p:spPr>
+        <p:txBody>
+          <a:bodyPr wrap="square" rtlCol="0">
+            <a:spAutoFit/>
+          </a:bodyPr>
+          <a:lstStyle/>
+          <a:p>
+            <a:r>
+              <a:rPr lang="en-GB" dirty="0"/>
+              <a:t>SIMULATION CONTROLS</a:t>
+            </a:r>
+          </a:p>
+        </p:txBody>
+      </p:sp>
+    </p:spTree>
+    <p:extLst>
+      <p:ext uri="{BB962C8B-B14F-4D97-AF65-F5344CB8AC3E}">
+        <p14:creationId xmlns:p14="http://schemas.microsoft.com/office/powerpoint/2010/main" val="3369075426"/>
+      </p:ext>
+    </p:extLst>
+  </p:cSld>
+  <p:clrMapOvr>
+    <a:masterClrMapping/>
+  </p:clrMapOvr>
+</p:sld>
+</file>
+
 <file path=ppt/theme/theme1.xml><?xml version="1.0" encoding="utf-8"?>
 <a:theme xmlns:a="http://schemas.openxmlformats.org/drawingml/2006/main" name="Office Theme">
   <a:themeElements>

</xml_diff>

<commit_message>
updated ppt NSWE and yaw images
</commit_message>
<xml_diff>
--- a/New Microsoft PowerPoint Presentation.pptx
+++ b/New Microsoft PowerPoint Presentation.pptx
@@ -10,9 +10,10 @@
     <p:sldId id="257" r:id="rId4"/>
     <p:sldId id="258" r:id="rId5"/>
     <p:sldId id="259" r:id="rId6"/>
-    <p:sldId id="263" r:id="rId7"/>
-    <p:sldId id="261" r:id="rId8"/>
-    <p:sldId id="262" r:id="rId9"/>
+    <p:sldId id="264" r:id="rId7"/>
+    <p:sldId id="263" r:id="rId8"/>
+    <p:sldId id="261" r:id="rId9"/>
+    <p:sldId id="262" r:id="rId10"/>
   </p:sldIdLst>
   <p:sldSz cx="12192000" cy="6858000"/>
   <p:notesSz cx="6858000" cy="9144000"/>
@@ -266,7 +267,7 @@
           <a:p>
             <a:fld id="{CC3F78A9-85ED-4B6C-98BF-75BF2C235F5D}" type="datetimeFigureOut">
               <a:rPr lang="en-GB" smtClean="0"/>
-              <a:t>06/10/2025</a:t>
+              <a:t>08/10/2025</a:t>
             </a:fld>
             <a:endParaRPr lang="en-GB"/>
           </a:p>
@@ -464,7 +465,7 @@
           <a:p>
             <a:fld id="{CC3F78A9-85ED-4B6C-98BF-75BF2C235F5D}" type="datetimeFigureOut">
               <a:rPr lang="en-GB" smtClean="0"/>
-              <a:t>06/10/2025</a:t>
+              <a:t>08/10/2025</a:t>
             </a:fld>
             <a:endParaRPr lang="en-GB"/>
           </a:p>
@@ -672,7 +673,7 @@
           <a:p>
             <a:fld id="{CC3F78A9-85ED-4B6C-98BF-75BF2C235F5D}" type="datetimeFigureOut">
               <a:rPr lang="en-GB" smtClean="0"/>
-              <a:t>06/10/2025</a:t>
+              <a:t>08/10/2025</a:t>
             </a:fld>
             <a:endParaRPr lang="en-GB"/>
           </a:p>
@@ -870,7 +871,7 @@
           <a:p>
             <a:fld id="{CC3F78A9-85ED-4B6C-98BF-75BF2C235F5D}" type="datetimeFigureOut">
               <a:rPr lang="en-GB" smtClean="0"/>
-              <a:t>06/10/2025</a:t>
+              <a:t>08/10/2025</a:t>
             </a:fld>
             <a:endParaRPr lang="en-GB"/>
           </a:p>
@@ -1145,7 +1146,7 @@
           <a:p>
             <a:fld id="{CC3F78A9-85ED-4B6C-98BF-75BF2C235F5D}" type="datetimeFigureOut">
               <a:rPr lang="en-GB" smtClean="0"/>
-              <a:t>06/10/2025</a:t>
+              <a:t>08/10/2025</a:t>
             </a:fld>
             <a:endParaRPr lang="en-GB"/>
           </a:p>
@@ -1410,7 +1411,7 @@
           <a:p>
             <a:fld id="{CC3F78A9-85ED-4B6C-98BF-75BF2C235F5D}" type="datetimeFigureOut">
               <a:rPr lang="en-GB" smtClean="0"/>
-              <a:t>06/10/2025</a:t>
+              <a:t>08/10/2025</a:t>
             </a:fld>
             <a:endParaRPr lang="en-GB"/>
           </a:p>
@@ -1822,7 +1823,7 @@
           <a:p>
             <a:fld id="{CC3F78A9-85ED-4B6C-98BF-75BF2C235F5D}" type="datetimeFigureOut">
               <a:rPr lang="en-GB" smtClean="0"/>
-              <a:t>06/10/2025</a:t>
+              <a:t>08/10/2025</a:t>
             </a:fld>
             <a:endParaRPr lang="en-GB"/>
           </a:p>
@@ -1963,7 +1964,7 @@
           <a:p>
             <a:fld id="{CC3F78A9-85ED-4B6C-98BF-75BF2C235F5D}" type="datetimeFigureOut">
               <a:rPr lang="en-GB" smtClean="0"/>
-              <a:t>06/10/2025</a:t>
+              <a:t>08/10/2025</a:t>
             </a:fld>
             <a:endParaRPr lang="en-GB"/>
           </a:p>
@@ -2076,7 +2077,7 @@
           <a:p>
             <a:fld id="{CC3F78A9-85ED-4B6C-98BF-75BF2C235F5D}" type="datetimeFigureOut">
               <a:rPr lang="en-GB" smtClean="0"/>
-              <a:t>06/10/2025</a:t>
+              <a:t>08/10/2025</a:t>
             </a:fld>
             <a:endParaRPr lang="en-GB"/>
           </a:p>
@@ -2387,7 +2388,7 @@
           <a:p>
             <a:fld id="{CC3F78A9-85ED-4B6C-98BF-75BF2C235F5D}" type="datetimeFigureOut">
               <a:rPr lang="en-GB" smtClean="0"/>
-              <a:t>06/10/2025</a:t>
+              <a:t>08/10/2025</a:t>
             </a:fld>
             <a:endParaRPr lang="en-GB"/>
           </a:p>
@@ -2675,7 +2676,7 @@
           <a:p>
             <a:fld id="{CC3F78A9-85ED-4B6C-98BF-75BF2C235F5D}" type="datetimeFigureOut">
               <a:rPr lang="en-GB" smtClean="0"/>
-              <a:t>06/10/2025</a:t>
+              <a:t>08/10/2025</a:t>
             </a:fld>
             <a:endParaRPr lang="en-GB"/>
           </a:p>
@@ -2916,7 +2917,7 @@
           <a:p>
             <a:fld id="{CC3F78A9-85ED-4B6C-98BF-75BF2C235F5D}" type="datetimeFigureOut">
               <a:rPr lang="en-GB" smtClean="0"/>
-              <a:t>06/10/2025</a:t>
+              <a:t>08/10/2025</a:t>
             </a:fld>
             <a:endParaRPr lang="en-GB"/>
           </a:p>
@@ -10780,6 +10781,1505 @@
       </p:grpSpPr>
       <p:grpSp>
         <p:nvGrpSpPr>
+          <p:cNvPr id="24" name="Group 23">
+            <a:extLst>
+              <a:ext uri="{FF2B5EF4-FFF2-40B4-BE49-F238E27FC236}">
+                <a16:creationId xmlns:a16="http://schemas.microsoft.com/office/drawing/2014/main" id="{AE70B363-C159-DE63-A481-883A4DECEEEE}"/>
+              </a:ext>
+            </a:extLst>
+          </p:cNvPr>
+          <p:cNvGrpSpPr/>
+          <p:nvPr/>
+        </p:nvGrpSpPr>
+        <p:grpSpPr>
+          <a:xfrm rot="20700000">
+            <a:off x="3628333" y="2163838"/>
+            <a:ext cx="2775920" cy="2775920"/>
+            <a:chOff x="7378485" y="2192066"/>
+            <a:chExt cx="2775920" cy="2775920"/>
+          </a:xfrm>
+        </p:grpSpPr>
+        <p:sp>
+          <p:nvSpPr>
+            <p:cNvPr id="25" name="Oval 24">
+              <a:extLst>
+                <a:ext uri="{FF2B5EF4-FFF2-40B4-BE49-F238E27FC236}">
+                  <a16:creationId xmlns:a16="http://schemas.microsoft.com/office/drawing/2014/main" id="{4949EE86-DE80-A32F-DE9E-476E92926FE0}"/>
+                </a:ext>
+              </a:extLst>
+            </p:cNvPr>
+            <p:cNvSpPr/>
+            <p:nvPr/>
+          </p:nvSpPr>
+          <p:spPr>
+            <a:xfrm>
+              <a:off x="7378485" y="2192066"/>
+              <a:ext cx="2775920" cy="2775920"/>
+            </a:xfrm>
+            <a:prstGeom prst="ellipse">
+              <a:avLst/>
+            </a:prstGeom>
+            <a:noFill/>
+            <a:ln w="9525" cap="flat" cmpd="sng" algn="ctr">
+              <a:solidFill>
+                <a:schemeClr val="accent1"/>
+              </a:solidFill>
+              <a:prstDash val="solid"/>
+              <a:round/>
+              <a:headEnd type="none" w="med" len="med"/>
+              <a:tailEnd type="none" w="med" len="med"/>
+            </a:ln>
+          </p:spPr>
+          <p:style>
+            <a:lnRef idx="0">
+              <a:scrgbClr r="0" g="0" b="0"/>
+            </a:lnRef>
+            <a:fillRef idx="0">
+              <a:scrgbClr r="0" g="0" b="0"/>
+            </a:fillRef>
+            <a:effectRef idx="0">
+              <a:scrgbClr r="0" g="0" b="0"/>
+            </a:effectRef>
+            <a:fontRef idx="minor">
+              <a:schemeClr val="accent1"/>
+            </a:fontRef>
+          </p:style>
+          <p:txBody>
+            <a:bodyPr rtlCol="0" anchor="ctr"/>
+            <a:lstStyle/>
+            <a:p>
+              <a:pPr algn="ctr"/>
+              <a:endParaRPr lang="en-GB" dirty="0"/>
+            </a:p>
+          </p:txBody>
+        </p:sp>
+        <p:pic>
+          <p:nvPicPr>
+            <p:cNvPr id="26" name="Picture 25">
+              <a:extLst>
+                <a:ext uri="{FF2B5EF4-FFF2-40B4-BE49-F238E27FC236}">
+                  <a16:creationId xmlns:a16="http://schemas.microsoft.com/office/drawing/2014/main" id="{BE5DB91C-A150-2678-F850-7615E9810490}"/>
+                </a:ext>
+              </a:extLst>
+            </p:cNvPr>
+            <p:cNvPicPr>
+              <a:picLocks noChangeAspect="1"/>
+            </p:cNvPicPr>
+            <p:nvPr/>
+          </p:nvPicPr>
+          <p:blipFill>
+            <a:blip r:embed="rId2"/>
+            <a:stretch>
+              <a:fillRect/>
+            </a:stretch>
+          </p:blipFill>
+          <p:spPr>
+            <a:xfrm>
+              <a:off x="7473240" y="3076280"/>
+              <a:ext cx="2500210" cy="758322"/>
+            </a:xfrm>
+            <a:prstGeom prst="rect">
+              <a:avLst/>
+            </a:prstGeom>
+          </p:spPr>
+        </p:pic>
+      </p:grpSp>
+      <p:cxnSp>
+        <p:nvCxnSpPr>
+          <p:cNvPr id="35" name="Straight Connector 34">
+            <a:extLst>
+              <a:ext uri="{FF2B5EF4-FFF2-40B4-BE49-F238E27FC236}">
+                <a16:creationId xmlns:a16="http://schemas.microsoft.com/office/drawing/2014/main" id="{722E8DA1-61A0-43B9-B964-23C81D673C37}"/>
+              </a:ext>
+            </a:extLst>
+          </p:cNvPr>
+          <p:cNvCxnSpPr/>
+          <p:nvPr/>
+        </p:nvCxnSpPr>
+        <p:spPr>
+          <a:xfrm>
+            <a:off x="4997243" y="1678360"/>
+            <a:ext cx="0" cy="4100510"/>
+          </a:xfrm>
+          <a:prstGeom prst="line">
+            <a:avLst/>
+          </a:prstGeom>
+          <a:ln>
+            <a:prstDash val="dash"/>
+          </a:ln>
+        </p:spPr>
+        <p:style>
+          <a:lnRef idx="1">
+            <a:schemeClr val="accent1"/>
+          </a:lnRef>
+          <a:fillRef idx="0">
+            <a:schemeClr val="accent1"/>
+          </a:fillRef>
+          <a:effectRef idx="0">
+            <a:schemeClr val="accent1"/>
+          </a:effectRef>
+          <a:fontRef idx="minor">
+            <a:schemeClr val="tx1"/>
+          </a:fontRef>
+        </p:style>
+      </p:cxnSp>
+      <p:cxnSp>
+        <p:nvCxnSpPr>
+          <p:cNvPr id="36" name="Straight Connector 35">
+            <a:extLst>
+              <a:ext uri="{FF2B5EF4-FFF2-40B4-BE49-F238E27FC236}">
+                <a16:creationId xmlns:a16="http://schemas.microsoft.com/office/drawing/2014/main" id="{C28E7457-2BBB-681F-B7C0-95F01E0DB42B}"/>
+              </a:ext>
+            </a:extLst>
+          </p:cNvPr>
+          <p:cNvCxnSpPr>
+            <a:stCxn id="26" idx="0"/>
+          </p:cNvCxnSpPr>
+          <p:nvPr/>
+        </p:nvCxnSpPr>
+        <p:spPr>
+          <a:xfrm>
+            <a:off x="4844283" y="3076372"/>
+            <a:ext cx="332408" cy="1056034"/>
+          </a:xfrm>
+          <a:prstGeom prst="line">
+            <a:avLst/>
+          </a:prstGeom>
+        </p:spPr>
+        <p:style>
+          <a:lnRef idx="1">
+            <a:schemeClr val="accent1"/>
+          </a:lnRef>
+          <a:fillRef idx="0">
+            <a:schemeClr val="accent1"/>
+          </a:fillRef>
+          <a:effectRef idx="0">
+            <a:schemeClr val="accent1"/>
+          </a:effectRef>
+          <a:fontRef idx="minor">
+            <a:schemeClr val="tx1"/>
+          </a:fontRef>
+        </p:style>
+      </p:cxnSp>
+      <p:sp>
+        <p:nvSpPr>
+          <p:cNvPr id="52" name="Arc 51">
+            <a:extLst>
+              <a:ext uri="{FF2B5EF4-FFF2-40B4-BE49-F238E27FC236}">
+                <a16:creationId xmlns:a16="http://schemas.microsoft.com/office/drawing/2014/main" id="{E7752735-9AF8-0766-305E-1B90EC7195D9}"/>
+              </a:ext>
+            </a:extLst>
+          </p:cNvPr>
+          <p:cNvSpPr/>
+          <p:nvPr/>
+        </p:nvSpPr>
+        <p:spPr>
+          <a:xfrm rot="7396005">
+            <a:off x="4990021" y="3761052"/>
+            <a:ext cx="90646" cy="90646"/>
+          </a:xfrm>
+          <a:prstGeom prst="arc">
+            <a:avLst/>
+          </a:prstGeom>
+          <a:ln>
+            <a:solidFill>
+              <a:schemeClr val="tx1"/>
+            </a:solidFill>
+          </a:ln>
+        </p:spPr>
+        <p:style>
+          <a:lnRef idx="1">
+            <a:schemeClr val="accent1"/>
+          </a:lnRef>
+          <a:fillRef idx="0">
+            <a:schemeClr val="accent1"/>
+          </a:fillRef>
+          <a:effectRef idx="0">
+            <a:schemeClr val="accent1"/>
+          </a:effectRef>
+          <a:fontRef idx="minor">
+            <a:schemeClr val="tx1"/>
+          </a:fontRef>
+        </p:style>
+        <p:txBody>
+          <a:bodyPr rtlCol="0" anchor="ctr"/>
+          <a:lstStyle/>
+          <a:p>
+            <a:pPr algn="ctr"/>
+            <a:endParaRPr lang="en-GB"/>
+          </a:p>
+        </p:txBody>
+      </p:sp>
+      <mc:AlternateContent xmlns:mc="http://schemas.openxmlformats.org/markup-compatibility/2006">
+        <mc:Choice xmlns:a14="http://schemas.microsoft.com/office/drawing/2010/main" Requires="a14">
+          <p:sp>
+            <p:nvSpPr>
+              <p:cNvPr id="55" name="TextBox 54">
+                <a:extLst>
+                  <a:ext uri="{FF2B5EF4-FFF2-40B4-BE49-F238E27FC236}">
+                    <a16:creationId xmlns:a16="http://schemas.microsoft.com/office/drawing/2014/main" id="{A75E6163-0F81-E602-2FDD-A7FEA64433FB}"/>
+                  </a:ext>
+                </a:extLst>
+              </p:cNvPr>
+              <p:cNvSpPr txBox="1"/>
+              <p:nvPr/>
+            </p:nvSpPr>
+            <p:spPr>
+              <a:xfrm>
+                <a:off x="5016293" y="3905200"/>
+                <a:ext cx="109774" cy="161583"/>
+              </a:xfrm>
+              <a:prstGeom prst="rect">
+                <a:avLst/>
+              </a:prstGeom>
+              <a:noFill/>
+            </p:spPr>
+            <p:txBody>
+              <a:bodyPr wrap="none" lIns="0" tIns="0" rIns="0" bIns="0" rtlCol="0">
+                <a:spAutoFit/>
+              </a:bodyPr>
+              <a:lstStyle/>
+              <a:p>
+                <a:pPr/>
+                <a14:m>
+                  <m:oMathPara xmlns:m="http://schemas.openxmlformats.org/officeDocument/2006/math">
+                    <m:oMathParaPr>
+                      <m:jc m:val="centerGroup"/>
+                    </m:oMathParaPr>
+                    <m:oMath xmlns:m="http://schemas.openxmlformats.org/officeDocument/2006/math">
+                      <m:r>
+                        <a:rPr lang="en-GB" sz="1050" i="1" smtClean="0">
+                          <a:latin typeface="Cambria Math" panose="02040503050406030204" pitchFamily="18" charset="0"/>
+                          <a:ea typeface="Cambria Math" panose="02040503050406030204" pitchFamily="18" charset="0"/>
+                        </a:rPr>
+                        <m:t>𝜃</m:t>
+                      </m:r>
+                    </m:oMath>
+                  </m:oMathPara>
+                </a14:m>
+                <a:endParaRPr lang="en-GB" dirty="0"/>
+              </a:p>
+            </p:txBody>
+          </p:sp>
+        </mc:Choice>
+        <mc:Fallback>
+          <p:sp>
+            <p:nvSpPr>
+              <p:cNvPr id="55" name="TextBox 54">
+                <a:extLst>
+                  <a:ext uri="{FF2B5EF4-FFF2-40B4-BE49-F238E27FC236}">
+                    <a16:creationId xmlns:a16="http://schemas.microsoft.com/office/drawing/2014/main" id="{A75E6163-0F81-E602-2FDD-A7FEA64433FB}"/>
+                  </a:ext>
+                </a:extLst>
+              </p:cNvPr>
+              <p:cNvSpPr txBox="1">
+                <a:spLocks noRot="1" noChangeAspect="1" noMove="1" noResize="1" noEditPoints="1" noAdjustHandles="1" noChangeArrowheads="1" noChangeShapeType="1" noTextEdit="1"/>
+              </p:cNvSpPr>
+              <p:nvPr/>
+            </p:nvSpPr>
+            <p:spPr>
+              <a:xfrm>
+                <a:off x="5016293" y="3905200"/>
+                <a:ext cx="109774" cy="161583"/>
+              </a:xfrm>
+              <a:prstGeom prst="rect">
+                <a:avLst/>
+              </a:prstGeom>
+              <a:blipFill>
+                <a:blip r:embed="rId3"/>
+                <a:stretch>
+                  <a:fillRect l="-27778" r="-27778" b="-7692"/>
+                </a:stretch>
+              </a:blipFill>
+            </p:spPr>
+            <p:txBody>
+              <a:bodyPr/>
+              <a:lstStyle/>
+              <a:p>
+                <a:r>
+                  <a:rPr lang="en-GB">
+                    <a:noFill/>
+                  </a:rPr>
+                  <a:t> </a:t>
+                </a:r>
+              </a:p>
+            </p:txBody>
+          </p:sp>
+        </mc:Fallback>
+      </mc:AlternateContent>
+      <p:grpSp>
+        <p:nvGrpSpPr>
+          <p:cNvPr id="103" name="Group 102">
+            <a:extLst>
+              <a:ext uri="{FF2B5EF4-FFF2-40B4-BE49-F238E27FC236}">
+                <a16:creationId xmlns:a16="http://schemas.microsoft.com/office/drawing/2014/main" id="{DF03BD27-A5FE-B7A8-C5BC-2624B670E7F2}"/>
+              </a:ext>
+            </a:extLst>
+          </p:cNvPr>
+          <p:cNvGrpSpPr/>
+          <p:nvPr/>
+        </p:nvGrpSpPr>
+        <p:grpSpPr>
+          <a:xfrm>
+            <a:off x="6127341" y="1332162"/>
+            <a:ext cx="1564012" cy="1157892"/>
+            <a:chOff x="7397044" y="1826981"/>
+            <a:chExt cx="1564012" cy="1157892"/>
+          </a:xfrm>
+        </p:grpSpPr>
+        <p:grpSp>
+          <p:nvGrpSpPr>
+            <p:cNvPr id="100" name="Group 99">
+              <a:extLst>
+                <a:ext uri="{FF2B5EF4-FFF2-40B4-BE49-F238E27FC236}">
+                  <a16:creationId xmlns:a16="http://schemas.microsoft.com/office/drawing/2014/main" id="{7EB48CE2-D522-1D64-F3F9-5D21CF60EE85}"/>
+                </a:ext>
+              </a:extLst>
+            </p:cNvPr>
+            <p:cNvGrpSpPr/>
+            <p:nvPr/>
+          </p:nvGrpSpPr>
+          <p:grpSpPr>
+            <a:xfrm>
+              <a:off x="7397044" y="1826981"/>
+              <a:ext cx="1197329" cy="1157892"/>
+              <a:chOff x="7397044" y="1826981"/>
+              <a:chExt cx="1197329" cy="1157892"/>
+            </a:xfrm>
+          </p:grpSpPr>
+          <p:sp>
+            <p:nvSpPr>
+              <p:cNvPr id="98" name="Arc 97">
+                <a:extLst>
+                  <a:ext uri="{FF2B5EF4-FFF2-40B4-BE49-F238E27FC236}">
+                    <a16:creationId xmlns:a16="http://schemas.microsoft.com/office/drawing/2014/main" id="{8C3A8CB9-4177-0CF3-42FF-31088089AAE3}"/>
+                  </a:ext>
+                </a:extLst>
+              </p:cNvPr>
+              <p:cNvSpPr/>
+              <p:nvPr/>
+            </p:nvSpPr>
+            <p:spPr>
+              <a:xfrm rot="4618857">
+                <a:off x="7416763" y="1807262"/>
+                <a:ext cx="1157892" cy="1197329"/>
+              </a:xfrm>
+              <a:prstGeom prst="arc">
+                <a:avLst>
+                  <a:gd name="adj1" fmla="val 17539082"/>
+                  <a:gd name="adj2" fmla="val 20763886"/>
+                </a:avLst>
+              </a:prstGeom>
+            </p:spPr>
+            <p:style>
+              <a:lnRef idx="2">
+                <a:schemeClr val="accent1"/>
+              </a:lnRef>
+              <a:fillRef idx="0">
+                <a:schemeClr val="accent1"/>
+              </a:fillRef>
+              <a:effectRef idx="1">
+                <a:schemeClr val="accent1"/>
+              </a:effectRef>
+              <a:fontRef idx="minor">
+                <a:schemeClr val="tx1"/>
+              </a:fontRef>
+            </p:style>
+            <p:txBody>
+              <a:bodyPr rtlCol="0" anchor="ctr"/>
+              <a:lstStyle/>
+              <a:p>
+                <a:pPr algn="ctr"/>
+                <a:endParaRPr lang="en-GB"/>
+              </a:p>
+            </p:txBody>
+          </p:sp>
+          <p:sp>
+            <p:nvSpPr>
+              <p:cNvPr id="99" name="Isosceles Triangle 98">
+                <a:extLst>
+                  <a:ext uri="{FF2B5EF4-FFF2-40B4-BE49-F238E27FC236}">
+                    <a16:creationId xmlns:a16="http://schemas.microsoft.com/office/drawing/2014/main" id="{235ABB20-0EA1-C6A7-46B8-6B2D0465A522}"/>
+                  </a:ext>
+                </a:extLst>
+              </p:cNvPr>
+              <p:cNvSpPr/>
+              <p:nvPr/>
+            </p:nvSpPr>
+            <p:spPr>
+              <a:xfrm rot="14734878">
+                <a:off x="8189733" y="2885960"/>
+                <a:ext cx="48570" cy="114725"/>
+              </a:xfrm>
+              <a:prstGeom prst="triangle">
+                <a:avLst>
+                  <a:gd name="adj" fmla="val 86933"/>
+                </a:avLst>
+              </a:prstGeom>
+            </p:spPr>
+            <p:style>
+              <a:lnRef idx="2">
+                <a:schemeClr val="accent1">
+                  <a:shade val="15000"/>
+                </a:schemeClr>
+              </a:lnRef>
+              <a:fillRef idx="1">
+                <a:schemeClr val="accent1"/>
+              </a:fillRef>
+              <a:effectRef idx="0">
+                <a:schemeClr val="accent1"/>
+              </a:effectRef>
+              <a:fontRef idx="minor">
+                <a:schemeClr val="lt1"/>
+              </a:fontRef>
+            </p:style>
+            <p:txBody>
+              <a:bodyPr rtlCol="0" anchor="ctr"/>
+              <a:lstStyle/>
+              <a:p>
+                <a:pPr algn="ctr"/>
+                <a:endParaRPr lang="en-GB"/>
+              </a:p>
+            </p:txBody>
+          </p:sp>
+        </p:grpSp>
+        <p:grpSp>
+          <p:nvGrpSpPr>
+            <p:cNvPr id="102" name="Group 101">
+              <a:extLst>
+                <a:ext uri="{FF2B5EF4-FFF2-40B4-BE49-F238E27FC236}">
+                  <a16:creationId xmlns:a16="http://schemas.microsoft.com/office/drawing/2014/main" id="{0734C665-3102-D50D-FD9B-CA1928B62E0B}"/>
+                </a:ext>
+              </a:extLst>
+            </p:cNvPr>
+            <p:cNvGrpSpPr/>
+            <p:nvPr/>
+          </p:nvGrpSpPr>
+          <p:grpSpPr>
+            <a:xfrm>
+              <a:off x="7661293" y="2123016"/>
+              <a:ext cx="1299763" cy="794562"/>
+              <a:chOff x="7661293" y="2123016"/>
+              <a:chExt cx="1299763" cy="794562"/>
+            </a:xfrm>
+          </p:grpSpPr>
+          <p:grpSp>
+            <p:nvGrpSpPr>
+              <p:cNvPr id="73" name="Group 72">
+                <a:extLst>
+                  <a:ext uri="{FF2B5EF4-FFF2-40B4-BE49-F238E27FC236}">
+                    <a16:creationId xmlns:a16="http://schemas.microsoft.com/office/drawing/2014/main" id="{0FACDEEE-5308-2040-8460-5511B15C177C}"/>
+                  </a:ext>
+                </a:extLst>
+              </p:cNvPr>
+              <p:cNvGrpSpPr/>
+              <p:nvPr/>
+            </p:nvGrpSpPr>
+            <p:grpSpPr>
+              <a:xfrm>
+                <a:off x="7661293" y="2123016"/>
+                <a:ext cx="1299763" cy="794562"/>
+                <a:chOff x="7661293" y="2123016"/>
+                <a:chExt cx="1299763" cy="794562"/>
+              </a:xfrm>
+            </p:grpSpPr>
+            <p:grpSp>
+              <p:nvGrpSpPr>
+                <p:cNvPr id="69" name="Group 68">
+                  <a:extLst>
+                    <a:ext uri="{FF2B5EF4-FFF2-40B4-BE49-F238E27FC236}">
+                      <a16:creationId xmlns:a16="http://schemas.microsoft.com/office/drawing/2014/main" id="{5389DF24-D112-2CDD-919A-CAF086FDEC12}"/>
+                    </a:ext>
+                  </a:extLst>
+                </p:cNvPr>
+                <p:cNvGrpSpPr/>
+                <p:nvPr/>
+              </p:nvGrpSpPr>
+              <p:grpSpPr>
+                <a:xfrm>
+                  <a:off x="7916793" y="2310280"/>
+                  <a:ext cx="397510" cy="442540"/>
+                  <a:chOff x="7863840" y="1678360"/>
+                  <a:chExt cx="397510" cy="442540"/>
+                </a:xfrm>
+              </p:grpSpPr>
+              <p:cxnSp>
+                <p:nvCxnSpPr>
+                  <p:cNvPr id="62" name="Straight Arrow Connector 61">
+                    <a:extLst>
+                      <a:ext uri="{FF2B5EF4-FFF2-40B4-BE49-F238E27FC236}">
+                        <a16:creationId xmlns:a16="http://schemas.microsoft.com/office/drawing/2014/main" id="{97029C12-9CA8-1E19-E79B-B41A947FF8A0}"/>
+                      </a:ext>
+                    </a:extLst>
+                  </p:cNvPr>
+                  <p:cNvCxnSpPr>
+                    <a:cxnSpLocks/>
+                  </p:cNvCxnSpPr>
+                  <p:nvPr/>
+                </p:nvCxnSpPr>
+                <p:spPr>
+                  <a:xfrm>
+                    <a:off x="7863840" y="1678360"/>
+                    <a:ext cx="0" cy="442540"/>
+                  </a:xfrm>
+                  <a:prstGeom prst="straightConnector1">
+                    <a:avLst/>
+                  </a:prstGeom>
+                  <a:ln>
+                    <a:tailEnd type="triangle"/>
+                  </a:ln>
+                </p:spPr>
+                <p:style>
+                  <a:lnRef idx="2">
+                    <a:schemeClr val="accent1"/>
+                  </a:lnRef>
+                  <a:fillRef idx="0">
+                    <a:schemeClr val="accent1"/>
+                  </a:fillRef>
+                  <a:effectRef idx="1">
+                    <a:schemeClr val="accent1"/>
+                  </a:effectRef>
+                  <a:fontRef idx="minor">
+                    <a:schemeClr val="tx1"/>
+                  </a:fontRef>
+                </p:style>
+              </p:cxnSp>
+              <p:cxnSp>
+                <p:nvCxnSpPr>
+                  <p:cNvPr id="63" name="Straight Arrow Connector 62">
+                    <a:extLst>
+                      <a:ext uri="{FF2B5EF4-FFF2-40B4-BE49-F238E27FC236}">
+                        <a16:creationId xmlns:a16="http://schemas.microsoft.com/office/drawing/2014/main" id="{56B7EF24-58D6-D99B-BC2D-0A60E433E093}"/>
+                      </a:ext>
+                    </a:extLst>
+                  </p:cNvPr>
+                  <p:cNvCxnSpPr>
+                    <a:cxnSpLocks/>
+                  </p:cNvCxnSpPr>
+                  <p:nvPr/>
+                </p:nvCxnSpPr>
+                <p:spPr>
+                  <a:xfrm>
+                    <a:off x="7863840" y="1678360"/>
+                    <a:ext cx="397510" cy="0"/>
+                  </a:xfrm>
+                  <a:prstGeom prst="straightConnector1">
+                    <a:avLst/>
+                  </a:prstGeom>
+                  <a:ln>
+                    <a:tailEnd type="triangle"/>
+                  </a:ln>
+                </p:spPr>
+                <p:style>
+                  <a:lnRef idx="2">
+                    <a:schemeClr val="accent1"/>
+                  </a:lnRef>
+                  <a:fillRef idx="0">
+                    <a:schemeClr val="accent1"/>
+                  </a:fillRef>
+                  <a:effectRef idx="1">
+                    <a:schemeClr val="accent1"/>
+                  </a:effectRef>
+                  <a:fontRef idx="minor">
+                    <a:schemeClr val="tx1"/>
+                  </a:fontRef>
+                </p:style>
+              </p:cxnSp>
+            </p:grpSp>
+            <p:sp>
+              <p:nvSpPr>
+                <p:cNvPr id="70" name="TextBox 69">
+                  <a:extLst>
+                    <a:ext uri="{FF2B5EF4-FFF2-40B4-BE49-F238E27FC236}">
+                      <a16:creationId xmlns:a16="http://schemas.microsoft.com/office/drawing/2014/main" id="{C3E2EDFC-5C2E-785F-63E8-6CD39AA6FF9F}"/>
+                    </a:ext>
+                  </a:extLst>
+                </p:cNvPr>
+                <p:cNvSpPr txBox="1"/>
+                <p:nvPr/>
+              </p:nvSpPr>
+              <p:spPr>
+                <a:xfrm>
+                  <a:off x="7919766" y="2686746"/>
+                  <a:ext cx="248331" cy="230832"/>
+                </a:xfrm>
+                <a:prstGeom prst="rect">
+                  <a:avLst/>
+                </a:prstGeom>
+                <a:noFill/>
+              </p:spPr>
+              <p:txBody>
+                <a:bodyPr wrap="square" rtlCol="0">
+                  <a:spAutoFit/>
+                </a:bodyPr>
+                <a:lstStyle/>
+                <a:p>
+                  <a:r>
+                    <a:rPr lang="en-GB" sz="900" b="1" dirty="0"/>
+                    <a:t>Y</a:t>
+                  </a:r>
+                </a:p>
+              </p:txBody>
+            </p:sp>
+            <p:sp>
+              <p:nvSpPr>
+                <p:cNvPr id="71" name="TextBox 70">
+                  <a:extLst>
+                    <a:ext uri="{FF2B5EF4-FFF2-40B4-BE49-F238E27FC236}">
+                      <a16:creationId xmlns:a16="http://schemas.microsoft.com/office/drawing/2014/main" id="{141D889D-6DE5-D18D-9731-F23FF101BE30}"/>
+                    </a:ext>
+                  </a:extLst>
+                </p:cNvPr>
+                <p:cNvSpPr txBox="1"/>
+                <p:nvPr/>
+              </p:nvSpPr>
+              <p:spPr>
+                <a:xfrm>
+                  <a:off x="8314303" y="2194863"/>
+                  <a:ext cx="248331" cy="230832"/>
+                </a:xfrm>
+                <a:prstGeom prst="rect">
+                  <a:avLst/>
+                </a:prstGeom>
+                <a:noFill/>
+              </p:spPr>
+              <p:txBody>
+                <a:bodyPr wrap="square" rtlCol="0">
+                  <a:spAutoFit/>
+                </a:bodyPr>
+                <a:lstStyle/>
+                <a:p>
+                  <a:r>
+                    <a:rPr lang="en-GB" sz="900" b="1" dirty="0"/>
+                    <a:t>X</a:t>
+                  </a:r>
+                </a:p>
+              </p:txBody>
+            </p:sp>
+            <p:sp>
+              <p:nvSpPr>
+                <p:cNvPr id="72" name="TextBox 71">
+                  <a:extLst>
+                    <a:ext uri="{FF2B5EF4-FFF2-40B4-BE49-F238E27FC236}">
+                      <a16:creationId xmlns:a16="http://schemas.microsoft.com/office/drawing/2014/main" id="{C4C50339-3C61-FE1C-5F9E-FB5E88D3D4DB}"/>
+                    </a:ext>
+                  </a:extLst>
+                </p:cNvPr>
+                <p:cNvSpPr txBox="1"/>
+                <p:nvPr/>
+              </p:nvSpPr>
+              <p:spPr>
+                <a:xfrm>
+                  <a:off x="7661293" y="2123016"/>
+                  <a:ext cx="248331" cy="230832"/>
+                </a:xfrm>
+                <a:prstGeom prst="rect">
+                  <a:avLst/>
+                </a:prstGeom>
+                <a:noFill/>
+              </p:spPr>
+              <p:txBody>
+                <a:bodyPr wrap="square" rtlCol="0">
+                  <a:spAutoFit/>
+                </a:bodyPr>
+                <a:lstStyle/>
+                <a:p>
+                  <a:r>
+                    <a:rPr lang="en-GB" sz="900" b="1" dirty="0"/>
+                    <a:t>Z</a:t>
+                  </a:r>
+                </a:p>
+              </p:txBody>
+            </p:sp>
+            <p:sp>
+              <p:nvSpPr>
+                <p:cNvPr id="104" name="TextBox 103">
+                  <a:extLst>
+                    <a:ext uri="{FF2B5EF4-FFF2-40B4-BE49-F238E27FC236}">
+                      <a16:creationId xmlns:a16="http://schemas.microsoft.com/office/drawing/2014/main" id="{DC4B642A-8707-E821-5045-A2B0E2A4A68A}"/>
+                    </a:ext>
+                  </a:extLst>
+                </p:cNvPr>
+                <p:cNvSpPr txBox="1"/>
+                <p:nvPr/>
+              </p:nvSpPr>
+              <p:spPr>
+                <a:xfrm>
+                  <a:off x="8425060" y="2717523"/>
+                  <a:ext cx="535996" cy="200055"/>
+                </a:xfrm>
+                <a:prstGeom prst="rect">
+                  <a:avLst/>
+                </a:prstGeom>
+                <a:noFill/>
+              </p:spPr>
+              <p:txBody>
+                <a:bodyPr wrap="square" rtlCol="0">
+                  <a:spAutoFit/>
+                </a:bodyPr>
+                <a:lstStyle/>
+                <a:p>
+                  <a:r>
+                    <a:rPr lang="en-GB" sz="700" b="1" dirty="0"/>
+                    <a:t>CW + ve</a:t>
+                  </a:r>
+                </a:p>
+              </p:txBody>
+            </p:sp>
+          </p:grpSp>
+          <p:sp>
+            <p:nvSpPr>
+              <p:cNvPr id="101" name="Oval 100">
+                <a:extLst>
+                  <a:ext uri="{FF2B5EF4-FFF2-40B4-BE49-F238E27FC236}">
+                    <a16:creationId xmlns:a16="http://schemas.microsoft.com/office/drawing/2014/main" id="{1A217682-46A0-0A56-6FE6-AD95CA53F9E6}"/>
+                  </a:ext>
+                </a:extLst>
+              </p:cNvPr>
+              <p:cNvSpPr/>
+              <p:nvPr/>
+            </p:nvSpPr>
+            <p:spPr>
+              <a:xfrm>
+                <a:off x="7863302" y="2260208"/>
+                <a:ext cx="111268" cy="111268"/>
+              </a:xfrm>
+              <a:prstGeom prst="ellipse">
+                <a:avLst/>
+              </a:prstGeom>
+            </p:spPr>
+            <p:style>
+              <a:lnRef idx="2">
+                <a:schemeClr val="accent1">
+                  <a:shade val="15000"/>
+                </a:schemeClr>
+              </a:lnRef>
+              <a:fillRef idx="1">
+                <a:schemeClr val="accent1"/>
+              </a:fillRef>
+              <a:effectRef idx="0">
+                <a:schemeClr val="accent1"/>
+              </a:effectRef>
+              <a:fontRef idx="minor">
+                <a:schemeClr val="lt1"/>
+              </a:fontRef>
+            </p:style>
+            <p:txBody>
+              <a:bodyPr rtlCol="0" anchor="ctr"/>
+              <a:lstStyle/>
+              <a:p>
+                <a:pPr algn="ctr"/>
+                <a:endParaRPr lang="en-GB"/>
+              </a:p>
+            </p:txBody>
+          </p:sp>
+        </p:grpSp>
+      </p:grpSp>
+      <p:sp>
+        <p:nvSpPr>
+          <p:cNvPr id="107" name="Rectangle: Rounded Corners 106">
+            <a:extLst>
+              <a:ext uri="{FF2B5EF4-FFF2-40B4-BE49-F238E27FC236}">
+                <a16:creationId xmlns:a16="http://schemas.microsoft.com/office/drawing/2014/main" id="{621F691A-56F5-543C-E4AA-70319516AABE}"/>
+              </a:ext>
+            </a:extLst>
+          </p:cNvPr>
+          <p:cNvSpPr/>
+          <p:nvPr/>
+        </p:nvSpPr>
+        <p:spPr>
+          <a:xfrm>
+            <a:off x="2175657" y="1079130"/>
+            <a:ext cx="5606267" cy="5015314"/>
+          </a:xfrm>
+          <a:prstGeom prst="roundRect">
+            <a:avLst/>
+          </a:prstGeom>
+          <a:noFill/>
+          <a:ln w="9525" cap="flat" cmpd="sng" algn="ctr">
+            <a:solidFill>
+              <a:schemeClr val="dk1"/>
+            </a:solidFill>
+            <a:prstDash val="solid"/>
+            <a:round/>
+            <a:headEnd type="none" w="med" len="med"/>
+            <a:tailEnd type="none" w="med" len="med"/>
+          </a:ln>
+        </p:spPr>
+        <p:style>
+          <a:lnRef idx="0">
+            <a:scrgbClr r="0" g="0" b="0"/>
+          </a:lnRef>
+          <a:fillRef idx="0">
+            <a:scrgbClr r="0" g="0" b="0"/>
+          </a:fillRef>
+          <a:effectRef idx="0">
+            <a:scrgbClr r="0" g="0" b="0"/>
+          </a:effectRef>
+          <a:fontRef idx="minor">
+            <a:schemeClr val="dk1"/>
+          </a:fontRef>
+        </p:style>
+        <p:txBody>
+          <a:bodyPr rtlCol="0" anchor="ctr"/>
+          <a:lstStyle/>
+          <a:p>
+            <a:pPr algn="ctr"/>
+            <a:endParaRPr lang="en-GB"/>
+          </a:p>
+        </p:txBody>
+      </p:sp>
+      <p:grpSp>
+        <p:nvGrpSpPr>
+          <p:cNvPr id="110" name="Group 109">
+            <a:extLst>
+              <a:ext uri="{FF2B5EF4-FFF2-40B4-BE49-F238E27FC236}">
+                <a16:creationId xmlns:a16="http://schemas.microsoft.com/office/drawing/2014/main" id="{F230C9DA-C921-4CC2-CF11-5ED832CA6E11}"/>
+              </a:ext>
+            </a:extLst>
+          </p:cNvPr>
+          <p:cNvGrpSpPr/>
+          <p:nvPr/>
+        </p:nvGrpSpPr>
+        <p:grpSpPr>
+          <a:xfrm>
+            <a:off x="2434824" y="1359027"/>
+            <a:ext cx="1429712" cy="1224660"/>
+            <a:chOff x="2434824" y="1359027"/>
+            <a:chExt cx="1418367" cy="1224660"/>
+          </a:xfrm>
+        </p:grpSpPr>
+        <p:grpSp>
+          <p:nvGrpSpPr>
+            <p:cNvPr id="96" name="Group 95">
+              <a:extLst>
+                <a:ext uri="{FF2B5EF4-FFF2-40B4-BE49-F238E27FC236}">
+                  <a16:creationId xmlns:a16="http://schemas.microsoft.com/office/drawing/2014/main" id="{E68C9D5D-2CE1-E7D3-76ED-A2AD2860A879}"/>
+                </a:ext>
+              </a:extLst>
+            </p:cNvPr>
+            <p:cNvGrpSpPr/>
+            <p:nvPr/>
+          </p:nvGrpSpPr>
+          <p:grpSpPr>
+            <a:xfrm>
+              <a:off x="2544627" y="1414779"/>
+              <a:ext cx="1164256" cy="1168908"/>
+              <a:chOff x="7036568" y="3635884"/>
+              <a:chExt cx="1164256" cy="1168908"/>
+            </a:xfrm>
+          </p:grpSpPr>
+          <p:sp>
+            <p:nvSpPr>
+              <p:cNvPr id="91" name="Arrow: Quad 90">
+                <a:extLst>
+                  <a:ext uri="{FF2B5EF4-FFF2-40B4-BE49-F238E27FC236}">
+                    <a16:creationId xmlns:a16="http://schemas.microsoft.com/office/drawing/2014/main" id="{ED438122-9A63-D880-BAC6-4AC659AF7439}"/>
+                  </a:ext>
+                </a:extLst>
+              </p:cNvPr>
+              <p:cNvSpPr/>
+              <p:nvPr/>
+            </p:nvSpPr>
+            <p:spPr>
+              <a:xfrm>
+                <a:off x="7303814" y="3900238"/>
+                <a:ext cx="619885" cy="642944"/>
+              </a:xfrm>
+              <a:prstGeom prst="quadArrow">
+                <a:avLst>
+                  <a:gd name="adj1" fmla="val 2555"/>
+                  <a:gd name="adj2" fmla="val 8503"/>
+                  <a:gd name="adj3" fmla="val 19552"/>
+                </a:avLst>
+              </a:prstGeom>
+            </p:spPr>
+            <p:style>
+              <a:lnRef idx="2">
+                <a:schemeClr val="accent1">
+                  <a:shade val="15000"/>
+                </a:schemeClr>
+              </a:lnRef>
+              <a:fillRef idx="1">
+                <a:schemeClr val="accent1"/>
+              </a:fillRef>
+              <a:effectRef idx="0">
+                <a:schemeClr val="accent1"/>
+              </a:effectRef>
+              <a:fontRef idx="minor">
+                <a:schemeClr val="lt1"/>
+              </a:fontRef>
+            </p:style>
+            <p:txBody>
+              <a:bodyPr rtlCol="0" anchor="ctr"/>
+              <a:lstStyle/>
+              <a:p>
+                <a:pPr algn="ctr"/>
+                <a:endParaRPr lang="en-GB"/>
+              </a:p>
+            </p:txBody>
+          </p:sp>
+          <p:sp>
+            <p:nvSpPr>
+              <p:cNvPr id="92" name="TextBox 91">
+                <a:extLst>
+                  <a:ext uri="{FF2B5EF4-FFF2-40B4-BE49-F238E27FC236}">
+                    <a16:creationId xmlns:a16="http://schemas.microsoft.com/office/drawing/2014/main" id="{56D4450F-4815-6AC5-1557-0D5F1EB386E5}"/>
+                  </a:ext>
+                </a:extLst>
+              </p:cNvPr>
+              <p:cNvSpPr txBox="1"/>
+              <p:nvPr/>
+            </p:nvSpPr>
+            <p:spPr>
+              <a:xfrm>
+                <a:off x="7484363" y="3635884"/>
+                <a:ext cx="248331" cy="261610"/>
+              </a:xfrm>
+              <a:prstGeom prst="rect">
+                <a:avLst/>
+              </a:prstGeom>
+              <a:noFill/>
+            </p:spPr>
+            <p:txBody>
+              <a:bodyPr wrap="square" rtlCol="0">
+                <a:spAutoFit/>
+              </a:bodyPr>
+              <a:lstStyle/>
+              <a:p>
+                <a:pPr algn="ctr"/>
+                <a:r>
+                  <a:rPr lang="en-GB" sz="1100" b="1" dirty="0"/>
+                  <a:t>N</a:t>
+                </a:r>
+              </a:p>
+            </p:txBody>
+          </p:sp>
+          <p:sp>
+            <p:nvSpPr>
+              <p:cNvPr id="93" name="TextBox 92">
+                <a:extLst>
+                  <a:ext uri="{FF2B5EF4-FFF2-40B4-BE49-F238E27FC236}">
+                    <a16:creationId xmlns:a16="http://schemas.microsoft.com/office/drawing/2014/main" id="{106D13F5-7032-3233-37FB-B267EA56BC1C}"/>
+                  </a:ext>
+                </a:extLst>
+              </p:cNvPr>
+              <p:cNvSpPr txBox="1"/>
+              <p:nvPr/>
+            </p:nvSpPr>
+            <p:spPr>
+              <a:xfrm>
+                <a:off x="7493906" y="4543182"/>
+                <a:ext cx="248331" cy="261610"/>
+              </a:xfrm>
+              <a:prstGeom prst="rect">
+                <a:avLst/>
+              </a:prstGeom>
+              <a:noFill/>
+            </p:spPr>
+            <p:txBody>
+              <a:bodyPr wrap="square" rtlCol="0">
+                <a:spAutoFit/>
+              </a:bodyPr>
+              <a:lstStyle/>
+              <a:p>
+                <a:pPr algn="ctr"/>
+                <a:r>
+                  <a:rPr lang="en-GB" sz="1100" b="1" dirty="0"/>
+                  <a:t>S</a:t>
+                </a:r>
+              </a:p>
+            </p:txBody>
+          </p:sp>
+          <p:sp>
+            <p:nvSpPr>
+              <p:cNvPr id="94" name="TextBox 93">
+                <a:extLst>
+                  <a:ext uri="{FF2B5EF4-FFF2-40B4-BE49-F238E27FC236}">
+                    <a16:creationId xmlns:a16="http://schemas.microsoft.com/office/drawing/2014/main" id="{382B5113-8189-5DE7-9223-ECED089BB574}"/>
+                  </a:ext>
+                </a:extLst>
+              </p:cNvPr>
+              <p:cNvSpPr txBox="1"/>
+              <p:nvPr/>
+            </p:nvSpPr>
+            <p:spPr>
+              <a:xfrm>
+                <a:off x="7952493" y="4090905"/>
+                <a:ext cx="248331" cy="261610"/>
+              </a:xfrm>
+              <a:prstGeom prst="rect">
+                <a:avLst/>
+              </a:prstGeom>
+              <a:noFill/>
+            </p:spPr>
+            <p:txBody>
+              <a:bodyPr wrap="square" rtlCol="0">
+                <a:spAutoFit/>
+              </a:bodyPr>
+              <a:lstStyle/>
+              <a:p>
+                <a:pPr algn="ctr"/>
+                <a:r>
+                  <a:rPr lang="en-GB" sz="1100" b="1" dirty="0"/>
+                  <a:t>E</a:t>
+                </a:r>
+              </a:p>
+            </p:txBody>
+          </p:sp>
+          <p:sp>
+            <p:nvSpPr>
+              <p:cNvPr id="95" name="TextBox 94">
+                <a:extLst>
+                  <a:ext uri="{FF2B5EF4-FFF2-40B4-BE49-F238E27FC236}">
+                    <a16:creationId xmlns:a16="http://schemas.microsoft.com/office/drawing/2014/main" id="{B9413C58-F014-F662-E6C6-0211B6852852}"/>
+                  </a:ext>
+                </a:extLst>
+              </p:cNvPr>
+              <p:cNvSpPr txBox="1"/>
+              <p:nvPr/>
+            </p:nvSpPr>
+            <p:spPr>
+              <a:xfrm>
+                <a:off x="7036568" y="4090905"/>
+                <a:ext cx="248331" cy="261610"/>
+              </a:xfrm>
+              <a:prstGeom prst="rect">
+                <a:avLst/>
+              </a:prstGeom>
+              <a:noFill/>
+            </p:spPr>
+            <p:txBody>
+              <a:bodyPr wrap="square" rtlCol="0">
+                <a:spAutoFit/>
+              </a:bodyPr>
+              <a:lstStyle/>
+              <a:p>
+                <a:pPr algn="ctr"/>
+                <a:r>
+                  <a:rPr lang="en-GB" sz="1100" b="1" dirty="0"/>
+                  <a:t>W</a:t>
+                </a:r>
+              </a:p>
+            </p:txBody>
+          </p:sp>
+        </p:grpSp>
+        <p:sp>
+          <p:nvSpPr>
+            <p:cNvPr id="108" name="Rectangle: Rounded Corners 107">
+              <a:extLst>
+                <a:ext uri="{FF2B5EF4-FFF2-40B4-BE49-F238E27FC236}">
+                  <a16:creationId xmlns:a16="http://schemas.microsoft.com/office/drawing/2014/main" id="{9BB9D698-BC36-B469-6013-8DC95085C189}"/>
+                </a:ext>
+              </a:extLst>
+            </p:cNvPr>
+            <p:cNvSpPr/>
+            <p:nvPr/>
+          </p:nvSpPr>
+          <p:spPr>
+            <a:xfrm>
+              <a:off x="2434824" y="1359027"/>
+              <a:ext cx="1418367" cy="1224660"/>
+            </a:xfrm>
+            <a:prstGeom prst="roundRect">
+              <a:avLst/>
+            </a:prstGeom>
+            <a:noFill/>
+            <a:ln w="9525" cap="flat" cmpd="sng" algn="ctr">
+              <a:solidFill>
+                <a:schemeClr val="dk1"/>
+              </a:solidFill>
+              <a:prstDash val="solid"/>
+              <a:round/>
+              <a:headEnd type="none" w="med" len="med"/>
+              <a:tailEnd type="none" w="med" len="med"/>
+            </a:ln>
+          </p:spPr>
+          <p:style>
+            <a:lnRef idx="0">
+              <a:scrgbClr r="0" g="0" b="0"/>
+            </a:lnRef>
+            <a:fillRef idx="0">
+              <a:scrgbClr r="0" g="0" b="0"/>
+            </a:fillRef>
+            <a:effectRef idx="0">
+              <a:scrgbClr r="0" g="0" b="0"/>
+            </a:effectRef>
+            <a:fontRef idx="minor">
+              <a:schemeClr val="dk1"/>
+            </a:fontRef>
+          </p:style>
+          <p:txBody>
+            <a:bodyPr rtlCol="0" anchor="ctr"/>
+            <a:lstStyle/>
+            <a:p>
+              <a:pPr algn="ctr"/>
+              <a:endParaRPr lang="en-GB"/>
+            </a:p>
+          </p:txBody>
+        </p:sp>
+      </p:grpSp>
+      <p:grpSp>
+        <p:nvGrpSpPr>
+          <p:cNvPr id="74" name="Group 73">
+            <a:extLst>
+              <a:ext uri="{FF2B5EF4-FFF2-40B4-BE49-F238E27FC236}">
+                <a16:creationId xmlns:a16="http://schemas.microsoft.com/office/drawing/2014/main" id="{273FCFE0-30BB-C251-7705-842CB3CE4BF4}"/>
+              </a:ext>
+            </a:extLst>
+          </p:cNvPr>
+          <p:cNvGrpSpPr/>
+          <p:nvPr/>
+        </p:nvGrpSpPr>
+        <p:grpSpPr>
+          <a:xfrm>
+            <a:off x="9961632" y="1423899"/>
+            <a:ext cx="1194090" cy="916950"/>
+            <a:chOff x="7661293" y="1733549"/>
+            <a:chExt cx="901341" cy="692146"/>
+          </a:xfrm>
+        </p:grpSpPr>
+        <p:grpSp>
+          <p:nvGrpSpPr>
+            <p:cNvPr id="75" name="Group 74">
+              <a:extLst>
+                <a:ext uri="{FF2B5EF4-FFF2-40B4-BE49-F238E27FC236}">
+                  <a16:creationId xmlns:a16="http://schemas.microsoft.com/office/drawing/2014/main" id="{46B17301-D805-EFFF-D3AB-3B5B12A5FCA7}"/>
+                </a:ext>
+              </a:extLst>
+            </p:cNvPr>
+            <p:cNvGrpSpPr/>
+            <p:nvPr/>
+          </p:nvGrpSpPr>
+          <p:grpSpPr>
+            <a:xfrm>
+              <a:off x="7861158" y="1892343"/>
+              <a:ext cx="453145" cy="473570"/>
+              <a:chOff x="7808205" y="1260423"/>
+              <a:chExt cx="453145" cy="473570"/>
+            </a:xfrm>
+          </p:grpSpPr>
+          <p:cxnSp>
+            <p:nvCxnSpPr>
+              <p:cNvPr id="79" name="Straight Arrow Connector 78">
+                <a:extLst>
+                  <a:ext uri="{FF2B5EF4-FFF2-40B4-BE49-F238E27FC236}">
+                    <a16:creationId xmlns:a16="http://schemas.microsoft.com/office/drawing/2014/main" id="{962AC9EC-FB24-771B-441F-3347A938FE77}"/>
+                  </a:ext>
+                </a:extLst>
+              </p:cNvPr>
+              <p:cNvCxnSpPr>
+                <a:cxnSpLocks/>
+              </p:cNvCxnSpPr>
+              <p:nvPr/>
+            </p:nvCxnSpPr>
+            <p:spPr>
+              <a:xfrm flipV="1">
+                <a:off x="7863840" y="1260423"/>
+                <a:ext cx="0" cy="417937"/>
+              </a:xfrm>
+              <a:prstGeom prst="straightConnector1">
+                <a:avLst/>
+              </a:prstGeom>
+              <a:ln>
+                <a:tailEnd type="triangle"/>
+              </a:ln>
+            </p:spPr>
+            <p:style>
+              <a:lnRef idx="2">
+                <a:schemeClr val="accent1"/>
+              </a:lnRef>
+              <a:fillRef idx="0">
+                <a:schemeClr val="accent1"/>
+              </a:fillRef>
+              <a:effectRef idx="1">
+                <a:schemeClr val="accent1"/>
+              </a:effectRef>
+              <a:fontRef idx="minor">
+                <a:schemeClr val="tx1"/>
+              </a:fontRef>
+            </p:style>
+          </p:cxnSp>
+          <p:cxnSp>
+            <p:nvCxnSpPr>
+              <p:cNvPr id="80" name="Straight Arrow Connector 79">
+                <a:extLst>
+                  <a:ext uri="{FF2B5EF4-FFF2-40B4-BE49-F238E27FC236}">
+                    <a16:creationId xmlns:a16="http://schemas.microsoft.com/office/drawing/2014/main" id="{FFCB2E6F-8C23-31D1-7E5A-F6C2F457354A}"/>
+                  </a:ext>
+                </a:extLst>
+              </p:cNvPr>
+              <p:cNvCxnSpPr>
+                <a:cxnSpLocks/>
+              </p:cNvCxnSpPr>
+              <p:nvPr/>
+            </p:nvCxnSpPr>
+            <p:spPr>
+              <a:xfrm>
+                <a:off x="7863840" y="1678360"/>
+                <a:ext cx="397510" cy="0"/>
+              </a:xfrm>
+              <a:prstGeom prst="straightConnector1">
+                <a:avLst/>
+              </a:prstGeom>
+              <a:ln>
+                <a:tailEnd type="triangle"/>
+              </a:ln>
+            </p:spPr>
+            <p:style>
+              <a:lnRef idx="2">
+                <a:schemeClr val="accent1"/>
+              </a:lnRef>
+              <a:fillRef idx="0">
+                <a:schemeClr val="accent1"/>
+              </a:fillRef>
+              <a:effectRef idx="1">
+                <a:schemeClr val="accent1"/>
+              </a:effectRef>
+              <a:fontRef idx="minor">
+                <a:schemeClr val="tx1"/>
+              </a:fontRef>
+            </p:style>
+          </p:cxnSp>
+          <p:sp>
+            <p:nvSpPr>
+              <p:cNvPr id="81" name="Oval 80">
+                <a:extLst>
+                  <a:ext uri="{FF2B5EF4-FFF2-40B4-BE49-F238E27FC236}">
+                    <a16:creationId xmlns:a16="http://schemas.microsoft.com/office/drawing/2014/main" id="{FB9118D8-1F60-F1F4-9493-651A398B171F}"/>
+                  </a:ext>
+                </a:extLst>
+              </p:cNvPr>
+              <p:cNvSpPr/>
+              <p:nvPr/>
+            </p:nvSpPr>
+            <p:spPr>
+              <a:xfrm>
+                <a:off x="7808205" y="1622725"/>
+                <a:ext cx="111268" cy="111268"/>
+              </a:xfrm>
+              <a:prstGeom prst="ellipse">
+                <a:avLst/>
+              </a:prstGeom>
+            </p:spPr>
+            <p:style>
+              <a:lnRef idx="2">
+                <a:schemeClr val="accent1">
+                  <a:shade val="15000"/>
+                </a:schemeClr>
+              </a:lnRef>
+              <a:fillRef idx="1">
+                <a:schemeClr val="accent1"/>
+              </a:fillRef>
+              <a:effectRef idx="0">
+                <a:schemeClr val="accent1"/>
+              </a:effectRef>
+              <a:fontRef idx="minor">
+                <a:schemeClr val="lt1"/>
+              </a:fontRef>
+            </p:style>
+            <p:txBody>
+              <a:bodyPr rtlCol="0" anchor="ctr"/>
+              <a:lstStyle/>
+              <a:p>
+                <a:pPr algn="ctr"/>
+                <a:endParaRPr lang="en-GB"/>
+              </a:p>
+            </p:txBody>
+          </p:sp>
+        </p:grpSp>
+        <p:sp>
+          <p:nvSpPr>
+            <p:cNvPr id="76" name="TextBox 75">
+              <a:extLst>
+                <a:ext uri="{FF2B5EF4-FFF2-40B4-BE49-F238E27FC236}">
+                  <a16:creationId xmlns:a16="http://schemas.microsoft.com/office/drawing/2014/main" id="{64789E5D-F335-B55E-0C47-6DF3F30AC2A4}"/>
+                </a:ext>
+              </a:extLst>
+            </p:cNvPr>
+            <p:cNvSpPr txBox="1"/>
+            <p:nvPr/>
+          </p:nvSpPr>
+          <p:spPr>
+            <a:xfrm>
+              <a:off x="7909624" y="1733549"/>
+              <a:ext cx="248331" cy="230832"/>
+            </a:xfrm>
+            <a:prstGeom prst="rect">
+              <a:avLst/>
+            </a:prstGeom>
+            <a:noFill/>
+          </p:spPr>
+          <p:txBody>
+            <a:bodyPr wrap="square" rtlCol="0">
+              <a:spAutoFit/>
+            </a:bodyPr>
+            <a:lstStyle/>
+            <a:p>
+              <a:r>
+                <a:rPr lang="en-GB" sz="900" b="1" dirty="0"/>
+                <a:t>Y</a:t>
+              </a:r>
+            </a:p>
+          </p:txBody>
+        </p:sp>
+        <p:sp>
+          <p:nvSpPr>
+            <p:cNvPr id="77" name="TextBox 76">
+              <a:extLst>
+                <a:ext uri="{FF2B5EF4-FFF2-40B4-BE49-F238E27FC236}">
+                  <a16:creationId xmlns:a16="http://schemas.microsoft.com/office/drawing/2014/main" id="{455D9C4A-FADE-6534-CA98-2B1A05515F2E}"/>
+                </a:ext>
+              </a:extLst>
+            </p:cNvPr>
+            <p:cNvSpPr txBox="1"/>
+            <p:nvPr/>
+          </p:nvSpPr>
+          <p:spPr>
+            <a:xfrm>
+              <a:off x="8314303" y="2194863"/>
+              <a:ext cx="248331" cy="230832"/>
+            </a:xfrm>
+            <a:prstGeom prst="rect">
+              <a:avLst/>
+            </a:prstGeom>
+            <a:noFill/>
+          </p:spPr>
+          <p:txBody>
+            <a:bodyPr wrap="square" rtlCol="0">
+              <a:spAutoFit/>
+            </a:bodyPr>
+            <a:lstStyle/>
+            <a:p>
+              <a:r>
+                <a:rPr lang="en-GB" sz="900" b="1" dirty="0"/>
+                <a:t>X</a:t>
+              </a:r>
+            </a:p>
+          </p:txBody>
+        </p:sp>
+        <p:sp>
+          <p:nvSpPr>
+            <p:cNvPr id="78" name="TextBox 77">
+              <a:extLst>
+                <a:ext uri="{FF2B5EF4-FFF2-40B4-BE49-F238E27FC236}">
+                  <a16:creationId xmlns:a16="http://schemas.microsoft.com/office/drawing/2014/main" id="{F0058FA5-8104-6639-CB9C-1F9571044A27}"/>
+                </a:ext>
+              </a:extLst>
+            </p:cNvPr>
+            <p:cNvSpPr txBox="1"/>
+            <p:nvPr/>
+          </p:nvSpPr>
+          <p:spPr>
+            <a:xfrm>
+              <a:off x="7661293" y="2123016"/>
+              <a:ext cx="248331" cy="230832"/>
+            </a:xfrm>
+            <a:prstGeom prst="rect">
+              <a:avLst/>
+            </a:prstGeom>
+            <a:noFill/>
+          </p:spPr>
+          <p:txBody>
+            <a:bodyPr wrap="square" rtlCol="0">
+              <a:spAutoFit/>
+            </a:bodyPr>
+            <a:lstStyle/>
+            <a:p>
+              <a:r>
+                <a:rPr lang="en-GB" sz="900" b="1" dirty="0"/>
+                <a:t>Z</a:t>
+              </a:r>
+            </a:p>
+          </p:txBody>
+        </p:sp>
+      </p:grpSp>
+      <p:sp>
+        <p:nvSpPr>
+          <p:cNvPr id="109" name="Rectangle: Rounded Corners 108">
+            <a:extLst>
+              <a:ext uri="{FF2B5EF4-FFF2-40B4-BE49-F238E27FC236}">
+                <a16:creationId xmlns:a16="http://schemas.microsoft.com/office/drawing/2014/main" id="{456226B1-400F-D24B-EBE6-C7423F9F95E7}"/>
+              </a:ext>
+            </a:extLst>
+          </p:cNvPr>
+          <p:cNvSpPr/>
+          <p:nvPr/>
+        </p:nvSpPr>
+        <p:spPr>
+          <a:xfrm>
+            <a:off x="6096000" y="1354068"/>
+            <a:ext cx="1456720" cy="1194139"/>
+          </a:xfrm>
+          <a:prstGeom prst="roundRect">
+            <a:avLst/>
+          </a:prstGeom>
+          <a:noFill/>
+          <a:ln w="9525" cap="flat" cmpd="sng" algn="ctr">
+            <a:solidFill>
+              <a:schemeClr val="dk1"/>
+            </a:solidFill>
+            <a:prstDash val="solid"/>
+            <a:round/>
+            <a:headEnd type="none" w="med" len="med"/>
+            <a:tailEnd type="none" w="med" len="med"/>
+          </a:ln>
+        </p:spPr>
+        <p:style>
+          <a:lnRef idx="0">
+            <a:scrgbClr r="0" g="0" b="0"/>
+          </a:lnRef>
+          <a:fillRef idx="0">
+            <a:scrgbClr r="0" g="0" b="0"/>
+          </a:fillRef>
+          <a:effectRef idx="0">
+            <a:scrgbClr r="0" g="0" b="0"/>
+          </a:effectRef>
+          <a:fontRef idx="minor">
+            <a:schemeClr val="dk1"/>
+          </a:fontRef>
+        </p:style>
+        <p:txBody>
+          <a:bodyPr rtlCol="0" anchor="ctr"/>
+          <a:lstStyle/>
+          <a:p>
+            <a:pPr algn="ctr"/>
+            <a:endParaRPr lang="en-GB"/>
+          </a:p>
+        </p:txBody>
+      </p:sp>
+    </p:spTree>
+    <p:extLst>
+      <p:ext uri="{BB962C8B-B14F-4D97-AF65-F5344CB8AC3E}">
+        <p14:creationId xmlns:p14="http://schemas.microsoft.com/office/powerpoint/2010/main" val="387684819"/>
+      </p:ext>
+    </p:extLst>
+  </p:cSld>
+  <p:clrMapOvr>
+    <a:masterClrMapping/>
+  </p:clrMapOvr>
+</p:sld>
+</file>
+
+<file path=ppt/slides/slide7.xml><?xml version="1.0" encoding="utf-8"?>
+<p:sld xmlns:a="http://schemas.openxmlformats.org/drawingml/2006/main" xmlns:r="http://schemas.openxmlformats.org/officeDocument/2006/relationships" xmlns:p="http://schemas.openxmlformats.org/presentationml/2006/main">
+  <p:cSld>
+    <p:spTree>
+      <p:nvGrpSpPr>
+        <p:cNvPr id="1" name=""/>
+        <p:cNvGrpSpPr/>
+        <p:nvPr/>
+      </p:nvGrpSpPr>
+      <p:grpSpPr>
+        <a:xfrm>
+          <a:off x="0" y="0"/>
+          <a:ext cx="0" cy="0"/>
+          <a:chOff x="0" y="0"/>
+          <a:chExt cx="0" cy="0"/>
+        </a:xfrm>
+      </p:grpSpPr>
+      <p:grpSp>
+        <p:nvGrpSpPr>
           <p:cNvPr id="6" name="Group 5">
             <a:extLst>
               <a:ext uri="{FF2B5EF4-FFF2-40B4-BE49-F238E27FC236}">
@@ -11874,7 +13374,7 @@
 </p:sld>
 </file>
 
-<file path=ppt/slides/slide7.xml><?xml version="1.0" encoding="utf-8"?>
+<file path=ppt/slides/slide8.xml><?xml version="1.0" encoding="utf-8"?>
 <p:sld xmlns:a="http://schemas.openxmlformats.org/drawingml/2006/main" xmlns:r="http://schemas.openxmlformats.org/officeDocument/2006/relationships" xmlns:p="http://schemas.openxmlformats.org/presentationml/2006/main">
   <p:cSld>
     <p:spTree>
@@ -12289,7 +13789,7 @@
 </p:sld>
 </file>
 
-<file path=ppt/slides/slide8.xml><?xml version="1.0" encoding="utf-8"?>
+<file path=ppt/slides/slide9.xml><?xml version="1.0" encoding="utf-8"?>
 <p:sld xmlns:a="http://schemas.openxmlformats.org/drawingml/2006/main" xmlns:r="http://schemas.openxmlformats.org/officeDocument/2006/relationships" xmlns:p="http://schemas.openxmlformats.org/presentationml/2006/main">
   <p:cSld>
     <p:spTree>

</xml_diff>

<commit_message>
added yaw image card in additional slide in ppt
</commit_message>
<xml_diff>
--- a/New Microsoft PowerPoint Presentation.pptx
+++ b/New Microsoft PowerPoint Presentation.pptx
@@ -11,9 +11,10 @@
     <p:sldId id="258" r:id="rId5"/>
     <p:sldId id="259" r:id="rId6"/>
     <p:sldId id="264" r:id="rId7"/>
-    <p:sldId id="263" r:id="rId8"/>
-    <p:sldId id="261" r:id="rId9"/>
-    <p:sldId id="262" r:id="rId10"/>
+    <p:sldId id="265" r:id="rId8"/>
+    <p:sldId id="263" r:id="rId9"/>
+    <p:sldId id="261" r:id="rId10"/>
+    <p:sldId id="262" r:id="rId11"/>
   </p:sldIdLst>
   <p:sldSz cx="12192000" cy="6858000"/>
   <p:notesSz cx="6858000" cy="9144000"/>
@@ -267,7 +268,7 @@
           <a:p>
             <a:fld id="{CC3F78A9-85ED-4B6C-98BF-75BF2C235F5D}" type="datetimeFigureOut">
               <a:rPr lang="en-GB" smtClean="0"/>
-              <a:t>08/10/2025</a:t>
+              <a:t>09/10/2025</a:t>
             </a:fld>
             <a:endParaRPr lang="en-GB"/>
           </a:p>
@@ -465,7 +466,7 @@
           <a:p>
             <a:fld id="{CC3F78A9-85ED-4B6C-98BF-75BF2C235F5D}" type="datetimeFigureOut">
               <a:rPr lang="en-GB" smtClean="0"/>
-              <a:t>08/10/2025</a:t>
+              <a:t>09/10/2025</a:t>
             </a:fld>
             <a:endParaRPr lang="en-GB"/>
           </a:p>
@@ -673,7 +674,7 @@
           <a:p>
             <a:fld id="{CC3F78A9-85ED-4B6C-98BF-75BF2C235F5D}" type="datetimeFigureOut">
               <a:rPr lang="en-GB" smtClean="0"/>
-              <a:t>08/10/2025</a:t>
+              <a:t>09/10/2025</a:t>
             </a:fld>
             <a:endParaRPr lang="en-GB"/>
           </a:p>
@@ -871,7 +872,7 @@
           <a:p>
             <a:fld id="{CC3F78A9-85ED-4B6C-98BF-75BF2C235F5D}" type="datetimeFigureOut">
               <a:rPr lang="en-GB" smtClean="0"/>
-              <a:t>08/10/2025</a:t>
+              <a:t>09/10/2025</a:t>
             </a:fld>
             <a:endParaRPr lang="en-GB"/>
           </a:p>
@@ -1146,7 +1147,7 @@
           <a:p>
             <a:fld id="{CC3F78A9-85ED-4B6C-98BF-75BF2C235F5D}" type="datetimeFigureOut">
               <a:rPr lang="en-GB" smtClean="0"/>
-              <a:t>08/10/2025</a:t>
+              <a:t>09/10/2025</a:t>
             </a:fld>
             <a:endParaRPr lang="en-GB"/>
           </a:p>
@@ -1411,7 +1412,7 @@
           <a:p>
             <a:fld id="{CC3F78A9-85ED-4B6C-98BF-75BF2C235F5D}" type="datetimeFigureOut">
               <a:rPr lang="en-GB" smtClean="0"/>
-              <a:t>08/10/2025</a:t>
+              <a:t>09/10/2025</a:t>
             </a:fld>
             <a:endParaRPr lang="en-GB"/>
           </a:p>
@@ -1823,7 +1824,7 @@
           <a:p>
             <a:fld id="{CC3F78A9-85ED-4B6C-98BF-75BF2C235F5D}" type="datetimeFigureOut">
               <a:rPr lang="en-GB" smtClean="0"/>
-              <a:t>08/10/2025</a:t>
+              <a:t>09/10/2025</a:t>
             </a:fld>
             <a:endParaRPr lang="en-GB"/>
           </a:p>
@@ -1964,7 +1965,7 @@
           <a:p>
             <a:fld id="{CC3F78A9-85ED-4B6C-98BF-75BF2C235F5D}" type="datetimeFigureOut">
               <a:rPr lang="en-GB" smtClean="0"/>
-              <a:t>08/10/2025</a:t>
+              <a:t>09/10/2025</a:t>
             </a:fld>
             <a:endParaRPr lang="en-GB"/>
           </a:p>
@@ -2077,7 +2078,7 @@
           <a:p>
             <a:fld id="{CC3F78A9-85ED-4B6C-98BF-75BF2C235F5D}" type="datetimeFigureOut">
               <a:rPr lang="en-GB" smtClean="0"/>
-              <a:t>08/10/2025</a:t>
+              <a:t>09/10/2025</a:t>
             </a:fld>
             <a:endParaRPr lang="en-GB"/>
           </a:p>
@@ -2388,7 +2389,7 @@
           <a:p>
             <a:fld id="{CC3F78A9-85ED-4B6C-98BF-75BF2C235F5D}" type="datetimeFigureOut">
               <a:rPr lang="en-GB" smtClean="0"/>
-              <a:t>08/10/2025</a:t>
+              <a:t>09/10/2025</a:t>
             </a:fld>
             <a:endParaRPr lang="en-GB"/>
           </a:p>
@@ -2676,7 +2677,7 @@
           <a:p>
             <a:fld id="{CC3F78A9-85ED-4B6C-98BF-75BF2C235F5D}" type="datetimeFigureOut">
               <a:rPr lang="en-GB" smtClean="0"/>
-              <a:t>08/10/2025</a:t>
+              <a:t>09/10/2025</a:t>
             </a:fld>
             <a:endParaRPr lang="en-GB"/>
           </a:p>
@@ -2917,7 +2918,7 @@
           <a:p>
             <a:fld id="{CC3F78A9-85ED-4B6C-98BF-75BF2C235F5D}" type="datetimeFigureOut">
               <a:rPr lang="en-GB" smtClean="0"/>
-              <a:t>08/10/2025</a:t>
+              <a:t>09/10/2025</a:t>
             </a:fld>
             <a:endParaRPr lang="en-GB"/>
           </a:p>
@@ -4379,6 +4380,256 @@
     <p:extLst>
       <p:ext uri="{BB962C8B-B14F-4D97-AF65-F5344CB8AC3E}">
         <p14:creationId xmlns:p14="http://schemas.microsoft.com/office/powerpoint/2010/main" val="3232182303"/>
+      </p:ext>
+    </p:extLst>
+  </p:cSld>
+  <p:clrMapOvr>
+    <a:masterClrMapping/>
+  </p:clrMapOvr>
+</p:sld>
+</file>
+
+<file path=ppt/slides/slide10.xml><?xml version="1.0" encoding="utf-8"?>
+<p:sld xmlns:a="http://schemas.openxmlformats.org/drawingml/2006/main" xmlns:r="http://schemas.openxmlformats.org/officeDocument/2006/relationships" xmlns:p="http://schemas.openxmlformats.org/presentationml/2006/main">
+  <p:cSld>
+    <p:spTree>
+      <p:nvGrpSpPr>
+        <p:cNvPr id="1" name="">
+          <a:extLst>
+            <a:ext uri="{FF2B5EF4-FFF2-40B4-BE49-F238E27FC236}">
+              <a16:creationId xmlns:a16="http://schemas.microsoft.com/office/drawing/2014/main" id="{12E18A76-541D-02F5-6E23-7BF114278D9F}"/>
+            </a:ext>
+          </a:extLst>
+        </p:cNvPr>
+        <p:cNvGrpSpPr/>
+        <p:nvPr/>
+      </p:nvGrpSpPr>
+      <p:grpSpPr>
+        <a:xfrm>
+          <a:off x="0" y="0"/>
+          <a:ext cx="0" cy="0"/>
+          <a:chOff x="0" y="0"/>
+          <a:chExt cx="0" cy="0"/>
+        </a:xfrm>
+      </p:grpSpPr>
+      <p:sp>
+        <p:nvSpPr>
+          <p:cNvPr id="4" name="Rectangle: Rounded Corners 3">
+            <a:extLst>
+              <a:ext uri="{FF2B5EF4-FFF2-40B4-BE49-F238E27FC236}">
+                <a16:creationId xmlns:a16="http://schemas.microsoft.com/office/drawing/2014/main" id="{02671E5E-3841-B41B-C992-8368A6837B62}"/>
+              </a:ext>
+            </a:extLst>
+          </p:cNvPr>
+          <p:cNvSpPr/>
+          <p:nvPr/>
+        </p:nvSpPr>
+        <p:spPr>
+          <a:xfrm>
+            <a:off x="703006" y="383458"/>
+            <a:ext cx="10785987" cy="629265"/>
+          </a:xfrm>
+          <a:prstGeom prst="roundRect">
+            <a:avLst/>
+          </a:prstGeom>
+        </p:spPr>
+        <p:style>
+          <a:lnRef idx="2">
+            <a:schemeClr val="dk1"/>
+          </a:lnRef>
+          <a:fillRef idx="1">
+            <a:schemeClr val="lt1"/>
+          </a:fillRef>
+          <a:effectRef idx="0">
+            <a:schemeClr val="dk1"/>
+          </a:effectRef>
+          <a:fontRef idx="minor">
+            <a:schemeClr val="dk1"/>
+          </a:fontRef>
+        </p:style>
+        <p:txBody>
+          <a:bodyPr rtlCol="0" anchor="ctr"/>
+          <a:lstStyle/>
+          <a:p>
+            <a:pPr algn="ctr"/>
+            <a:endParaRPr lang="en-GB"/>
+          </a:p>
+        </p:txBody>
+      </p:sp>
+      <p:sp>
+        <p:nvSpPr>
+          <p:cNvPr id="5" name="Rectangle: Rounded Corners 4">
+            <a:extLst>
+              <a:ext uri="{FF2B5EF4-FFF2-40B4-BE49-F238E27FC236}">
+                <a16:creationId xmlns:a16="http://schemas.microsoft.com/office/drawing/2014/main" id="{4F408152-6920-171F-4C35-84CA4622483A}"/>
+              </a:ext>
+            </a:extLst>
+          </p:cNvPr>
+          <p:cNvSpPr/>
+          <p:nvPr/>
+        </p:nvSpPr>
+        <p:spPr>
+          <a:xfrm>
+            <a:off x="626805" y="1882879"/>
+            <a:ext cx="7250369" cy="3727346"/>
+          </a:xfrm>
+          <a:prstGeom prst="roundRect">
+            <a:avLst/>
+          </a:prstGeom>
+          <a:ln/>
+        </p:spPr>
+        <p:style>
+          <a:lnRef idx="2">
+            <a:schemeClr val="dk1"/>
+          </a:lnRef>
+          <a:fillRef idx="1">
+            <a:schemeClr val="lt1"/>
+          </a:fillRef>
+          <a:effectRef idx="0">
+            <a:schemeClr val="dk1"/>
+          </a:effectRef>
+          <a:fontRef idx="minor">
+            <a:schemeClr val="dk1"/>
+          </a:fontRef>
+        </p:style>
+        <p:txBody>
+          <a:bodyPr rtlCol="0" anchor="ctr"/>
+          <a:lstStyle/>
+          <a:p>
+            <a:pPr algn="ctr"/>
+            <a:endParaRPr lang="en-GB"/>
+          </a:p>
+        </p:txBody>
+      </p:sp>
+      <p:sp>
+        <p:nvSpPr>
+          <p:cNvPr id="9" name="Rectangle: Rounded Corners 8">
+            <a:extLst>
+              <a:ext uri="{FF2B5EF4-FFF2-40B4-BE49-F238E27FC236}">
+                <a16:creationId xmlns:a16="http://schemas.microsoft.com/office/drawing/2014/main" id="{B9F7406A-6577-D0A4-8E0B-666CADCC4778}"/>
+              </a:ext>
+            </a:extLst>
+          </p:cNvPr>
+          <p:cNvSpPr/>
+          <p:nvPr/>
+        </p:nvSpPr>
+        <p:spPr>
+          <a:xfrm>
+            <a:off x="828064" y="2568677"/>
+            <a:ext cx="6090769" cy="1720646"/>
+          </a:xfrm>
+          <a:prstGeom prst="roundRect">
+            <a:avLst/>
+          </a:prstGeom>
+          <a:ln/>
+        </p:spPr>
+        <p:style>
+          <a:lnRef idx="2">
+            <a:schemeClr val="dk1"/>
+          </a:lnRef>
+          <a:fillRef idx="1">
+            <a:schemeClr val="lt1"/>
+          </a:fillRef>
+          <a:effectRef idx="0">
+            <a:schemeClr val="dk1"/>
+          </a:effectRef>
+          <a:fontRef idx="minor">
+            <a:schemeClr val="dk1"/>
+          </a:fontRef>
+        </p:style>
+        <p:txBody>
+          <a:bodyPr rtlCol="0" anchor="ctr"/>
+          <a:lstStyle/>
+          <a:p>
+            <a:pPr algn="ctr"/>
+            <a:endParaRPr lang="en-GB"/>
+          </a:p>
+        </p:txBody>
+      </p:sp>
+      <p:sp>
+        <p:nvSpPr>
+          <p:cNvPr id="10" name="Rectangle: Rounded Corners 9">
+            <a:extLst>
+              <a:ext uri="{FF2B5EF4-FFF2-40B4-BE49-F238E27FC236}">
+                <a16:creationId xmlns:a16="http://schemas.microsoft.com/office/drawing/2014/main" id="{05D4FCE5-19D0-D317-197A-3372702530DF}"/>
+              </a:ext>
+            </a:extLst>
+          </p:cNvPr>
+          <p:cNvSpPr/>
+          <p:nvPr/>
+        </p:nvSpPr>
+        <p:spPr>
+          <a:xfrm>
+            <a:off x="1003809" y="4535126"/>
+            <a:ext cx="5997065" cy="879989"/>
+          </a:xfrm>
+          <a:prstGeom prst="roundRect">
+            <a:avLst/>
+          </a:prstGeom>
+          <a:ln/>
+        </p:spPr>
+        <p:style>
+          <a:lnRef idx="2">
+            <a:schemeClr val="dk1"/>
+          </a:lnRef>
+          <a:fillRef idx="1">
+            <a:schemeClr val="lt1"/>
+          </a:fillRef>
+          <a:effectRef idx="0">
+            <a:schemeClr val="dk1"/>
+          </a:effectRef>
+          <a:fontRef idx="minor">
+            <a:schemeClr val="dk1"/>
+          </a:fontRef>
+        </p:style>
+        <p:txBody>
+          <a:bodyPr rtlCol="0" anchor="ctr"/>
+          <a:lstStyle/>
+          <a:p>
+            <a:pPr algn="ctr"/>
+            <a:endParaRPr lang="en-GB"/>
+          </a:p>
+        </p:txBody>
+      </p:sp>
+      <p:sp>
+        <p:nvSpPr>
+          <p:cNvPr id="17" name="TextBox 16">
+            <a:extLst>
+              <a:ext uri="{FF2B5EF4-FFF2-40B4-BE49-F238E27FC236}">
+                <a16:creationId xmlns:a16="http://schemas.microsoft.com/office/drawing/2014/main" id="{9AD91184-7105-E8E9-D7EF-6E91EFDD55F3}"/>
+              </a:ext>
+            </a:extLst>
+          </p:cNvPr>
+          <p:cNvSpPr txBox="1"/>
+          <p:nvPr/>
+        </p:nvSpPr>
+        <p:spPr>
+          <a:xfrm>
+            <a:off x="828065" y="2085963"/>
+            <a:ext cx="2846439" cy="369332"/>
+          </a:xfrm>
+          <a:prstGeom prst="rect">
+            <a:avLst/>
+          </a:prstGeom>
+          <a:noFill/>
+        </p:spPr>
+        <p:txBody>
+          <a:bodyPr wrap="square" rtlCol="0">
+            <a:spAutoFit/>
+          </a:bodyPr>
+          <a:lstStyle/>
+          <a:p>
+            <a:r>
+              <a:rPr lang="en-GB" dirty="0"/>
+              <a:t>SIMULATION CONTROLS</a:t>
+            </a:r>
+          </a:p>
+        </p:txBody>
+      </p:sp>
+    </p:spTree>
+    <p:extLst>
+      <p:ext uri="{BB962C8B-B14F-4D97-AF65-F5344CB8AC3E}">
+        <p14:creationId xmlns:p14="http://schemas.microsoft.com/office/powerpoint/2010/main" val="3369075426"/>
       </p:ext>
     </p:extLst>
   </p:cSld>
@@ -11010,8 +11261,8 @@
           </a:p>
         </p:txBody>
       </p:sp>
-      <mc:AlternateContent xmlns:mc="http://schemas.openxmlformats.org/markup-compatibility/2006">
-        <mc:Choice xmlns:a14="http://schemas.microsoft.com/office/drawing/2010/main" Requires="a14">
+      <mc:AlternateContent xmlns:mc="http://schemas.openxmlformats.org/markup-compatibility/2006" xmlns:a14="http://schemas.microsoft.com/office/drawing/2010/main">
+        <mc:Choice Requires="a14">
           <p:sp>
             <p:nvSpPr>
               <p:cNvPr id="55" name="TextBox 54">
@@ -11062,7 +11313,7 @@
             </p:txBody>
           </p:sp>
         </mc:Choice>
-        <mc:Fallback>
+        <mc:Fallback xmlns="">
           <p:sp>
             <p:nvSpPr>
               <p:cNvPr id="55" name="TextBox 54">
@@ -11107,474 +11358,6 @@
           </p:sp>
         </mc:Fallback>
       </mc:AlternateContent>
-      <p:grpSp>
-        <p:nvGrpSpPr>
-          <p:cNvPr id="103" name="Group 102">
-            <a:extLst>
-              <a:ext uri="{FF2B5EF4-FFF2-40B4-BE49-F238E27FC236}">
-                <a16:creationId xmlns:a16="http://schemas.microsoft.com/office/drawing/2014/main" id="{DF03BD27-A5FE-B7A8-C5BC-2624B670E7F2}"/>
-              </a:ext>
-            </a:extLst>
-          </p:cNvPr>
-          <p:cNvGrpSpPr/>
-          <p:nvPr/>
-        </p:nvGrpSpPr>
-        <p:grpSpPr>
-          <a:xfrm>
-            <a:off x="6127341" y="1332162"/>
-            <a:ext cx="1564012" cy="1157892"/>
-            <a:chOff x="7397044" y="1826981"/>
-            <a:chExt cx="1564012" cy="1157892"/>
-          </a:xfrm>
-        </p:grpSpPr>
-        <p:grpSp>
-          <p:nvGrpSpPr>
-            <p:cNvPr id="100" name="Group 99">
-              <a:extLst>
-                <a:ext uri="{FF2B5EF4-FFF2-40B4-BE49-F238E27FC236}">
-                  <a16:creationId xmlns:a16="http://schemas.microsoft.com/office/drawing/2014/main" id="{7EB48CE2-D522-1D64-F3F9-5D21CF60EE85}"/>
-                </a:ext>
-              </a:extLst>
-            </p:cNvPr>
-            <p:cNvGrpSpPr/>
-            <p:nvPr/>
-          </p:nvGrpSpPr>
-          <p:grpSpPr>
-            <a:xfrm>
-              <a:off x="7397044" y="1826981"/>
-              <a:ext cx="1197329" cy="1157892"/>
-              <a:chOff x="7397044" y="1826981"/>
-              <a:chExt cx="1197329" cy="1157892"/>
-            </a:xfrm>
-          </p:grpSpPr>
-          <p:sp>
-            <p:nvSpPr>
-              <p:cNvPr id="98" name="Arc 97">
-                <a:extLst>
-                  <a:ext uri="{FF2B5EF4-FFF2-40B4-BE49-F238E27FC236}">
-                    <a16:creationId xmlns:a16="http://schemas.microsoft.com/office/drawing/2014/main" id="{8C3A8CB9-4177-0CF3-42FF-31088089AAE3}"/>
-                  </a:ext>
-                </a:extLst>
-              </p:cNvPr>
-              <p:cNvSpPr/>
-              <p:nvPr/>
-            </p:nvSpPr>
-            <p:spPr>
-              <a:xfrm rot="4618857">
-                <a:off x="7416763" y="1807262"/>
-                <a:ext cx="1157892" cy="1197329"/>
-              </a:xfrm>
-              <a:prstGeom prst="arc">
-                <a:avLst>
-                  <a:gd name="adj1" fmla="val 17539082"/>
-                  <a:gd name="adj2" fmla="val 20763886"/>
-                </a:avLst>
-              </a:prstGeom>
-            </p:spPr>
-            <p:style>
-              <a:lnRef idx="2">
-                <a:schemeClr val="accent1"/>
-              </a:lnRef>
-              <a:fillRef idx="0">
-                <a:schemeClr val="accent1"/>
-              </a:fillRef>
-              <a:effectRef idx="1">
-                <a:schemeClr val="accent1"/>
-              </a:effectRef>
-              <a:fontRef idx="minor">
-                <a:schemeClr val="tx1"/>
-              </a:fontRef>
-            </p:style>
-            <p:txBody>
-              <a:bodyPr rtlCol="0" anchor="ctr"/>
-              <a:lstStyle/>
-              <a:p>
-                <a:pPr algn="ctr"/>
-                <a:endParaRPr lang="en-GB"/>
-              </a:p>
-            </p:txBody>
-          </p:sp>
-          <p:sp>
-            <p:nvSpPr>
-              <p:cNvPr id="99" name="Isosceles Triangle 98">
-                <a:extLst>
-                  <a:ext uri="{FF2B5EF4-FFF2-40B4-BE49-F238E27FC236}">
-                    <a16:creationId xmlns:a16="http://schemas.microsoft.com/office/drawing/2014/main" id="{235ABB20-0EA1-C6A7-46B8-6B2D0465A522}"/>
-                  </a:ext>
-                </a:extLst>
-              </p:cNvPr>
-              <p:cNvSpPr/>
-              <p:nvPr/>
-            </p:nvSpPr>
-            <p:spPr>
-              <a:xfrm rot="14734878">
-                <a:off x="8189733" y="2885960"/>
-                <a:ext cx="48570" cy="114725"/>
-              </a:xfrm>
-              <a:prstGeom prst="triangle">
-                <a:avLst>
-                  <a:gd name="adj" fmla="val 86933"/>
-                </a:avLst>
-              </a:prstGeom>
-            </p:spPr>
-            <p:style>
-              <a:lnRef idx="2">
-                <a:schemeClr val="accent1">
-                  <a:shade val="15000"/>
-                </a:schemeClr>
-              </a:lnRef>
-              <a:fillRef idx="1">
-                <a:schemeClr val="accent1"/>
-              </a:fillRef>
-              <a:effectRef idx="0">
-                <a:schemeClr val="accent1"/>
-              </a:effectRef>
-              <a:fontRef idx="minor">
-                <a:schemeClr val="lt1"/>
-              </a:fontRef>
-            </p:style>
-            <p:txBody>
-              <a:bodyPr rtlCol="0" anchor="ctr"/>
-              <a:lstStyle/>
-              <a:p>
-                <a:pPr algn="ctr"/>
-                <a:endParaRPr lang="en-GB"/>
-              </a:p>
-            </p:txBody>
-          </p:sp>
-        </p:grpSp>
-        <p:grpSp>
-          <p:nvGrpSpPr>
-            <p:cNvPr id="102" name="Group 101">
-              <a:extLst>
-                <a:ext uri="{FF2B5EF4-FFF2-40B4-BE49-F238E27FC236}">
-                  <a16:creationId xmlns:a16="http://schemas.microsoft.com/office/drawing/2014/main" id="{0734C665-3102-D50D-FD9B-CA1928B62E0B}"/>
-                </a:ext>
-              </a:extLst>
-            </p:cNvPr>
-            <p:cNvGrpSpPr/>
-            <p:nvPr/>
-          </p:nvGrpSpPr>
-          <p:grpSpPr>
-            <a:xfrm>
-              <a:off x="7661293" y="2123016"/>
-              <a:ext cx="1299763" cy="794562"/>
-              <a:chOff x="7661293" y="2123016"/>
-              <a:chExt cx="1299763" cy="794562"/>
-            </a:xfrm>
-          </p:grpSpPr>
-          <p:grpSp>
-            <p:nvGrpSpPr>
-              <p:cNvPr id="73" name="Group 72">
-                <a:extLst>
-                  <a:ext uri="{FF2B5EF4-FFF2-40B4-BE49-F238E27FC236}">
-                    <a16:creationId xmlns:a16="http://schemas.microsoft.com/office/drawing/2014/main" id="{0FACDEEE-5308-2040-8460-5511B15C177C}"/>
-                  </a:ext>
-                </a:extLst>
-              </p:cNvPr>
-              <p:cNvGrpSpPr/>
-              <p:nvPr/>
-            </p:nvGrpSpPr>
-            <p:grpSpPr>
-              <a:xfrm>
-                <a:off x="7661293" y="2123016"/>
-                <a:ext cx="1299763" cy="794562"/>
-                <a:chOff x="7661293" y="2123016"/>
-                <a:chExt cx="1299763" cy="794562"/>
-              </a:xfrm>
-            </p:grpSpPr>
-            <p:grpSp>
-              <p:nvGrpSpPr>
-                <p:cNvPr id="69" name="Group 68">
-                  <a:extLst>
-                    <a:ext uri="{FF2B5EF4-FFF2-40B4-BE49-F238E27FC236}">
-                      <a16:creationId xmlns:a16="http://schemas.microsoft.com/office/drawing/2014/main" id="{5389DF24-D112-2CDD-919A-CAF086FDEC12}"/>
-                    </a:ext>
-                  </a:extLst>
-                </p:cNvPr>
-                <p:cNvGrpSpPr/>
-                <p:nvPr/>
-              </p:nvGrpSpPr>
-              <p:grpSpPr>
-                <a:xfrm>
-                  <a:off x="7916793" y="2310280"/>
-                  <a:ext cx="397510" cy="442540"/>
-                  <a:chOff x="7863840" y="1678360"/>
-                  <a:chExt cx="397510" cy="442540"/>
-                </a:xfrm>
-              </p:grpSpPr>
-              <p:cxnSp>
-                <p:nvCxnSpPr>
-                  <p:cNvPr id="62" name="Straight Arrow Connector 61">
-                    <a:extLst>
-                      <a:ext uri="{FF2B5EF4-FFF2-40B4-BE49-F238E27FC236}">
-                        <a16:creationId xmlns:a16="http://schemas.microsoft.com/office/drawing/2014/main" id="{97029C12-9CA8-1E19-E79B-B41A947FF8A0}"/>
-                      </a:ext>
-                    </a:extLst>
-                  </p:cNvPr>
-                  <p:cNvCxnSpPr>
-                    <a:cxnSpLocks/>
-                  </p:cNvCxnSpPr>
-                  <p:nvPr/>
-                </p:nvCxnSpPr>
-                <p:spPr>
-                  <a:xfrm>
-                    <a:off x="7863840" y="1678360"/>
-                    <a:ext cx="0" cy="442540"/>
-                  </a:xfrm>
-                  <a:prstGeom prst="straightConnector1">
-                    <a:avLst/>
-                  </a:prstGeom>
-                  <a:ln>
-                    <a:tailEnd type="triangle"/>
-                  </a:ln>
-                </p:spPr>
-                <p:style>
-                  <a:lnRef idx="2">
-                    <a:schemeClr val="accent1"/>
-                  </a:lnRef>
-                  <a:fillRef idx="0">
-                    <a:schemeClr val="accent1"/>
-                  </a:fillRef>
-                  <a:effectRef idx="1">
-                    <a:schemeClr val="accent1"/>
-                  </a:effectRef>
-                  <a:fontRef idx="minor">
-                    <a:schemeClr val="tx1"/>
-                  </a:fontRef>
-                </p:style>
-              </p:cxnSp>
-              <p:cxnSp>
-                <p:nvCxnSpPr>
-                  <p:cNvPr id="63" name="Straight Arrow Connector 62">
-                    <a:extLst>
-                      <a:ext uri="{FF2B5EF4-FFF2-40B4-BE49-F238E27FC236}">
-                        <a16:creationId xmlns:a16="http://schemas.microsoft.com/office/drawing/2014/main" id="{56B7EF24-58D6-D99B-BC2D-0A60E433E093}"/>
-                      </a:ext>
-                    </a:extLst>
-                  </p:cNvPr>
-                  <p:cNvCxnSpPr>
-                    <a:cxnSpLocks/>
-                  </p:cNvCxnSpPr>
-                  <p:nvPr/>
-                </p:nvCxnSpPr>
-                <p:spPr>
-                  <a:xfrm>
-                    <a:off x="7863840" y="1678360"/>
-                    <a:ext cx="397510" cy="0"/>
-                  </a:xfrm>
-                  <a:prstGeom prst="straightConnector1">
-                    <a:avLst/>
-                  </a:prstGeom>
-                  <a:ln>
-                    <a:tailEnd type="triangle"/>
-                  </a:ln>
-                </p:spPr>
-                <p:style>
-                  <a:lnRef idx="2">
-                    <a:schemeClr val="accent1"/>
-                  </a:lnRef>
-                  <a:fillRef idx="0">
-                    <a:schemeClr val="accent1"/>
-                  </a:fillRef>
-                  <a:effectRef idx="1">
-                    <a:schemeClr val="accent1"/>
-                  </a:effectRef>
-                  <a:fontRef idx="minor">
-                    <a:schemeClr val="tx1"/>
-                  </a:fontRef>
-                </p:style>
-              </p:cxnSp>
-            </p:grpSp>
-            <p:sp>
-              <p:nvSpPr>
-                <p:cNvPr id="70" name="TextBox 69">
-                  <a:extLst>
-                    <a:ext uri="{FF2B5EF4-FFF2-40B4-BE49-F238E27FC236}">
-                      <a16:creationId xmlns:a16="http://schemas.microsoft.com/office/drawing/2014/main" id="{C3E2EDFC-5C2E-785F-63E8-6CD39AA6FF9F}"/>
-                    </a:ext>
-                  </a:extLst>
-                </p:cNvPr>
-                <p:cNvSpPr txBox="1"/>
-                <p:nvPr/>
-              </p:nvSpPr>
-              <p:spPr>
-                <a:xfrm>
-                  <a:off x="7919766" y="2686746"/>
-                  <a:ext cx="248331" cy="230832"/>
-                </a:xfrm>
-                <a:prstGeom prst="rect">
-                  <a:avLst/>
-                </a:prstGeom>
-                <a:noFill/>
-              </p:spPr>
-              <p:txBody>
-                <a:bodyPr wrap="square" rtlCol="0">
-                  <a:spAutoFit/>
-                </a:bodyPr>
-                <a:lstStyle/>
-                <a:p>
-                  <a:r>
-                    <a:rPr lang="en-GB" sz="900" b="1" dirty="0"/>
-                    <a:t>Y</a:t>
-                  </a:r>
-                </a:p>
-              </p:txBody>
-            </p:sp>
-            <p:sp>
-              <p:nvSpPr>
-                <p:cNvPr id="71" name="TextBox 70">
-                  <a:extLst>
-                    <a:ext uri="{FF2B5EF4-FFF2-40B4-BE49-F238E27FC236}">
-                      <a16:creationId xmlns:a16="http://schemas.microsoft.com/office/drawing/2014/main" id="{141D889D-6DE5-D18D-9731-F23FF101BE30}"/>
-                    </a:ext>
-                  </a:extLst>
-                </p:cNvPr>
-                <p:cNvSpPr txBox="1"/>
-                <p:nvPr/>
-              </p:nvSpPr>
-              <p:spPr>
-                <a:xfrm>
-                  <a:off x="8314303" y="2194863"/>
-                  <a:ext cx="248331" cy="230832"/>
-                </a:xfrm>
-                <a:prstGeom prst="rect">
-                  <a:avLst/>
-                </a:prstGeom>
-                <a:noFill/>
-              </p:spPr>
-              <p:txBody>
-                <a:bodyPr wrap="square" rtlCol="0">
-                  <a:spAutoFit/>
-                </a:bodyPr>
-                <a:lstStyle/>
-                <a:p>
-                  <a:r>
-                    <a:rPr lang="en-GB" sz="900" b="1" dirty="0"/>
-                    <a:t>X</a:t>
-                  </a:r>
-                </a:p>
-              </p:txBody>
-            </p:sp>
-            <p:sp>
-              <p:nvSpPr>
-                <p:cNvPr id="72" name="TextBox 71">
-                  <a:extLst>
-                    <a:ext uri="{FF2B5EF4-FFF2-40B4-BE49-F238E27FC236}">
-                      <a16:creationId xmlns:a16="http://schemas.microsoft.com/office/drawing/2014/main" id="{C4C50339-3C61-FE1C-5F9E-FB5E88D3D4DB}"/>
-                    </a:ext>
-                  </a:extLst>
-                </p:cNvPr>
-                <p:cNvSpPr txBox="1"/>
-                <p:nvPr/>
-              </p:nvSpPr>
-              <p:spPr>
-                <a:xfrm>
-                  <a:off x="7661293" y="2123016"/>
-                  <a:ext cx="248331" cy="230832"/>
-                </a:xfrm>
-                <a:prstGeom prst="rect">
-                  <a:avLst/>
-                </a:prstGeom>
-                <a:noFill/>
-              </p:spPr>
-              <p:txBody>
-                <a:bodyPr wrap="square" rtlCol="0">
-                  <a:spAutoFit/>
-                </a:bodyPr>
-                <a:lstStyle/>
-                <a:p>
-                  <a:r>
-                    <a:rPr lang="en-GB" sz="900" b="1" dirty="0"/>
-                    <a:t>Z</a:t>
-                  </a:r>
-                </a:p>
-              </p:txBody>
-            </p:sp>
-            <p:sp>
-              <p:nvSpPr>
-                <p:cNvPr id="104" name="TextBox 103">
-                  <a:extLst>
-                    <a:ext uri="{FF2B5EF4-FFF2-40B4-BE49-F238E27FC236}">
-                      <a16:creationId xmlns:a16="http://schemas.microsoft.com/office/drawing/2014/main" id="{DC4B642A-8707-E821-5045-A2B0E2A4A68A}"/>
-                    </a:ext>
-                  </a:extLst>
-                </p:cNvPr>
-                <p:cNvSpPr txBox="1"/>
-                <p:nvPr/>
-              </p:nvSpPr>
-              <p:spPr>
-                <a:xfrm>
-                  <a:off x="8425060" y="2717523"/>
-                  <a:ext cx="535996" cy="200055"/>
-                </a:xfrm>
-                <a:prstGeom prst="rect">
-                  <a:avLst/>
-                </a:prstGeom>
-                <a:noFill/>
-              </p:spPr>
-              <p:txBody>
-                <a:bodyPr wrap="square" rtlCol="0">
-                  <a:spAutoFit/>
-                </a:bodyPr>
-                <a:lstStyle/>
-                <a:p>
-                  <a:r>
-                    <a:rPr lang="en-GB" sz="700" b="1" dirty="0"/>
-                    <a:t>CW + ve</a:t>
-                  </a:r>
-                </a:p>
-              </p:txBody>
-            </p:sp>
-          </p:grpSp>
-          <p:sp>
-            <p:nvSpPr>
-              <p:cNvPr id="101" name="Oval 100">
-                <a:extLst>
-                  <a:ext uri="{FF2B5EF4-FFF2-40B4-BE49-F238E27FC236}">
-                    <a16:creationId xmlns:a16="http://schemas.microsoft.com/office/drawing/2014/main" id="{1A217682-46A0-0A56-6FE6-AD95CA53F9E6}"/>
-                  </a:ext>
-                </a:extLst>
-              </p:cNvPr>
-              <p:cNvSpPr/>
-              <p:nvPr/>
-            </p:nvSpPr>
-            <p:spPr>
-              <a:xfrm>
-                <a:off x="7863302" y="2260208"/>
-                <a:ext cx="111268" cy="111268"/>
-              </a:xfrm>
-              <a:prstGeom prst="ellipse">
-                <a:avLst/>
-              </a:prstGeom>
-            </p:spPr>
-            <p:style>
-              <a:lnRef idx="2">
-                <a:schemeClr val="accent1">
-                  <a:shade val="15000"/>
-                </a:schemeClr>
-              </a:lnRef>
-              <a:fillRef idx="1">
-                <a:schemeClr val="accent1"/>
-              </a:fillRef>
-              <a:effectRef idx="0">
-                <a:schemeClr val="accent1"/>
-              </a:effectRef>
-              <a:fontRef idx="minor">
-                <a:schemeClr val="lt1"/>
-              </a:fontRef>
-            </p:style>
-            <p:txBody>
-              <a:bodyPr rtlCol="0" anchor="ctr"/>
-              <a:lstStyle/>
-              <a:p>
-                <a:pPr algn="ctr"/>
-                <a:endParaRPr lang="en-GB"/>
-              </a:p>
-            </p:txBody>
-          </p:sp>
-        </p:grpSp>
-      </p:grpSp>
       <p:sp>
         <p:nvSpPr>
           <p:cNvPr id="107" name="Rectangle: Rounded Corners 106">
@@ -11629,296 +11412,6 @@
           </a:p>
         </p:txBody>
       </p:sp>
-      <p:grpSp>
-        <p:nvGrpSpPr>
-          <p:cNvPr id="110" name="Group 109">
-            <a:extLst>
-              <a:ext uri="{FF2B5EF4-FFF2-40B4-BE49-F238E27FC236}">
-                <a16:creationId xmlns:a16="http://schemas.microsoft.com/office/drawing/2014/main" id="{F230C9DA-C921-4CC2-CF11-5ED832CA6E11}"/>
-              </a:ext>
-            </a:extLst>
-          </p:cNvPr>
-          <p:cNvGrpSpPr/>
-          <p:nvPr/>
-        </p:nvGrpSpPr>
-        <p:grpSpPr>
-          <a:xfrm>
-            <a:off x="2434824" y="1359027"/>
-            <a:ext cx="1429712" cy="1224660"/>
-            <a:chOff x="2434824" y="1359027"/>
-            <a:chExt cx="1418367" cy="1224660"/>
-          </a:xfrm>
-        </p:grpSpPr>
-        <p:grpSp>
-          <p:nvGrpSpPr>
-            <p:cNvPr id="96" name="Group 95">
-              <a:extLst>
-                <a:ext uri="{FF2B5EF4-FFF2-40B4-BE49-F238E27FC236}">
-                  <a16:creationId xmlns:a16="http://schemas.microsoft.com/office/drawing/2014/main" id="{E68C9D5D-2CE1-E7D3-76ED-A2AD2860A879}"/>
-                </a:ext>
-              </a:extLst>
-            </p:cNvPr>
-            <p:cNvGrpSpPr/>
-            <p:nvPr/>
-          </p:nvGrpSpPr>
-          <p:grpSpPr>
-            <a:xfrm>
-              <a:off x="2544627" y="1414779"/>
-              <a:ext cx="1164256" cy="1168908"/>
-              <a:chOff x="7036568" y="3635884"/>
-              <a:chExt cx="1164256" cy="1168908"/>
-            </a:xfrm>
-          </p:grpSpPr>
-          <p:sp>
-            <p:nvSpPr>
-              <p:cNvPr id="91" name="Arrow: Quad 90">
-                <a:extLst>
-                  <a:ext uri="{FF2B5EF4-FFF2-40B4-BE49-F238E27FC236}">
-                    <a16:creationId xmlns:a16="http://schemas.microsoft.com/office/drawing/2014/main" id="{ED438122-9A63-D880-BAC6-4AC659AF7439}"/>
-                  </a:ext>
-                </a:extLst>
-              </p:cNvPr>
-              <p:cNvSpPr/>
-              <p:nvPr/>
-            </p:nvSpPr>
-            <p:spPr>
-              <a:xfrm>
-                <a:off x="7303814" y="3900238"/>
-                <a:ext cx="619885" cy="642944"/>
-              </a:xfrm>
-              <a:prstGeom prst="quadArrow">
-                <a:avLst>
-                  <a:gd name="adj1" fmla="val 2555"/>
-                  <a:gd name="adj2" fmla="val 8503"/>
-                  <a:gd name="adj3" fmla="val 19552"/>
-                </a:avLst>
-              </a:prstGeom>
-            </p:spPr>
-            <p:style>
-              <a:lnRef idx="2">
-                <a:schemeClr val="accent1">
-                  <a:shade val="15000"/>
-                </a:schemeClr>
-              </a:lnRef>
-              <a:fillRef idx="1">
-                <a:schemeClr val="accent1"/>
-              </a:fillRef>
-              <a:effectRef idx="0">
-                <a:schemeClr val="accent1"/>
-              </a:effectRef>
-              <a:fontRef idx="minor">
-                <a:schemeClr val="lt1"/>
-              </a:fontRef>
-            </p:style>
-            <p:txBody>
-              <a:bodyPr rtlCol="0" anchor="ctr"/>
-              <a:lstStyle/>
-              <a:p>
-                <a:pPr algn="ctr"/>
-                <a:endParaRPr lang="en-GB"/>
-              </a:p>
-            </p:txBody>
-          </p:sp>
-          <p:sp>
-            <p:nvSpPr>
-              <p:cNvPr id="92" name="TextBox 91">
-                <a:extLst>
-                  <a:ext uri="{FF2B5EF4-FFF2-40B4-BE49-F238E27FC236}">
-                    <a16:creationId xmlns:a16="http://schemas.microsoft.com/office/drawing/2014/main" id="{56D4450F-4815-6AC5-1557-0D5F1EB386E5}"/>
-                  </a:ext>
-                </a:extLst>
-              </p:cNvPr>
-              <p:cNvSpPr txBox="1"/>
-              <p:nvPr/>
-            </p:nvSpPr>
-            <p:spPr>
-              <a:xfrm>
-                <a:off x="7484363" y="3635884"/>
-                <a:ext cx="248331" cy="261610"/>
-              </a:xfrm>
-              <a:prstGeom prst="rect">
-                <a:avLst/>
-              </a:prstGeom>
-              <a:noFill/>
-            </p:spPr>
-            <p:txBody>
-              <a:bodyPr wrap="square" rtlCol="0">
-                <a:spAutoFit/>
-              </a:bodyPr>
-              <a:lstStyle/>
-              <a:p>
-                <a:pPr algn="ctr"/>
-                <a:r>
-                  <a:rPr lang="en-GB" sz="1100" b="1" dirty="0"/>
-                  <a:t>N</a:t>
-                </a:r>
-              </a:p>
-            </p:txBody>
-          </p:sp>
-          <p:sp>
-            <p:nvSpPr>
-              <p:cNvPr id="93" name="TextBox 92">
-                <a:extLst>
-                  <a:ext uri="{FF2B5EF4-FFF2-40B4-BE49-F238E27FC236}">
-                    <a16:creationId xmlns:a16="http://schemas.microsoft.com/office/drawing/2014/main" id="{106D13F5-7032-3233-37FB-B267EA56BC1C}"/>
-                  </a:ext>
-                </a:extLst>
-              </p:cNvPr>
-              <p:cNvSpPr txBox="1"/>
-              <p:nvPr/>
-            </p:nvSpPr>
-            <p:spPr>
-              <a:xfrm>
-                <a:off x="7493906" y="4543182"/>
-                <a:ext cx="248331" cy="261610"/>
-              </a:xfrm>
-              <a:prstGeom prst="rect">
-                <a:avLst/>
-              </a:prstGeom>
-              <a:noFill/>
-            </p:spPr>
-            <p:txBody>
-              <a:bodyPr wrap="square" rtlCol="0">
-                <a:spAutoFit/>
-              </a:bodyPr>
-              <a:lstStyle/>
-              <a:p>
-                <a:pPr algn="ctr"/>
-                <a:r>
-                  <a:rPr lang="en-GB" sz="1100" b="1" dirty="0"/>
-                  <a:t>S</a:t>
-                </a:r>
-              </a:p>
-            </p:txBody>
-          </p:sp>
-          <p:sp>
-            <p:nvSpPr>
-              <p:cNvPr id="94" name="TextBox 93">
-                <a:extLst>
-                  <a:ext uri="{FF2B5EF4-FFF2-40B4-BE49-F238E27FC236}">
-                    <a16:creationId xmlns:a16="http://schemas.microsoft.com/office/drawing/2014/main" id="{382B5113-8189-5DE7-9223-ECED089BB574}"/>
-                  </a:ext>
-                </a:extLst>
-              </p:cNvPr>
-              <p:cNvSpPr txBox="1"/>
-              <p:nvPr/>
-            </p:nvSpPr>
-            <p:spPr>
-              <a:xfrm>
-                <a:off x="7952493" y="4090905"/>
-                <a:ext cx="248331" cy="261610"/>
-              </a:xfrm>
-              <a:prstGeom prst="rect">
-                <a:avLst/>
-              </a:prstGeom>
-              <a:noFill/>
-            </p:spPr>
-            <p:txBody>
-              <a:bodyPr wrap="square" rtlCol="0">
-                <a:spAutoFit/>
-              </a:bodyPr>
-              <a:lstStyle/>
-              <a:p>
-                <a:pPr algn="ctr"/>
-                <a:r>
-                  <a:rPr lang="en-GB" sz="1100" b="1" dirty="0"/>
-                  <a:t>E</a:t>
-                </a:r>
-              </a:p>
-            </p:txBody>
-          </p:sp>
-          <p:sp>
-            <p:nvSpPr>
-              <p:cNvPr id="95" name="TextBox 94">
-                <a:extLst>
-                  <a:ext uri="{FF2B5EF4-FFF2-40B4-BE49-F238E27FC236}">
-                    <a16:creationId xmlns:a16="http://schemas.microsoft.com/office/drawing/2014/main" id="{B9413C58-F014-F662-E6C6-0211B6852852}"/>
-                  </a:ext>
-                </a:extLst>
-              </p:cNvPr>
-              <p:cNvSpPr txBox="1"/>
-              <p:nvPr/>
-            </p:nvSpPr>
-            <p:spPr>
-              <a:xfrm>
-                <a:off x="7036568" y="4090905"/>
-                <a:ext cx="248331" cy="261610"/>
-              </a:xfrm>
-              <a:prstGeom prst="rect">
-                <a:avLst/>
-              </a:prstGeom>
-              <a:noFill/>
-            </p:spPr>
-            <p:txBody>
-              <a:bodyPr wrap="square" rtlCol="0">
-                <a:spAutoFit/>
-              </a:bodyPr>
-              <a:lstStyle/>
-              <a:p>
-                <a:pPr algn="ctr"/>
-                <a:r>
-                  <a:rPr lang="en-GB" sz="1100" b="1" dirty="0"/>
-                  <a:t>W</a:t>
-                </a:r>
-              </a:p>
-            </p:txBody>
-          </p:sp>
-        </p:grpSp>
-        <p:sp>
-          <p:nvSpPr>
-            <p:cNvPr id="108" name="Rectangle: Rounded Corners 107">
-              <a:extLst>
-                <a:ext uri="{FF2B5EF4-FFF2-40B4-BE49-F238E27FC236}">
-                  <a16:creationId xmlns:a16="http://schemas.microsoft.com/office/drawing/2014/main" id="{9BB9D698-BC36-B469-6013-8DC95085C189}"/>
-                </a:ext>
-              </a:extLst>
-            </p:cNvPr>
-            <p:cNvSpPr/>
-            <p:nvPr/>
-          </p:nvSpPr>
-          <p:spPr>
-            <a:xfrm>
-              <a:off x="2434824" y="1359027"/>
-              <a:ext cx="1418367" cy="1224660"/>
-            </a:xfrm>
-            <a:prstGeom prst="roundRect">
-              <a:avLst/>
-            </a:prstGeom>
-            <a:noFill/>
-            <a:ln w="9525" cap="flat" cmpd="sng" algn="ctr">
-              <a:solidFill>
-                <a:schemeClr val="dk1"/>
-              </a:solidFill>
-              <a:prstDash val="solid"/>
-              <a:round/>
-              <a:headEnd type="none" w="med" len="med"/>
-              <a:tailEnd type="none" w="med" len="med"/>
-            </a:ln>
-          </p:spPr>
-          <p:style>
-            <a:lnRef idx="0">
-              <a:scrgbClr r="0" g="0" b="0"/>
-            </a:lnRef>
-            <a:fillRef idx="0">
-              <a:scrgbClr r="0" g="0" b="0"/>
-            </a:fillRef>
-            <a:effectRef idx="0">
-              <a:scrgbClr r="0" g="0" b="0"/>
-            </a:effectRef>
-            <a:fontRef idx="minor">
-              <a:schemeClr val="dk1"/>
-            </a:fontRef>
-          </p:style>
-          <p:txBody>
-            <a:bodyPr rtlCol="0" anchor="ctr"/>
-            <a:lstStyle/>
-            <a:p>
-              <a:pPr algn="ctr"/>
-              <a:endParaRPr lang="en-GB"/>
-            </a:p>
-          </p:txBody>
-        </p:sp>
-      </p:grpSp>
       <p:grpSp>
         <p:nvGrpSpPr>
           <p:cNvPr id="74" name="Group 73">
@@ -12194,12 +11687,1463 @@
           </p:txBody>
         </p:sp>
       </p:grpSp>
+    </p:spTree>
+    <p:extLst>
+      <p:ext uri="{BB962C8B-B14F-4D97-AF65-F5344CB8AC3E}">
+        <p14:creationId xmlns:p14="http://schemas.microsoft.com/office/powerpoint/2010/main" val="387684819"/>
+      </p:ext>
+    </p:extLst>
+  </p:cSld>
+  <p:clrMapOvr>
+    <a:masterClrMapping/>
+  </p:clrMapOvr>
+</p:sld>
+</file>
+
+<file path=ppt/slides/slide7.xml><?xml version="1.0" encoding="utf-8"?>
+<p:sld xmlns:a="http://schemas.openxmlformats.org/drawingml/2006/main" xmlns:r="http://schemas.openxmlformats.org/officeDocument/2006/relationships" xmlns:p="http://schemas.openxmlformats.org/presentationml/2006/main">
+  <p:cSld>
+    <p:spTree>
+      <p:nvGrpSpPr>
+        <p:cNvPr id="1" name="">
+          <a:extLst>
+            <a:ext uri="{FF2B5EF4-FFF2-40B4-BE49-F238E27FC236}">
+              <a16:creationId xmlns:a16="http://schemas.microsoft.com/office/drawing/2014/main" id="{7B16CE8C-9984-2273-1A20-75CEB8219B71}"/>
+            </a:ext>
+          </a:extLst>
+        </p:cNvPr>
+        <p:cNvGrpSpPr/>
+        <p:nvPr/>
+      </p:nvGrpSpPr>
+      <p:grpSpPr>
+        <a:xfrm>
+          <a:off x="0" y="0"/>
+          <a:ext cx="0" cy="0"/>
+          <a:chOff x="0" y="0"/>
+          <a:chExt cx="0" cy="0"/>
+        </a:xfrm>
+      </p:grpSpPr>
+      <p:grpSp>
+        <p:nvGrpSpPr>
+          <p:cNvPr id="24" name="Group 23">
+            <a:extLst>
+              <a:ext uri="{FF2B5EF4-FFF2-40B4-BE49-F238E27FC236}">
+                <a16:creationId xmlns:a16="http://schemas.microsoft.com/office/drawing/2014/main" id="{95A6F4D7-08F3-3B3A-6647-50379D65BE5F}"/>
+              </a:ext>
+            </a:extLst>
+          </p:cNvPr>
+          <p:cNvGrpSpPr/>
+          <p:nvPr/>
+        </p:nvGrpSpPr>
+        <p:grpSpPr>
+          <a:xfrm rot="20700000">
+            <a:off x="3628333" y="2163838"/>
+            <a:ext cx="2775920" cy="2775920"/>
+            <a:chOff x="7378485" y="2192066"/>
+            <a:chExt cx="2775920" cy="2775920"/>
+          </a:xfrm>
+        </p:grpSpPr>
+        <p:sp>
+          <p:nvSpPr>
+            <p:cNvPr id="25" name="Oval 24">
+              <a:extLst>
+                <a:ext uri="{FF2B5EF4-FFF2-40B4-BE49-F238E27FC236}">
+                  <a16:creationId xmlns:a16="http://schemas.microsoft.com/office/drawing/2014/main" id="{C783DE91-600E-3E8F-AD59-CE193FD14463}"/>
+                </a:ext>
+              </a:extLst>
+            </p:cNvPr>
+            <p:cNvSpPr/>
+            <p:nvPr/>
+          </p:nvSpPr>
+          <p:spPr>
+            <a:xfrm>
+              <a:off x="7378485" y="2192066"/>
+              <a:ext cx="2775920" cy="2775920"/>
+            </a:xfrm>
+            <a:prstGeom prst="ellipse">
+              <a:avLst/>
+            </a:prstGeom>
+            <a:noFill/>
+            <a:ln w="9525" cap="flat" cmpd="sng" algn="ctr">
+              <a:solidFill>
+                <a:schemeClr val="accent1"/>
+              </a:solidFill>
+              <a:prstDash val="solid"/>
+              <a:round/>
+              <a:headEnd type="none" w="med" len="med"/>
+              <a:tailEnd type="none" w="med" len="med"/>
+            </a:ln>
+          </p:spPr>
+          <p:style>
+            <a:lnRef idx="0">
+              <a:scrgbClr r="0" g="0" b="0"/>
+            </a:lnRef>
+            <a:fillRef idx="0">
+              <a:scrgbClr r="0" g="0" b="0"/>
+            </a:fillRef>
+            <a:effectRef idx="0">
+              <a:scrgbClr r="0" g="0" b="0"/>
+            </a:effectRef>
+            <a:fontRef idx="minor">
+              <a:schemeClr val="accent1"/>
+            </a:fontRef>
+          </p:style>
+          <p:txBody>
+            <a:bodyPr rtlCol="0" anchor="ctr"/>
+            <a:lstStyle/>
+            <a:p>
+              <a:pPr algn="ctr"/>
+              <a:endParaRPr lang="en-GB" dirty="0"/>
+            </a:p>
+          </p:txBody>
+        </p:sp>
+        <p:pic>
+          <p:nvPicPr>
+            <p:cNvPr id="26" name="Picture 25">
+              <a:extLst>
+                <a:ext uri="{FF2B5EF4-FFF2-40B4-BE49-F238E27FC236}">
+                  <a16:creationId xmlns:a16="http://schemas.microsoft.com/office/drawing/2014/main" id="{4D45806B-A902-758B-63DC-9AB1CB4DF5CE}"/>
+                </a:ext>
+              </a:extLst>
+            </p:cNvPr>
+            <p:cNvPicPr>
+              <a:picLocks noChangeAspect="1"/>
+            </p:cNvPicPr>
+            <p:nvPr/>
+          </p:nvPicPr>
+          <p:blipFill>
+            <a:blip r:embed="rId2"/>
+            <a:stretch>
+              <a:fillRect/>
+            </a:stretch>
+          </p:blipFill>
+          <p:spPr>
+            <a:xfrm>
+              <a:off x="7473240" y="3076280"/>
+              <a:ext cx="2500210" cy="758322"/>
+            </a:xfrm>
+            <a:prstGeom prst="rect">
+              <a:avLst/>
+            </a:prstGeom>
+          </p:spPr>
+        </p:pic>
+      </p:grpSp>
+      <p:cxnSp>
+        <p:nvCxnSpPr>
+          <p:cNvPr id="35" name="Straight Connector 34">
+            <a:extLst>
+              <a:ext uri="{FF2B5EF4-FFF2-40B4-BE49-F238E27FC236}">
+                <a16:creationId xmlns:a16="http://schemas.microsoft.com/office/drawing/2014/main" id="{006A49C4-B04C-B3C1-CBA6-6E5D481BECEF}"/>
+              </a:ext>
+            </a:extLst>
+          </p:cNvPr>
+          <p:cNvCxnSpPr/>
+          <p:nvPr/>
+        </p:nvCxnSpPr>
+        <p:spPr>
+          <a:xfrm>
+            <a:off x="4997243" y="1678360"/>
+            <a:ext cx="0" cy="4100510"/>
+          </a:xfrm>
+          <a:prstGeom prst="line">
+            <a:avLst/>
+          </a:prstGeom>
+          <a:ln>
+            <a:prstDash val="dash"/>
+          </a:ln>
+        </p:spPr>
+        <p:style>
+          <a:lnRef idx="1">
+            <a:schemeClr val="accent1"/>
+          </a:lnRef>
+          <a:fillRef idx="0">
+            <a:schemeClr val="accent1"/>
+          </a:fillRef>
+          <a:effectRef idx="0">
+            <a:schemeClr val="accent1"/>
+          </a:effectRef>
+          <a:fontRef idx="minor">
+            <a:schemeClr val="tx1"/>
+          </a:fontRef>
+        </p:style>
+      </p:cxnSp>
+      <p:cxnSp>
+        <p:nvCxnSpPr>
+          <p:cNvPr id="36" name="Straight Connector 35">
+            <a:extLst>
+              <a:ext uri="{FF2B5EF4-FFF2-40B4-BE49-F238E27FC236}">
+                <a16:creationId xmlns:a16="http://schemas.microsoft.com/office/drawing/2014/main" id="{433DDAAB-335A-9E98-49E7-0A499492E241}"/>
+              </a:ext>
+            </a:extLst>
+          </p:cNvPr>
+          <p:cNvCxnSpPr>
+            <a:stCxn id="26" idx="0"/>
+          </p:cNvCxnSpPr>
+          <p:nvPr/>
+        </p:nvCxnSpPr>
+        <p:spPr>
+          <a:xfrm>
+            <a:off x="4844283" y="3076372"/>
+            <a:ext cx="332408" cy="1056034"/>
+          </a:xfrm>
+          <a:prstGeom prst="line">
+            <a:avLst/>
+          </a:prstGeom>
+        </p:spPr>
+        <p:style>
+          <a:lnRef idx="1">
+            <a:schemeClr val="accent1"/>
+          </a:lnRef>
+          <a:fillRef idx="0">
+            <a:schemeClr val="accent1"/>
+          </a:fillRef>
+          <a:effectRef idx="0">
+            <a:schemeClr val="accent1"/>
+          </a:effectRef>
+          <a:fontRef idx="minor">
+            <a:schemeClr val="tx1"/>
+          </a:fontRef>
+        </p:style>
+      </p:cxnSp>
+      <p:sp>
+        <p:nvSpPr>
+          <p:cNvPr id="52" name="Arc 51">
+            <a:extLst>
+              <a:ext uri="{FF2B5EF4-FFF2-40B4-BE49-F238E27FC236}">
+                <a16:creationId xmlns:a16="http://schemas.microsoft.com/office/drawing/2014/main" id="{EB4F3A6B-3F96-AD61-D440-1214D75A3C66}"/>
+              </a:ext>
+            </a:extLst>
+          </p:cNvPr>
+          <p:cNvSpPr/>
+          <p:nvPr/>
+        </p:nvSpPr>
+        <p:spPr>
+          <a:xfrm rot="7396005">
+            <a:off x="4990021" y="3761052"/>
+            <a:ext cx="90646" cy="90646"/>
+          </a:xfrm>
+          <a:prstGeom prst="arc">
+            <a:avLst/>
+          </a:prstGeom>
+          <a:ln>
+            <a:solidFill>
+              <a:schemeClr val="tx1"/>
+            </a:solidFill>
+          </a:ln>
+        </p:spPr>
+        <p:style>
+          <a:lnRef idx="1">
+            <a:schemeClr val="accent1"/>
+          </a:lnRef>
+          <a:fillRef idx="0">
+            <a:schemeClr val="accent1"/>
+          </a:fillRef>
+          <a:effectRef idx="0">
+            <a:schemeClr val="accent1"/>
+          </a:effectRef>
+          <a:fontRef idx="minor">
+            <a:schemeClr val="tx1"/>
+          </a:fontRef>
+        </p:style>
+        <p:txBody>
+          <a:bodyPr rtlCol="0" anchor="ctr"/>
+          <a:lstStyle/>
+          <a:p>
+            <a:pPr algn="ctr"/>
+            <a:endParaRPr lang="en-GB"/>
+          </a:p>
+        </p:txBody>
+      </p:sp>
+      <mc:AlternateContent xmlns:mc="http://schemas.openxmlformats.org/markup-compatibility/2006" xmlns:a14="http://schemas.microsoft.com/office/drawing/2010/main">
+        <mc:Choice Requires="a14">
+          <p:sp>
+            <p:nvSpPr>
+              <p:cNvPr id="55" name="TextBox 54">
+                <a:extLst>
+                  <a:ext uri="{FF2B5EF4-FFF2-40B4-BE49-F238E27FC236}">
+                    <a16:creationId xmlns:a16="http://schemas.microsoft.com/office/drawing/2014/main" id="{98251683-2159-E192-4825-A804A4A6B150}"/>
+                  </a:ext>
+                </a:extLst>
+              </p:cNvPr>
+              <p:cNvSpPr txBox="1"/>
+              <p:nvPr/>
+            </p:nvSpPr>
+            <p:spPr>
+              <a:xfrm>
+                <a:off x="5016293" y="3905200"/>
+                <a:ext cx="109774" cy="161583"/>
+              </a:xfrm>
+              <a:prstGeom prst="rect">
+                <a:avLst/>
+              </a:prstGeom>
+              <a:noFill/>
+            </p:spPr>
+            <p:txBody>
+              <a:bodyPr wrap="none" lIns="0" tIns="0" rIns="0" bIns="0" rtlCol="0">
+                <a:spAutoFit/>
+              </a:bodyPr>
+              <a:lstStyle/>
+              <a:p>
+                <a:pPr/>
+                <a14:m>
+                  <m:oMathPara xmlns:m="http://schemas.openxmlformats.org/officeDocument/2006/math">
+                    <m:oMathParaPr>
+                      <m:jc m:val="centerGroup"/>
+                    </m:oMathParaPr>
+                    <m:oMath xmlns:m="http://schemas.openxmlformats.org/officeDocument/2006/math">
+                      <m:r>
+                        <a:rPr lang="en-GB" sz="1050" i="1" smtClean="0">
+                          <a:latin typeface="Cambria Math" panose="02040503050406030204" pitchFamily="18" charset="0"/>
+                          <a:ea typeface="Cambria Math" panose="02040503050406030204" pitchFamily="18" charset="0"/>
+                        </a:rPr>
+                        <m:t>𝜃</m:t>
+                      </m:r>
+                    </m:oMath>
+                  </m:oMathPara>
+                </a14:m>
+                <a:endParaRPr lang="en-GB" dirty="0"/>
+              </a:p>
+            </p:txBody>
+          </p:sp>
+        </mc:Choice>
+        <mc:Fallback xmlns="">
+          <p:sp>
+            <p:nvSpPr>
+              <p:cNvPr id="55" name="TextBox 54">
+                <a:extLst>
+                  <a:ext uri="{FF2B5EF4-FFF2-40B4-BE49-F238E27FC236}">
+                    <a16:creationId xmlns:a16="http://schemas.microsoft.com/office/drawing/2014/main" id="{A75E6163-0F81-E602-2FDD-A7FEA64433FB}"/>
+                  </a:ext>
+                </a:extLst>
+              </p:cNvPr>
+              <p:cNvSpPr txBox="1">
+                <a:spLocks noRot="1" noChangeAspect="1" noMove="1" noResize="1" noEditPoints="1" noAdjustHandles="1" noChangeArrowheads="1" noChangeShapeType="1" noTextEdit="1"/>
+              </p:cNvSpPr>
+              <p:nvPr/>
+            </p:nvSpPr>
+            <p:spPr>
+              <a:xfrm>
+                <a:off x="5016293" y="3905200"/>
+                <a:ext cx="109774" cy="161583"/>
+              </a:xfrm>
+              <a:prstGeom prst="rect">
+                <a:avLst/>
+              </a:prstGeom>
+              <a:blipFill>
+                <a:blip r:embed="rId3"/>
+                <a:stretch>
+                  <a:fillRect l="-27778" r="-27778" b="-7692"/>
+                </a:stretch>
+              </a:blipFill>
+            </p:spPr>
+            <p:txBody>
+              <a:bodyPr/>
+              <a:lstStyle/>
+              <a:p>
+                <a:r>
+                  <a:rPr lang="en-GB">
+                    <a:noFill/>
+                  </a:rPr>
+                  <a:t> </a:t>
+                </a:r>
+              </a:p>
+            </p:txBody>
+          </p:sp>
+        </mc:Fallback>
+      </mc:AlternateContent>
+      <p:grpSp>
+        <p:nvGrpSpPr>
+          <p:cNvPr id="103" name="Group 102">
+            <a:extLst>
+              <a:ext uri="{FF2B5EF4-FFF2-40B4-BE49-F238E27FC236}">
+                <a16:creationId xmlns:a16="http://schemas.microsoft.com/office/drawing/2014/main" id="{9315F5C2-C089-853B-983F-71DBDC9C2B05}"/>
+              </a:ext>
+            </a:extLst>
+          </p:cNvPr>
+          <p:cNvGrpSpPr/>
+          <p:nvPr/>
+        </p:nvGrpSpPr>
+        <p:grpSpPr>
+          <a:xfrm>
+            <a:off x="6127341" y="1332162"/>
+            <a:ext cx="1564012" cy="1157892"/>
+            <a:chOff x="7397044" y="1826981"/>
+            <a:chExt cx="1564012" cy="1157892"/>
+          </a:xfrm>
+        </p:grpSpPr>
+        <p:grpSp>
+          <p:nvGrpSpPr>
+            <p:cNvPr id="100" name="Group 99">
+              <a:extLst>
+                <a:ext uri="{FF2B5EF4-FFF2-40B4-BE49-F238E27FC236}">
+                  <a16:creationId xmlns:a16="http://schemas.microsoft.com/office/drawing/2014/main" id="{98485148-E094-F35F-8D11-8F8C4E7E0356}"/>
+                </a:ext>
+              </a:extLst>
+            </p:cNvPr>
+            <p:cNvGrpSpPr/>
+            <p:nvPr/>
+          </p:nvGrpSpPr>
+          <p:grpSpPr>
+            <a:xfrm>
+              <a:off x="7397044" y="1826981"/>
+              <a:ext cx="1197329" cy="1157892"/>
+              <a:chOff x="7397044" y="1826981"/>
+              <a:chExt cx="1197329" cy="1157892"/>
+            </a:xfrm>
+          </p:grpSpPr>
+          <p:sp>
+            <p:nvSpPr>
+              <p:cNvPr id="98" name="Arc 97">
+                <a:extLst>
+                  <a:ext uri="{FF2B5EF4-FFF2-40B4-BE49-F238E27FC236}">
+                    <a16:creationId xmlns:a16="http://schemas.microsoft.com/office/drawing/2014/main" id="{F7612A3D-E2DC-21D7-C665-9D315C8F984C}"/>
+                  </a:ext>
+                </a:extLst>
+              </p:cNvPr>
+              <p:cNvSpPr/>
+              <p:nvPr/>
+            </p:nvSpPr>
+            <p:spPr>
+              <a:xfrm rot="4618857">
+                <a:off x="7416763" y="1807262"/>
+                <a:ext cx="1157892" cy="1197329"/>
+              </a:xfrm>
+              <a:prstGeom prst="arc">
+                <a:avLst>
+                  <a:gd name="adj1" fmla="val 17539082"/>
+                  <a:gd name="adj2" fmla="val 20763886"/>
+                </a:avLst>
+              </a:prstGeom>
+            </p:spPr>
+            <p:style>
+              <a:lnRef idx="2">
+                <a:schemeClr val="accent1"/>
+              </a:lnRef>
+              <a:fillRef idx="0">
+                <a:schemeClr val="accent1"/>
+              </a:fillRef>
+              <a:effectRef idx="1">
+                <a:schemeClr val="accent1"/>
+              </a:effectRef>
+              <a:fontRef idx="minor">
+                <a:schemeClr val="tx1"/>
+              </a:fontRef>
+            </p:style>
+            <p:txBody>
+              <a:bodyPr rtlCol="0" anchor="ctr"/>
+              <a:lstStyle/>
+              <a:p>
+                <a:pPr algn="ctr"/>
+                <a:endParaRPr lang="en-GB"/>
+              </a:p>
+            </p:txBody>
+          </p:sp>
+          <p:sp>
+            <p:nvSpPr>
+              <p:cNvPr id="99" name="Isosceles Triangle 98">
+                <a:extLst>
+                  <a:ext uri="{FF2B5EF4-FFF2-40B4-BE49-F238E27FC236}">
+                    <a16:creationId xmlns:a16="http://schemas.microsoft.com/office/drawing/2014/main" id="{E55E6DE4-E81F-A59E-C4AC-94C982E6BC84}"/>
+                  </a:ext>
+                </a:extLst>
+              </p:cNvPr>
+              <p:cNvSpPr/>
+              <p:nvPr/>
+            </p:nvSpPr>
+            <p:spPr>
+              <a:xfrm rot="14734878">
+                <a:off x="8189733" y="2885960"/>
+                <a:ext cx="48570" cy="114725"/>
+              </a:xfrm>
+              <a:prstGeom prst="triangle">
+                <a:avLst>
+                  <a:gd name="adj" fmla="val 86933"/>
+                </a:avLst>
+              </a:prstGeom>
+            </p:spPr>
+            <p:style>
+              <a:lnRef idx="2">
+                <a:schemeClr val="accent1">
+                  <a:shade val="15000"/>
+                </a:schemeClr>
+              </a:lnRef>
+              <a:fillRef idx="1">
+                <a:schemeClr val="accent1"/>
+              </a:fillRef>
+              <a:effectRef idx="0">
+                <a:schemeClr val="accent1"/>
+              </a:effectRef>
+              <a:fontRef idx="minor">
+                <a:schemeClr val="lt1"/>
+              </a:fontRef>
+            </p:style>
+            <p:txBody>
+              <a:bodyPr rtlCol="0" anchor="ctr"/>
+              <a:lstStyle/>
+              <a:p>
+                <a:pPr algn="ctr"/>
+                <a:endParaRPr lang="en-GB"/>
+              </a:p>
+            </p:txBody>
+          </p:sp>
+        </p:grpSp>
+        <p:grpSp>
+          <p:nvGrpSpPr>
+            <p:cNvPr id="102" name="Group 101">
+              <a:extLst>
+                <a:ext uri="{FF2B5EF4-FFF2-40B4-BE49-F238E27FC236}">
+                  <a16:creationId xmlns:a16="http://schemas.microsoft.com/office/drawing/2014/main" id="{B3AC3508-25EA-EF0B-8142-BFB7099A8841}"/>
+                </a:ext>
+              </a:extLst>
+            </p:cNvPr>
+            <p:cNvGrpSpPr/>
+            <p:nvPr/>
+          </p:nvGrpSpPr>
+          <p:grpSpPr>
+            <a:xfrm>
+              <a:off x="7661293" y="2123016"/>
+              <a:ext cx="1299763" cy="794562"/>
+              <a:chOff x="7661293" y="2123016"/>
+              <a:chExt cx="1299763" cy="794562"/>
+            </a:xfrm>
+          </p:grpSpPr>
+          <p:grpSp>
+            <p:nvGrpSpPr>
+              <p:cNvPr id="73" name="Group 72">
+                <a:extLst>
+                  <a:ext uri="{FF2B5EF4-FFF2-40B4-BE49-F238E27FC236}">
+                    <a16:creationId xmlns:a16="http://schemas.microsoft.com/office/drawing/2014/main" id="{5851C278-A371-8C0A-B0F8-91FFB10B0CEF}"/>
+                  </a:ext>
+                </a:extLst>
+              </p:cNvPr>
+              <p:cNvGrpSpPr/>
+              <p:nvPr/>
+            </p:nvGrpSpPr>
+            <p:grpSpPr>
+              <a:xfrm>
+                <a:off x="7661293" y="2123016"/>
+                <a:ext cx="1299763" cy="794562"/>
+                <a:chOff x="7661293" y="2123016"/>
+                <a:chExt cx="1299763" cy="794562"/>
+              </a:xfrm>
+            </p:grpSpPr>
+            <p:grpSp>
+              <p:nvGrpSpPr>
+                <p:cNvPr id="69" name="Group 68">
+                  <a:extLst>
+                    <a:ext uri="{FF2B5EF4-FFF2-40B4-BE49-F238E27FC236}">
+                      <a16:creationId xmlns:a16="http://schemas.microsoft.com/office/drawing/2014/main" id="{48059AB2-C304-1675-A54A-2A466ED3010E}"/>
+                    </a:ext>
+                  </a:extLst>
+                </p:cNvPr>
+                <p:cNvGrpSpPr/>
+                <p:nvPr/>
+              </p:nvGrpSpPr>
+              <p:grpSpPr>
+                <a:xfrm>
+                  <a:off x="7916793" y="2310280"/>
+                  <a:ext cx="397510" cy="442540"/>
+                  <a:chOff x="7863840" y="1678360"/>
+                  <a:chExt cx="397510" cy="442540"/>
+                </a:xfrm>
+              </p:grpSpPr>
+              <p:cxnSp>
+                <p:nvCxnSpPr>
+                  <p:cNvPr id="62" name="Straight Arrow Connector 61">
+                    <a:extLst>
+                      <a:ext uri="{FF2B5EF4-FFF2-40B4-BE49-F238E27FC236}">
+                        <a16:creationId xmlns:a16="http://schemas.microsoft.com/office/drawing/2014/main" id="{D752CC2C-7C83-E6B9-C195-4DD174119391}"/>
+                      </a:ext>
+                    </a:extLst>
+                  </p:cNvPr>
+                  <p:cNvCxnSpPr>
+                    <a:cxnSpLocks/>
+                  </p:cNvCxnSpPr>
+                  <p:nvPr/>
+                </p:nvCxnSpPr>
+                <p:spPr>
+                  <a:xfrm>
+                    <a:off x="7863840" y="1678360"/>
+                    <a:ext cx="0" cy="442540"/>
+                  </a:xfrm>
+                  <a:prstGeom prst="straightConnector1">
+                    <a:avLst/>
+                  </a:prstGeom>
+                  <a:ln>
+                    <a:tailEnd type="triangle"/>
+                  </a:ln>
+                </p:spPr>
+                <p:style>
+                  <a:lnRef idx="2">
+                    <a:schemeClr val="accent1"/>
+                  </a:lnRef>
+                  <a:fillRef idx="0">
+                    <a:schemeClr val="accent1"/>
+                  </a:fillRef>
+                  <a:effectRef idx="1">
+                    <a:schemeClr val="accent1"/>
+                  </a:effectRef>
+                  <a:fontRef idx="minor">
+                    <a:schemeClr val="tx1"/>
+                  </a:fontRef>
+                </p:style>
+              </p:cxnSp>
+              <p:cxnSp>
+                <p:nvCxnSpPr>
+                  <p:cNvPr id="63" name="Straight Arrow Connector 62">
+                    <a:extLst>
+                      <a:ext uri="{FF2B5EF4-FFF2-40B4-BE49-F238E27FC236}">
+                        <a16:creationId xmlns:a16="http://schemas.microsoft.com/office/drawing/2014/main" id="{2380BE34-ECF6-915C-D731-25D37530C57A}"/>
+                      </a:ext>
+                    </a:extLst>
+                  </p:cNvPr>
+                  <p:cNvCxnSpPr>
+                    <a:cxnSpLocks/>
+                  </p:cNvCxnSpPr>
+                  <p:nvPr/>
+                </p:nvCxnSpPr>
+                <p:spPr>
+                  <a:xfrm>
+                    <a:off x="7863840" y="1678360"/>
+                    <a:ext cx="397510" cy="0"/>
+                  </a:xfrm>
+                  <a:prstGeom prst="straightConnector1">
+                    <a:avLst/>
+                  </a:prstGeom>
+                  <a:ln>
+                    <a:tailEnd type="triangle"/>
+                  </a:ln>
+                </p:spPr>
+                <p:style>
+                  <a:lnRef idx="2">
+                    <a:schemeClr val="accent1"/>
+                  </a:lnRef>
+                  <a:fillRef idx="0">
+                    <a:schemeClr val="accent1"/>
+                  </a:fillRef>
+                  <a:effectRef idx="1">
+                    <a:schemeClr val="accent1"/>
+                  </a:effectRef>
+                  <a:fontRef idx="minor">
+                    <a:schemeClr val="tx1"/>
+                  </a:fontRef>
+                </p:style>
+              </p:cxnSp>
+            </p:grpSp>
+            <p:sp>
+              <p:nvSpPr>
+                <p:cNvPr id="70" name="TextBox 69">
+                  <a:extLst>
+                    <a:ext uri="{FF2B5EF4-FFF2-40B4-BE49-F238E27FC236}">
+                      <a16:creationId xmlns:a16="http://schemas.microsoft.com/office/drawing/2014/main" id="{C67DB281-E0D0-B766-B391-111E12B44995}"/>
+                    </a:ext>
+                  </a:extLst>
+                </p:cNvPr>
+                <p:cNvSpPr txBox="1"/>
+                <p:nvPr/>
+              </p:nvSpPr>
+              <p:spPr>
+                <a:xfrm>
+                  <a:off x="7919766" y="2686746"/>
+                  <a:ext cx="248331" cy="230832"/>
+                </a:xfrm>
+                <a:prstGeom prst="rect">
+                  <a:avLst/>
+                </a:prstGeom>
+                <a:noFill/>
+              </p:spPr>
+              <p:txBody>
+                <a:bodyPr wrap="square" rtlCol="0">
+                  <a:spAutoFit/>
+                </a:bodyPr>
+                <a:lstStyle/>
+                <a:p>
+                  <a:r>
+                    <a:rPr lang="en-GB" sz="900" b="1" dirty="0"/>
+                    <a:t>Y</a:t>
+                  </a:r>
+                </a:p>
+              </p:txBody>
+            </p:sp>
+            <p:sp>
+              <p:nvSpPr>
+                <p:cNvPr id="71" name="TextBox 70">
+                  <a:extLst>
+                    <a:ext uri="{FF2B5EF4-FFF2-40B4-BE49-F238E27FC236}">
+                      <a16:creationId xmlns:a16="http://schemas.microsoft.com/office/drawing/2014/main" id="{0AF6B527-6145-2C84-EBF6-28B0EF3921C2}"/>
+                    </a:ext>
+                  </a:extLst>
+                </p:cNvPr>
+                <p:cNvSpPr txBox="1"/>
+                <p:nvPr/>
+              </p:nvSpPr>
+              <p:spPr>
+                <a:xfrm>
+                  <a:off x="8314303" y="2194863"/>
+                  <a:ext cx="248331" cy="230832"/>
+                </a:xfrm>
+                <a:prstGeom prst="rect">
+                  <a:avLst/>
+                </a:prstGeom>
+                <a:noFill/>
+              </p:spPr>
+              <p:txBody>
+                <a:bodyPr wrap="square" rtlCol="0">
+                  <a:spAutoFit/>
+                </a:bodyPr>
+                <a:lstStyle/>
+                <a:p>
+                  <a:r>
+                    <a:rPr lang="en-GB" sz="900" b="1" dirty="0"/>
+                    <a:t>X</a:t>
+                  </a:r>
+                </a:p>
+              </p:txBody>
+            </p:sp>
+            <p:sp>
+              <p:nvSpPr>
+                <p:cNvPr id="72" name="TextBox 71">
+                  <a:extLst>
+                    <a:ext uri="{FF2B5EF4-FFF2-40B4-BE49-F238E27FC236}">
+                      <a16:creationId xmlns:a16="http://schemas.microsoft.com/office/drawing/2014/main" id="{D4184330-78AD-0172-D015-BCC190F5C040}"/>
+                    </a:ext>
+                  </a:extLst>
+                </p:cNvPr>
+                <p:cNvSpPr txBox="1"/>
+                <p:nvPr/>
+              </p:nvSpPr>
+              <p:spPr>
+                <a:xfrm>
+                  <a:off x="7661293" y="2123016"/>
+                  <a:ext cx="248331" cy="230832"/>
+                </a:xfrm>
+                <a:prstGeom prst="rect">
+                  <a:avLst/>
+                </a:prstGeom>
+                <a:noFill/>
+              </p:spPr>
+              <p:txBody>
+                <a:bodyPr wrap="square" rtlCol="0">
+                  <a:spAutoFit/>
+                </a:bodyPr>
+                <a:lstStyle/>
+                <a:p>
+                  <a:r>
+                    <a:rPr lang="en-GB" sz="900" b="1" dirty="0"/>
+                    <a:t>Z</a:t>
+                  </a:r>
+                </a:p>
+              </p:txBody>
+            </p:sp>
+            <p:sp>
+              <p:nvSpPr>
+                <p:cNvPr id="104" name="TextBox 103">
+                  <a:extLst>
+                    <a:ext uri="{FF2B5EF4-FFF2-40B4-BE49-F238E27FC236}">
+                      <a16:creationId xmlns:a16="http://schemas.microsoft.com/office/drawing/2014/main" id="{93770B41-1407-C028-F0F8-FBA93703C101}"/>
+                    </a:ext>
+                  </a:extLst>
+                </p:cNvPr>
+                <p:cNvSpPr txBox="1"/>
+                <p:nvPr/>
+              </p:nvSpPr>
+              <p:spPr>
+                <a:xfrm>
+                  <a:off x="8425060" y="2717523"/>
+                  <a:ext cx="535996" cy="200055"/>
+                </a:xfrm>
+                <a:prstGeom prst="rect">
+                  <a:avLst/>
+                </a:prstGeom>
+                <a:noFill/>
+              </p:spPr>
+              <p:txBody>
+                <a:bodyPr wrap="square" rtlCol="0">
+                  <a:spAutoFit/>
+                </a:bodyPr>
+                <a:lstStyle/>
+                <a:p>
+                  <a:r>
+                    <a:rPr lang="en-GB" sz="700" b="1" dirty="0"/>
+                    <a:t>CW + ve</a:t>
+                  </a:r>
+                </a:p>
+              </p:txBody>
+            </p:sp>
+          </p:grpSp>
+          <p:sp>
+            <p:nvSpPr>
+              <p:cNvPr id="101" name="Oval 100">
+                <a:extLst>
+                  <a:ext uri="{FF2B5EF4-FFF2-40B4-BE49-F238E27FC236}">
+                    <a16:creationId xmlns:a16="http://schemas.microsoft.com/office/drawing/2014/main" id="{350DB1D9-8401-2D2A-FEA3-6EA3128ABF92}"/>
+                  </a:ext>
+                </a:extLst>
+              </p:cNvPr>
+              <p:cNvSpPr/>
+              <p:nvPr/>
+            </p:nvSpPr>
+            <p:spPr>
+              <a:xfrm>
+                <a:off x="7863302" y="2260208"/>
+                <a:ext cx="111268" cy="111268"/>
+              </a:xfrm>
+              <a:prstGeom prst="ellipse">
+                <a:avLst/>
+              </a:prstGeom>
+            </p:spPr>
+            <p:style>
+              <a:lnRef idx="2">
+                <a:schemeClr val="accent1">
+                  <a:shade val="15000"/>
+                </a:schemeClr>
+              </a:lnRef>
+              <a:fillRef idx="1">
+                <a:schemeClr val="accent1"/>
+              </a:fillRef>
+              <a:effectRef idx="0">
+                <a:schemeClr val="accent1"/>
+              </a:effectRef>
+              <a:fontRef idx="minor">
+                <a:schemeClr val="lt1"/>
+              </a:fontRef>
+            </p:style>
+            <p:txBody>
+              <a:bodyPr rtlCol="0" anchor="ctr"/>
+              <a:lstStyle/>
+              <a:p>
+                <a:pPr algn="ctr"/>
+                <a:endParaRPr lang="en-GB"/>
+              </a:p>
+            </p:txBody>
+          </p:sp>
+        </p:grpSp>
+      </p:grpSp>
+      <p:sp>
+        <p:nvSpPr>
+          <p:cNvPr id="107" name="Rectangle: Rounded Corners 106">
+            <a:extLst>
+              <a:ext uri="{FF2B5EF4-FFF2-40B4-BE49-F238E27FC236}">
+                <a16:creationId xmlns:a16="http://schemas.microsoft.com/office/drawing/2014/main" id="{21821A5B-9689-ADF1-1700-1A81444707C9}"/>
+              </a:ext>
+            </a:extLst>
+          </p:cNvPr>
+          <p:cNvSpPr/>
+          <p:nvPr/>
+        </p:nvSpPr>
+        <p:spPr>
+          <a:xfrm>
+            <a:off x="2175657" y="1079130"/>
+            <a:ext cx="5606267" cy="5015314"/>
+          </a:xfrm>
+          <a:prstGeom prst="roundRect">
+            <a:avLst/>
+          </a:prstGeom>
+          <a:noFill/>
+          <a:ln w="9525" cap="flat" cmpd="sng" algn="ctr">
+            <a:solidFill>
+              <a:schemeClr val="dk1"/>
+            </a:solidFill>
+            <a:prstDash val="solid"/>
+            <a:round/>
+            <a:headEnd type="none" w="med" len="med"/>
+            <a:tailEnd type="none" w="med" len="med"/>
+          </a:ln>
+        </p:spPr>
+        <p:style>
+          <a:lnRef idx="0">
+            <a:scrgbClr r="0" g="0" b="0"/>
+          </a:lnRef>
+          <a:fillRef idx="0">
+            <a:scrgbClr r="0" g="0" b="0"/>
+          </a:fillRef>
+          <a:effectRef idx="0">
+            <a:scrgbClr r="0" g="0" b="0"/>
+          </a:effectRef>
+          <a:fontRef idx="minor">
+            <a:schemeClr val="dk1"/>
+          </a:fontRef>
+        </p:style>
+        <p:txBody>
+          <a:bodyPr rtlCol="0" anchor="ctr"/>
+          <a:lstStyle/>
+          <a:p>
+            <a:pPr algn="ctr"/>
+            <a:endParaRPr lang="en-GB"/>
+          </a:p>
+        </p:txBody>
+      </p:sp>
+      <p:grpSp>
+        <p:nvGrpSpPr>
+          <p:cNvPr id="110" name="Group 109">
+            <a:extLst>
+              <a:ext uri="{FF2B5EF4-FFF2-40B4-BE49-F238E27FC236}">
+                <a16:creationId xmlns:a16="http://schemas.microsoft.com/office/drawing/2014/main" id="{870DD1A0-0061-6EB8-13D9-EF9C8559D254}"/>
+              </a:ext>
+            </a:extLst>
+          </p:cNvPr>
+          <p:cNvGrpSpPr/>
+          <p:nvPr/>
+        </p:nvGrpSpPr>
+        <p:grpSpPr>
+          <a:xfrm>
+            <a:off x="2434824" y="1359027"/>
+            <a:ext cx="1429712" cy="1224660"/>
+            <a:chOff x="2434824" y="1359027"/>
+            <a:chExt cx="1418367" cy="1224660"/>
+          </a:xfrm>
+        </p:grpSpPr>
+        <p:grpSp>
+          <p:nvGrpSpPr>
+            <p:cNvPr id="96" name="Group 95">
+              <a:extLst>
+                <a:ext uri="{FF2B5EF4-FFF2-40B4-BE49-F238E27FC236}">
+                  <a16:creationId xmlns:a16="http://schemas.microsoft.com/office/drawing/2014/main" id="{ED76D420-F8E7-32A0-3D97-7DC2F5F31A38}"/>
+                </a:ext>
+              </a:extLst>
+            </p:cNvPr>
+            <p:cNvGrpSpPr/>
+            <p:nvPr/>
+          </p:nvGrpSpPr>
+          <p:grpSpPr>
+            <a:xfrm>
+              <a:off x="2544627" y="1414779"/>
+              <a:ext cx="1164256" cy="1168908"/>
+              <a:chOff x="7036568" y="3635884"/>
+              <a:chExt cx="1164256" cy="1168908"/>
+            </a:xfrm>
+          </p:grpSpPr>
+          <p:sp>
+            <p:nvSpPr>
+              <p:cNvPr id="91" name="Arrow: Quad 90">
+                <a:extLst>
+                  <a:ext uri="{FF2B5EF4-FFF2-40B4-BE49-F238E27FC236}">
+                    <a16:creationId xmlns:a16="http://schemas.microsoft.com/office/drawing/2014/main" id="{D1D5399A-A862-5400-BC6B-DAA1F2E73F62}"/>
+                  </a:ext>
+                </a:extLst>
+              </p:cNvPr>
+              <p:cNvSpPr/>
+              <p:nvPr/>
+            </p:nvSpPr>
+            <p:spPr>
+              <a:xfrm>
+                <a:off x="7303814" y="3900238"/>
+                <a:ext cx="619885" cy="642944"/>
+              </a:xfrm>
+              <a:prstGeom prst="quadArrow">
+                <a:avLst>
+                  <a:gd name="adj1" fmla="val 2555"/>
+                  <a:gd name="adj2" fmla="val 8503"/>
+                  <a:gd name="adj3" fmla="val 19552"/>
+                </a:avLst>
+              </a:prstGeom>
+            </p:spPr>
+            <p:style>
+              <a:lnRef idx="2">
+                <a:schemeClr val="accent1">
+                  <a:shade val="15000"/>
+                </a:schemeClr>
+              </a:lnRef>
+              <a:fillRef idx="1">
+                <a:schemeClr val="accent1"/>
+              </a:fillRef>
+              <a:effectRef idx="0">
+                <a:schemeClr val="accent1"/>
+              </a:effectRef>
+              <a:fontRef idx="minor">
+                <a:schemeClr val="lt1"/>
+              </a:fontRef>
+            </p:style>
+            <p:txBody>
+              <a:bodyPr rtlCol="0" anchor="ctr"/>
+              <a:lstStyle/>
+              <a:p>
+                <a:pPr algn="ctr"/>
+                <a:endParaRPr lang="en-GB"/>
+              </a:p>
+            </p:txBody>
+          </p:sp>
+          <p:sp>
+            <p:nvSpPr>
+              <p:cNvPr id="92" name="TextBox 91">
+                <a:extLst>
+                  <a:ext uri="{FF2B5EF4-FFF2-40B4-BE49-F238E27FC236}">
+                    <a16:creationId xmlns:a16="http://schemas.microsoft.com/office/drawing/2014/main" id="{0EFD163C-251F-10CA-0FB0-1975733CEFE7}"/>
+                  </a:ext>
+                </a:extLst>
+              </p:cNvPr>
+              <p:cNvSpPr txBox="1"/>
+              <p:nvPr/>
+            </p:nvSpPr>
+            <p:spPr>
+              <a:xfrm>
+                <a:off x="7484363" y="3635884"/>
+                <a:ext cx="248331" cy="261610"/>
+              </a:xfrm>
+              <a:prstGeom prst="rect">
+                <a:avLst/>
+              </a:prstGeom>
+              <a:noFill/>
+            </p:spPr>
+            <p:txBody>
+              <a:bodyPr wrap="square" rtlCol="0">
+                <a:spAutoFit/>
+              </a:bodyPr>
+              <a:lstStyle/>
+              <a:p>
+                <a:pPr algn="ctr"/>
+                <a:r>
+                  <a:rPr lang="en-GB" sz="1100" b="1" dirty="0"/>
+                  <a:t>N</a:t>
+                </a:r>
+              </a:p>
+            </p:txBody>
+          </p:sp>
+          <p:sp>
+            <p:nvSpPr>
+              <p:cNvPr id="93" name="TextBox 92">
+                <a:extLst>
+                  <a:ext uri="{FF2B5EF4-FFF2-40B4-BE49-F238E27FC236}">
+                    <a16:creationId xmlns:a16="http://schemas.microsoft.com/office/drawing/2014/main" id="{B3BB287C-8E07-C117-3B9C-D50F12EA4E18}"/>
+                  </a:ext>
+                </a:extLst>
+              </p:cNvPr>
+              <p:cNvSpPr txBox="1"/>
+              <p:nvPr/>
+            </p:nvSpPr>
+            <p:spPr>
+              <a:xfrm>
+                <a:off x="7493906" y="4543182"/>
+                <a:ext cx="248331" cy="261610"/>
+              </a:xfrm>
+              <a:prstGeom prst="rect">
+                <a:avLst/>
+              </a:prstGeom>
+              <a:noFill/>
+            </p:spPr>
+            <p:txBody>
+              <a:bodyPr wrap="square" rtlCol="0">
+                <a:spAutoFit/>
+              </a:bodyPr>
+              <a:lstStyle/>
+              <a:p>
+                <a:pPr algn="ctr"/>
+                <a:r>
+                  <a:rPr lang="en-GB" sz="1100" b="1" dirty="0"/>
+                  <a:t>S</a:t>
+                </a:r>
+              </a:p>
+            </p:txBody>
+          </p:sp>
+          <p:sp>
+            <p:nvSpPr>
+              <p:cNvPr id="94" name="TextBox 93">
+                <a:extLst>
+                  <a:ext uri="{FF2B5EF4-FFF2-40B4-BE49-F238E27FC236}">
+                    <a16:creationId xmlns:a16="http://schemas.microsoft.com/office/drawing/2014/main" id="{89FF7454-BA59-9054-6639-333365072D7E}"/>
+                  </a:ext>
+                </a:extLst>
+              </p:cNvPr>
+              <p:cNvSpPr txBox="1"/>
+              <p:nvPr/>
+            </p:nvSpPr>
+            <p:spPr>
+              <a:xfrm>
+                <a:off x="7952493" y="4090905"/>
+                <a:ext cx="248331" cy="261610"/>
+              </a:xfrm>
+              <a:prstGeom prst="rect">
+                <a:avLst/>
+              </a:prstGeom>
+              <a:noFill/>
+            </p:spPr>
+            <p:txBody>
+              <a:bodyPr wrap="square" rtlCol="0">
+                <a:spAutoFit/>
+              </a:bodyPr>
+              <a:lstStyle/>
+              <a:p>
+                <a:pPr algn="ctr"/>
+                <a:r>
+                  <a:rPr lang="en-GB" sz="1100" b="1" dirty="0"/>
+                  <a:t>E</a:t>
+                </a:r>
+              </a:p>
+            </p:txBody>
+          </p:sp>
+          <p:sp>
+            <p:nvSpPr>
+              <p:cNvPr id="95" name="TextBox 94">
+                <a:extLst>
+                  <a:ext uri="{FF2B5EF4-FFF2-40B4-BE49-F238E27FC236}">
+                    <a16:creationId xmlns:a16="http://schemas.microsoft.com/office/drawing/2014/main" id="{B1BBF566-49EB-1A57-25DB-178E7631898B}"/>
+                  </a:ext>
+                </a:extLst>
+              </p:cNvPr>
+              <p:cNvSpPr txBox="1"/>
+              <p:nvPr/>
+            </p:nvSpPr>
+            <p:spPr>
+              <a:xfrm>
+                <a:off x="7036568" y="4090905"/>
+                <a:ext cx="248331" cy="261610"/>
+              </a:xfrm>
+              <a:prstGeom prst="rect">
+                <a:avLst/>
+              </a:prstGeom>
+              <a:noFill/>
+            </p:spPr>
+            <p:txBody>
+              <a:bodyPr wrap="square" rtlCol="0">
+                <a:spAutoFit/>
+              </a:bodyPr>
+              <a:lstStyle/>
+              <a:p>
+                <a:pPr algn="ctr"/>
+                <a:r>
+                  <a:rPr lang="en-GB" sz="1100" b="1" dirty="0"/>
+                  <a:t>W</a:t>
+                </a:r>
+              </a:p>
+            </p:txBody>
+          </p:sp>
+        </p:grpSp>
+        <p:sp>
+          <p:nvSpPr>
+            <p:cNvPr id="108" name="Rectangle: Rounded Corners 107">
+              <a:extLst>
+                <a:ext uri="{FF2B5EF4-FFF2-40B4-BE49-F238E27FC236}">
+                  <a16:creationId xmlns:a16="http://schemas.microsoft.com/office/drawing/2014/main" id="{2A48AC59-5491-4F35-9627-F61DBE1CCFBB}"/>
+                </a:ext>
+              </a:extLst>
+            </p:cNvPr>
+            <p:cNvSpPr/>
+            <p:nvPr/>
+          </p:nvSpPr>
+          <p:spPr>
+            <a:xfrm>
+              <a:off x="2434824" y="1359027"/>
+              <a:ext cx="1418367" cy="1224660"/>
+            </a:xfrm>
+            <a:prstGeom prst="roundRect">
+              <a:avLst/>
+            </a:prstGeom>
+            <a:noFill/>
+            <a:ln w="9525" cap="flat" cmpd="sng" algn="ctr">
+              <a:solidFill>
+                <a:schemeClr val="dk1"/>
+              </a:solidFill>
+              <a:prstDash val="solid"/>
+              <a:round/>
+              <a:headEnd type="none" w="med" len="med"/>
+              <a:tailEnd type="none" w="med" len="med"/>
+            </a:ln>
+          </p:spPr>
+          <p:style>
+            <a:lnRef idx="0">
+              <a:scrgbClr r="0" g="0" b="0"/>
+            </a:lnRef>
+            <a:fillRef idx="0">
+              <a:scrgbClr r="0" g="0" b="0"/>
+            </a:fillRef>
+            <a:effectRef idx="0">
+              <a:scrgbClr r="0" g="0" b="0"/>
+            </a:effectRef>
+            <a:fontRef idx="minor">
+              <a:schemeClr val="dk1"/>
+            </a:fontRef>
+          </p:style>
+          <p:txBody>
+            <a:bodyPr rtlCol="0" anchor="ctr"/>
+            <a:lstStyle/>
+            <a:p>
+              <a:pPr algn="ctr"/>
+              <a:endParaRPr lang="en-GB"/>
+            </a:p>
+          </p:txBody>
+        </p:sp>
+      </p:grpSp>
+      <p:grpSp>
+        <p:nvGrpSpPr>
+          <p:cNvPr id="74" name="Group 73">
+            <a:extLst>
+              <a:ext uri="{FF2B5EF4-FFF2-40B4-BE49-F238E27FC236}">
+                <a16:creationId xmlns:a16="http://schemas.microsoft.com/office/drawing/2014/main" id="{BBF0DD89-4DF4-3B79-0BFB-22563E7B916A}"/>
+              </a:ext>
+            </a:extLst>
+          </p:cNvPr>
+          <p:cNvGrpSpPr/>
+          <p:nvPr/>
+        </p:nvGrpSpPr>
+        <p:grpSpPr>
+          <a:xfrm>
+            <a:off x="9961632" y="1423899"/>
+            <a:ext cx="1194090" cy="916950"/>
+            <a:chOff x="7661293" y="1733549"/>
+            <a:chExt cx="901341" cy="692146"/>
+          </a:xfrm>
+        </p:grpSpPr>
+        <p:grpSp>
+          <p:nvGrpSpPr>
+            <p:cNvPr id="75" name="Group 74">
+              <a:extLst>
+                <a:ext uri="{FF2B5EF4-FFF2-40B4-BE49-F238E27FC236}">
+                  <a16:creationId xmlns:a16="http://schemas.microsoft.com/office/drawing/2014/main" id="{1544F940-BF4D-7D68-254F-1E2EA27A8979}"/>
+                </a:ext>
+              </a:extLst>
+            </p:cNvPr>
+            <p:cNvGrpSpPr/>
+            <p:nvPr/>
+          </p:nvGrpSpPr>
+          <p:grpSpPr>
+            <a:xfrm>
+              <a:off x="7861158" y="1892343"/>
+              <a:ext cx="453145" cy="473570"/>
+              <a:chOff x="7808205" y="1260423"/>
+              <a:chExt cx="453145" cy="473570"/>
+            </a:xfrm>
+          </p:grpSpPr>
+          <p:cxnSp>
+            <p:nvCxnSpPr>
+              <p:cNvPr id="79" name="Straight Arrow Connector 78">
+                <a:extLst>
+                  <a:ext uri="{FF2B5EF4-FFF2-40B4-BE49-F238E27FC236}">
+                    <a16:creationId xmlns:a16="http://schemas.microsoft.com/office/drawing/2014/main" id="{A2F6E0FA-7E8E-BDD7-4947-107B0B227E8A}"/>
+                  </a:ext>
+                </a:extLst>
+              </p:cNvPr>
+              <p:cNvCxnSpPr>
+                <a:cxnSpLocks/>
+              </p:cNvCxnSpPr>
+              <p:nvPr/>
+            </p:nvCxnSpPr>
+            <p:spPr>
+              <a:xfrm flipV="1">
+                <a:off x="7863840" y="1260423"/>
+                <a:ext cx="0" cy="417937"/>
+              </a:xfrm>
+              <a:prstGeom prst="straightConnector1">
+                <a:avLst/>
+              </a:prstGeom>
+              <a:ln>
+                <a:tailEnd type="triangle"/>
+              </a:ln>
+            </p:spPr>
+            <p:style>
+              <a:lnRef idx="2">
+                <a:schemeClr val="accent1"/>
+              </a:lnRef>
+              <a:fillRef idx="0">
+                <a:schemeClr val="accent1"/>
+              </a:fillRef>
+              <a:effectRef idx="1">
+                <a:schemeClr val="accent1"/>
+              </a:effectRef>
+              <a:fontRef idx="minor">
+                <a:schemeClr val="tx1"/>
+              </a:fontRef>
+            </p:style>
+          </p:cxnSp>
+          <p:cxnSp>
+            <p:nvCxnSpPr>
+              <p:cNvPr id="80" name="Straight Arrow Connector 79">
+                <a:extLst>
+                  <a:ext uri="{FF2B5EF4-FFF2-40B4-BE49-F238E27FC236}">
+                    <a16:creationId xmlns:a16="http://schemas.microsoft.com/office/drawing/2014/main" id="{4D2B1F54-8AC9-0F2A-62CF-02A9A8E985B5}"/>
+                  </a:ext>
+                </a:extLst>
+              </p:cNvPr>
+              <p:cNvCxnSpPr>
+                <a:cxnSpLocks/>
+              </p:cNvCxnSpPr>
+              <p:nvPr/>
+            </p:nvCxnSpPr>
+            <p:spPr>
+              <a:xfrm>
+                <a:off x="7863840" y="1678360"/>
+                <a:ext cx="397510" cy="0"/>
+              </a:xfrm>
+              <a:prstGeom prst="straightConnector1">
+                <a:avLst/>
+              </a:prstGeom>
+              <a:ln>
+                <a:tailEnd type="triangle"/>
+              </a:ln>
+            </p:spPr>
+            <p:style>
+              <a:lnRef idx="2">
+                <a:schemeClr val="accent1"/>
+              </a:lnRef>
+              <a:fillRef idx="0">
+                <a:schemeClr val="accent1"/>
+              </a:fillRef>
+              <a:effectRef idx="1">
+                <a:schemeClr val="accent1"/>
+              </a:effectRef>
+              <a:fontRef idx="minor">
+                <a:schemeClr val="tx1"/>
+              </a:fontRef>
+            </p:style>
+          </p:cxnSp>
+          <p:sp>
+            <p:nvSpPr>
+              <p:cNvPr id="81" name="Oval 80">
+                <a:extLst>
+                  <a:ext uri="{FF2B5EF4-FFF2-40B4-BE49-F238E27FC236}">
+                    <a16:creationId xmlns:a16="http://schemas.microsoft.com/office/drawing/2014/main" id="{BCF5AA9A-4A21-EA6B-028C-52EDD6B6D35D}"/>
+                  </a:ext>
+                </a:extLst>
+              </p:cNvPr>
+              <p:cNvSpPr/>
+              <p:nvPr/>
+            </p:nvSpPr>
+            <p:spPr>
+              <a:xfrm>
+                <a:off x="7808205" y="1622725"/>
+                <a:ext cx="111268" cy="111268"/>
+              </a:xfrm>
+              <a:prstGeom prst="ellipse">
+                <a:avLst/>
+              </a:prstGeom>
+            </p:spPr>
+            <p:style>
+              <a:lnRef idx="2">
+                <a:schemeClr val="accent1">
+                  <a:shade val="15000"/>
+                </a:schemeClr>
+              </a:lnRef>
+              <a:fillRef idx="1">
+                <a:schemeClr val="accent1"/>
+              </a:fillRef>
+              <a:effectRef idx="0">
+                <a:schemeClr val="accent1"/>
+              </a:effectRef>
+              <a:fontRef idx="minor">
+                <a:schemeClr val="lt1"/>
+              </a:fontRef>
+            </p:style>
+            <p:txBody>
+              <a:bodyPr rtlCol="0" anchor="ctr"/>
+              <a:lstStyle/>
+              <a:p>
+                <a:pPr algn="ctr"/>
+                <a:endParaRPr lang="en-GB"/>
+              </a:p>
+            </p:txBody>
+          </p:sp>
+        </p:grpSp>
+        <p:sp>
+          <p:nvSpPr>
+            <p:cNvPr id="76" name="TextBox 75">
+              <a:extLst>
+                <a:ext uri="{FF2B5EF4-FFF2-40B4-BE49-F238E27FC236}">
+                  <a16:creationId xmlns:a16="http://schemas.microsoft.com/office/drawing/2014/main" id="{03E16CD7-69A4-B04C-2212-0048C7D7EC38}"/>
+                </a:ext>
+              </a:extLst>
+            </p:cNvPr>
+            <p:cNvSpPr txBox="1"/>
+            <p:nvPr/>
+          </p:nvSpPr>
+          <p:spPr>
+            <a:xfrm>
+              <a:off x="7909624" y="1733549"/>
+              <a:ext cx="248331" cy="230832"/>
+            </a:xfrm>
+            <a:prstGeom prst="rect">
+              <a:avLst/>
+            </a:prstGeom>
+            <a:noFill/>
+          </p:spPr>
+          <p:txBody>
+            <a:bodyPr wrap="square" rtlCol="0">
+              <a:spAutoFit/>
+            </a:bodyPr>
+            <a:lstStyle/>
+            <a:p>
+              <a:r>
+                <a:rPr lang="en-GB" sz="900" b="1" dirty="0"/>
+                <a:t>Y</a:t>
+              </a:r>
+            </a:p>
+          </p:txBody>
+        </p:sp>
+        <p:sp>
+          <p:nvSpPr>
+            <p:cNvPr id="77" name="TextBox 76">
+              <a:extLst>
+                <a:ext uri="{FF2B5EF4-FFF2-40B4-BE49-F238E27FC236}">
+                  <a16:creationId xmlns:a16="http://schemas.microsoft.com/office/drawing/2014/main" id="{1F9E83F5-B659-BEE4-9979-31993FC02BF4}"/>
+                </a:ext>
+              </a:extLst>
+            </p:cNvPr>
+            <p:cNvSpPr txBox="1"/>
+            <p:nvPr/>
+          </p:nvSpPr>
+          <p:spPr>
+            <a:xfrm>
+              <a:off x="8314303" y="2194863"/>
+              <a:ext cx="248331" cy="230832"/>
+            </a:xfrm>
+            <a:prstGeom prst="rect">
+              <a:avLst/>
+            </a:prstGeom>
+            <a:noFill/>
+          </p:spPr>
+          <p:txBody>
+            <a:bodyPr wrap="square" rtlCol="0">
+              <a:spAutoFit/>
+            </a:bodyPr>
+            <a:lstStyle/>
+            <a:p>
+              <a:r>
+                <a:rPr lang="en-GB" sz="900" b="1" dirty="0"/>
+                <a:t>X</a:t>
+              </a:r>
+            </a:p>
+          </p:txBody>
+        </p:sp>
+        <p:sp>
+          <p:nvSpPr>
+            <p:cNvPr id="78" name="TextBox 77">
+              <a:extLst>
+                <a:ext uri="{FF2B5EF4-FFF2-40B4-BE49-F238E27FC236}">
+                  <a16:creationId xmlns:a16="http://schemas.microsoft.com/office/drawing/2014/main" id="{2F750599-B712-E3AB-6DF2-B37F4DCBF8B3}"/>
+                </a:ext>
+              </a:extLst>
+            </p:cNvPr>
+            <p:cNvSpPr txBox="1"/>
+            <p:nvPr/>
+          </p:nvSpPr>
+          <p:spPr>
+            <a:xfrm>
+              <a:off x="7661293" y="2123016"/>
+              <a:ext cx="248331" cy="230832"/>
+            </a:xfrm>
+            <a:prstGeom prst="rect">
+              <a:avLst/>
+            </a:prstGeom>
+            <a:noFill/>
+          </p:spPr>
+          <p:txBody>
+            <a:bodyPr wrap="square" rtlCol="0">
+              <a:spAutoFit/>
+            </a:bodyPr>
+            <a:lstStyle/>
+            <a:p>
+              <a:r>
+                <a:rPr lang="en-GB" sz="900" b="1" dirty="0"/>
+                <a:t>Z</a:t>
+              </a:r>
+            </a:p>
+          </p:txBody>
+        </p:sp>
+      </p:grpSp>
       <p:sp>
         <p:nvSpPr>
           <p:cNvPr id="109" name="Rectangle: Rounded Corners 108">
             <a:extLst>
               <a:ext uri="{FF2B5EF4-FFF2-40B4-BE49-F238E27FC236}">
-                <a16:creationId xmlns:a16="http://schemas.microsoft.com/office/drawing/2014/main" id="{456226B1-400F-D24B-EBE6-C7423F9F95E7}"/>
+                <a16:creationId xmlns:a16="http://schemas.microsoft.com/office/drawing/2014/main" id="{204DA8C1-996C-B224-F1ED-B5B5D8E5C437}"/>
               </a:ext>
             </a:extLst>
           </p:cNvPr>
@@ -12251,7 +13195,7 @@
     </p:spTree>
     <p:extLst>
       <p:ext uri="{BB962C8B-B14F-4D97-AF65-F5344CB8AC3E}">
-        <p14:creationId xmlns:p14="http://schemas.microsoft.com/office/powerpoint/2010/main" val="387684819"/>
+        <p14:creationId xmlns:p14="http://schemas.microsoft.com/office/powerpoint/2010/main" val="838028464"/>
       </p:ext>
     </p:extLst>
   </p:cSld>
@@ -12261,7 +13205,7 @@
 </p:sld>
 </file>
 
-<file path=ppt/slides/slide7.xml><?xml version="1.0" encoding="utf-8"?>
+<file path=ppt/slides/slide8.xml><?xml version="1.0" encoding="utf-8"?>
 <p:sld xmlns:a="http://schemas.openxmlformats.org/drawingml/2006/main" xmlns:r="http://schemas.openxmlformats.org/officeDocument/2006/relationships" xmlns:p="http://schemas.openxmlformats.org/presentationml/2006/main">
   <p:cSld>
     <p:spTree>
@@ -13374,7 +14318,7 @@
 </p:sld>
 </file>
 
-<file path=ppt/slides/slide8.xml><?xml version="1.0" encoding="utf-8"?>
+<file path=ppt/slides/slide9.xml><?xml version="1.0" encoding="utf-8"?>
 <p:sld xmlns:a="http://schemas.openxmlformats.org/drawingml/2006/main" xmlns:r="http://schemas.openxmlformats.org/officeDocument/2006/relationships" xmlns:p="http://schemas.openxmlformats.org/presentationml/2006/main">
   <p:cSld>
     <p:spTree>
@@ -13780,256 +14724,6 @@
     <p:extLst>
       <p:ext uri="{BB962C8B-B14F-4D97-AF65-F5344CB8AC3E}">
         <p14:creationId xmlns:p14="http://schemas.microsoft.com/office/powerpoint/2010/main" val="3761254245"/>
-      </p:ext>
-    </p:extLst>
-  </p:cSld>
-  <p:clrMapOvr>
-    <a:masterClrMapping/>
-  </p:clrMapOvr>
-</p:sld>
-</file>
-
-<file path=ppt/slides/slide9.xml><?xml version="1.0" encoding="utf-8"?>
-<p:sld xmlns:a="http://schemas.openxmlformats.org/drawingml/2006/main" xmlns:r="http://schemas.openxmlformats.org/officeDocument/2006/relationships" xmlns:p="http://schemas.openxmlformats.org/presentationml/2006/main">
-  <p:cSld>
-    <p:spTree>
-      <p:nvGrpSpPr>
-        <p:cNvPr id="1" name="">
-          <a:extLst>
-            <a:ext uri="{FF2B5EF4-FFF2-40B4-BE49-F238E27FC236}">
-              <a16:creationId xmlns:a16="http://schemas.microsoft.com/office/drawing/2014/main" id="{12E18A76-541D-02F5-6E23-7BF114278D9F}"/>
-            </a:ext>
-          </a:extLst>
-        </p:cNvPr>
-        <p:cNvGrpSpPr/>
-        <p:nvPr/>
-      </p:nvGrpSpPr>
-      <p:grpSpPr>
-        <a:xfrm>
-          <a:off x="0" y="0"/>
-          <a:ext cx="0" cy="0"/>
-          <a:chOff x="0" y="0"/>
-          <a:chExt cx="0" cy="0"/>
-        </a:xfrm>
-      </p:grpSpPr>
-      <p:sp>
-        <p:nvSpPr>
-          <p:cNvPr id="4" name="Rectangle: Rounded Corners 3">
-            <a:extLst>
-              <a:ext uri="{FF2B5EF4-FFF2-40B4-BE49-F238E27FC236}">
-                <a16:creationId xmlns:a16="http://schemas.microsoft.com/office/drawing/2014/main" id="{02671E5E-3841-B41B-C992-8368A6837B62}"/>
-              </a:ext>
-            </a:extLst>
-          </p:cNvPr>
-          <p:cNvSpPr/>
-          <p:nvPr/>
-        </p:nvSpPr>
-        <p:spPr>
-          <a:xfrm>
-            <a:off x="703006" y="383458"/>
-            <a:ext cx="10785987" cy="629265"/>
-          </a:xfrm>
-          <a:prstGeom prst="roundRect">
-            <a:avLst/>
-          </a:prstGeom>
-        </p:spPr>
-        <p:style>
-          <a:lnRef idx="2">
-            <a:schemeClr val="dk1"/>
-          </a:lnRef>
-          <a:fillRef idx="1">
-            <a:schemeClr val="lt1"/>
-          </a:fillRef>
-          <a:effectRef idx="0">
-            <a:schemeClr val="dk1"/>
-          </a:effectRef>
-          <a:fontRef idx="minor">
-            <a:schemeClr val="dk1"/>
-          </a:fontRef>
-        </p:style>
-        <p:txBody>
-          <a:bodyPr rtlCol="0" anchor="ctr"/>
-          <a:lstStyle/>
-          <a:p>
-            <a:pPr algn="ctr"/>
-            <a:endParaRPr lang="en-GB"/>
-          </a:p>
-        </p:txBody>
-      </p:sp>
-      <p:sp>
-        <p:nvSpPr>
-          <p:cNvPr id="5" name="Rectangle: Rounded Corners 4">
-            <a:extLst>
-              <a:ext uri="{FF2B5EF4-FFF2-40B4-BE49-F238E27FC236}">
-                <a16:creationId xmlns:a16="http://schemas.microsoft.com/office/drawing/2014/main" id="{4F408152-6920-171F-4C35-84CA4622483A}"/>
-              </a:ext>
-            </a:extLst>
-          </p:cNvPr>
-          <p:cNvSpPr/>
-          <p:nvPr/>
-        </p:nvSpPr>
-        <p:spPr>
-          <a:xfrm>
-            <a:off x="626805" y="1882879"/>
-            <a:ext cx="7250369" cy="3727346"/>
-          </a:xfrm>
-          <a:prstGeom prst="roundRect">
-            <a:avLst/>
-          </a:prstGeom>
-          <a:ln/>
-        </p:spPr>
-        <p:style>
-          <a:lnRef idx="2">
-            <a:schemeClr val="dk1"/>
-          </a:lnRef>
-          <a:fillRef idx="1">
-            <a:schemeClr val="lt1"/>
-          </a:fillRef>
-          <a:effectRef idx="0">
-            <a:schemeClr val="dk1"/>
-          </a:effectRef>
-          <a:fontRef idx="minor">
-            <a:schemeClr val="dk1"/>
-          </a:fontRef>
-        </p:style>
-        <p:txBody>
-          <a:bodyPr rtlCol="0" anchor="ctr"/>
-          <a:lstStyle/>
-          <a:p>
-            <a:pPr algn="ctr"/>
-            <a:endParaRPr lang="en-GB"/>
-          </a:p>
-        </p:txBody>
-      </p:sp>
-      <p:sp>
-        <p:nvSpPr>
-          <p:cNvPr id="9" name="Rectangle: Rounded Corners 8">
-            <a:extLst>
-              <a:ext uri="{FF2B5EF4-FFF2-40B4-BE49-F238E27FC236}">
-                <a16:creationId xmlns:a16="http://schemas.microsoft.com/office/drawing/2014/main" id="{B9F7406A-6577-D0A4-8E0B-666CADCC4778}"/>
-              </a:ext>
-            </a:extLst>
-          </p:cNvPr>
-          <p:cNvSpPr/>
-          <p:nvPr/>
-        </p:nvSpPr>
-        <p:spPr>
-          <a:xfrm>
-            <a:off x="828064" y="2568677"/>
-            <a:ext cx="6090769" cy="1720646"/>
-          </a:xfrm>
-          <a:prstGeom prst="roundRect">
-            <a:avLst/>
-          </a:prstGeom>
-          <a:ln/>
-        </p:spPr>
-        <p:style>
-          <a:lnRef idx="2">
-            <a:schemeClr val="dk1"/>
-          </a:lnRef>
-          <a:fillRef idx="1">
-            <a:schemeClr val="lt1"/>
-          </a:fillRef>
-          <a:effectRef idx="0">
-            <a:schemeClr val="dk1"/>
-          </a:effectRef>
-          <a:fontRef idx="minor">
-            <a:schemeClr val="dk1"/>
-          </a:fontRef>
-        </p:style>
-        <p:txBody>
-          <a:bodyPr rtlCol="0" anchor="ctr"/>
-          <a:lstStyle/>
-          <a:p>
-            <a:pPr algn="ctr"/>
-            <a:endParaRPr lang="en-GB"/>
-          </a:p>
-        </p:txBody>
-      </p:sp>
-      <p:sp>
-        <p:nvSpPr>
-          <p:cNvPr id="10" name="Rectangle: Rounded Corners 9">
-            <a:extLst>
-              <a:ext uri="{FF2B5EF4-FFF2-40B4-BE49-F238E27FC236}">
-                <a16:creationId xmlns:a16="http://schemas.microsoft.com/office/drawing/2014/main" id="{05D4FCE5-19D0-D317-197A-3372702530DF}"/>
-              </a:ext>
-            </a:extLst>
-          </p:cNvPr>
-          <p:cNvSpPr/>
-          <p:nvPr/>
-        </p:nvSpPr>
-        <p:spPr>
-          <a:xfrm>
-            <a:off x="1003809" y="4535126"/>
-            <a:ext cx="5997065" cy="879989"/>
-          </a:xfrm>
-          <a:prstGeom prst="roundRect">
-            <a:avLst/>
-          </a:prstGeom>
-          <a:ln/>
-        </p:spPr>
-        <p:style>
-          <a:lnRef idx="2">
-            <a:schemeClr val="dk1"/>
-          </a:lnRef>
-          <a:fillRef idx="1">
-            <a:schemeClr val="lt1"/>
-          </a:fillRef>
-          <a:effectRef idx="0">
-            <a:schemeClr val="dk1"/>
-          </a:effectRef>
-          <a:fontRef idx="minor">
-            <a:schemeClr val="dk1"/>
-          </a:fontRef>
-        </p:style>
-        <p:txBody>
-          <a:bodyPr rtlCol="0" anchor="ctr"/>
-          <a:lstStyle/>
-          <a:p>
-            <a:pPr algn="ctr"/>
-            <a:endParaRPr lang="en-GB"/>
-          </a:p>
-        </p:txBody>
-      </p:sp>
-      <p:sp>
-        <p:nvSpPr>
-          <p:cNvPr id="17" name="TextBox 16">
-            <a:extLst>
-              <a:ext uri="{FF2B5EF4-FFF2-40B4-BE49-F238E27FC236}">
-                <a16:creationId xmlns:a16="http://schemas.microsoft.com/office/drawing/2014/main" id="{9AD91184-7105-E8E9-D7EF-6E91EFDD55F3}"/>
-              </a:ext>
-            </a:extLst>
-          </p:cNvPr>
-          <p:cNvSpPr txBox="1"/>
-          <p:nvPr/>
-        </p:nvSpPr>
-        <p:spPr>
-          <a:xfrm>
-            <a:off x="828065" y="2085963"/>
-            <a:ext cx="2846439" cy="369332"/>
-          </a:xfrm>
-          <a:prstGeom prst="rect">
-            <a:avLst/>
-          </a:prstGeom>
-          <a:noFill/>
-        </p:spPr>
-        <p:txBody>
-          <a:bodyPr wrap="square" rtlCol="0">
-            <a:spAutoFit/>
-          </a:bodyPr>
-          <a:lstStyle/>
-          <a:p>
-            <a:r>
-              <a:rPr lang="en-GB" dirty="0"/>
-              <a:t>SIMULATION CONTROLS</a:t>
-            </a:r>
-          </a:p>
-        </p:txBody>
-      </p:sp>
-    </p:spTree>
-    <p:extLst>
-      <p:ext uri="{BB962C8B-B14F-4D97-AF65-F5344CB8AC3E}">
-        <p14:creationId xmlns:p14="http://schemas.microsoft.com/office/powerpoint/2010/main" val="3369075426"/>
       </p:ext>
     </p:extLst>
   </p:cSld>

</xml_diff>

<commit_message>
the nacelle has been updated
yet to do
the coordinate reference and the NSWE has to be displayed
</commit_message>
<xml_diff>
--- a/New Microsoft PowerPoint Presentation.pptx
+++ b/New Microsoft PowerPoint Presentation.pptx
@@ -268,7 +268,7 @@
           <a:p>
             <a:fld id="{CC3F78A9-85ED-4B6C-98BF-75BF2C235F5D}" type="datetimeFigureOut">
               <a:rPr lang="en-GB" smtClean="0"/>
-              <a:t>09/10/2025</a:t>
+              <a:t>10/10/2025</a:t>
             </a:fld>
             <a:endParaRPr lang="en-GB"/>
           </a:p>
@@ -466,7 +466,7 @@
           <a:p>
             <a:fld id="{CC3F78A9-85ED-4B6C-98BF-75BF2C235F5D}" type="datetimeFigureOut">
               <a:rPr lang="en-GB" smtClean="0"/>
-              <a:t>09/10/2025</a:t>
+              <a:t>10/10/2025</a:t>
             </a:fld>
             <a:endParaRPr lang="en-GB"/>
           </a:p>
@@ -674,7 +674,7 @@
           <a:p>
             <a:fld id="{CC3F78A9-85ED-4B6C-98BF-75BF2C235F5D}" type="datetimeFigureOut">
               <a:rPr lang="en-GB" smtClean="0"/>
-              <a:t>09/10/2025</a:t>
+              <a:t>10/10/2025</a:t>
             </a:fld>
             <a:endParaRPr lang="en-GB"/>
           </a:p>
@@ -872,7 +872,7 @@
           <a:p>
             <a:fld id="{CC3F78A9-85ED-4B6C-98BF-75BF2C235F5D}" type="datetimeFigureOut">
               <a:rPr lang="en-GB" smtClean="0"/>
-              <a:t>09/10/2025</a:t>
+              <a:t>10/10/2025</a:t>
             </a:fld>
             <a:endParaRPr lang="en-GB"/>
           </a:p>
@@ -1147,7 +1147,7 @@
           <a:p>
             <a:fld id="{CC3F78A9-85ED-4B6C-98BF-75BF2C235F5D}" type="datetimeFigureOut">
               <a:rPr lang="en-GB" smtClean="0"/>
-              <a:t>09/10/2025</a:t>
+              <a:t>10/10/2025</a:t>
             </a:fld>
             <a:endParaRPr lang="en-GB"/>
           </a:p>
@@ -1412,7 +1412,7 @@
           <a:p>
             <a:fld id="{CC3F78A9-85ED-4B6C-98BF-75BF2C235F5D}" type="datetimeFigureOut">
               <a:rPr lang="en-GB" smtClean="0"/>
-              <a:t>09/10/2025</a:t>
+              <a:t>10/10/2025</a:t>
             </a:fld>
             <a:endParaRPr lang="en-GB"/>
           </a:p>
@@ -1824,7 +1824,7 @@
           <a:p>
             <a:fld id="{CC3F78A9-85ED-4B6C-98BF-75BF2C235F5D}" type="datetimeFigureOut">
               <a:rPr lang="en-GB" smtClean="0"/>
-              <a:t>09/10/2025</a:t>
+              <a:t>10/10/2025</a:t>
             </a:fld>
             <a:endParaRPr lang="en-GB"/>
           </a:p>
@@ -1965,7 +1965,7 @@
           <a:p>
             <a:fld id="{CC3F78A9-85ED-4B6C-98BF-75BF2C235F5D}" type="datetimeFigureOut">
               <a:rPr lang="en-GB" smtClean="0"/>
-              <a:t>09/10/2025</a:t>
+              <a:t>10/10/2025</a:t>
             </a:fld>
             <a:endParaRPr lang="en-GB"/>
           </a:p>
@@ -2078,7 +2078,7 @@
           <a:p>
             <a:fld id="{CC3F78A9-85ED-4B6C-98BF-75BF2C235F5D}" type="datetimeFigureOut">
               <a:rPr lang="en-GB" smtClean="0"/>
-              <a:t>09/10/2025</a:t>
+              <a:t>10/10/2025</a:t>
             </a:fld>
             <a:endParaRPr lang="en-GB"/>
           </a:p>
@@ -2389,7 +2389,7 @@
           <a:p>
             <a:fld id="{CC3F78A9-85ED-4B6C-98BF-75BF2C235F5D}" type="datetimeFigureOut">
               <a:rPr lang="en-GB" smtClean="0"/>
-              <a:t>09/10/2025</a:t>
+              <a:t>10/10/2025</a:t>
             </a:fld>
             <a:endParaRPr lang="en-GB"/>
           </a:p>
@@ -2677,7 +2677,7 @@
           <a:p>
             <a:fld id="{CC3F78A9-85ED-4B6C-98BF-75BF2C235F5D}" type="datetimeFigureOut">
               <a:rPr lang="en-GB" smtClean="0"/>
-              <a:t>09/10/2025</a:t>
+              <a:t>10/10/2025</a:t>
             </a:fld>
             <a:endParaRPr lang="en-GB"/>
           </a:p>
@@ -2918,7 +2918,7 @@
           <a:p>
             <a:fld id="{CC3F78A9-85ED-4B6C-98BF-75BF2C235F5D}" type="datetimeFigureOut">
               <a:rPr lang="en-GB" smtClean="0"/>
-              <a:t>09/10/2025</a:t>
+              <a:t>10/10/2025</a:t>
             </a:fld>
             <a:endParaRPr lang="en-GB"/>
           </a:p>
@@ -14305,6 +14305,185 @@
           </p:style>
         </p:cxnSp>
       </p:grpSp>
+      <p:pic>
+        <p:nvPicPr>
+          <p:cNvPr id="3" name="Picture 2">
+            <a:extLst>
+              <a:ext uri="{FF2B5EF4-FFF2-40B4-BE49-F238E27FC236}">
+                <a16:creationId xmlns:a16="http://schemas.microsoft.com/office/drawing/2014/main" id="{15F595D6-A3DB-0D8D-1AEA-1DFFD9D0428F}"/>
+              </a:ext>
+            </a:extLst>
+          </p:cNvPr>
+          <p:cNvPicPr>
+            <a:picLocks noChangeAspect="1"/>
+          </p:cNvPicPr>
+          <p:nvPr/>
+        </p:nvPicPr>
+        <p:blipFill>
+          <a:blip r:embed="rId3"/>
+          <a:stretch>
+            <a:fillRect/>
+          </a:stretch>
+        </p:blipFill>
+        <p:spPr>
+          <a:xfrm>
+            <a:off x="3871763" y="1580892"/>
+            <a:ext cx="3667637" cy="3696216"/>
+          </a:xfrm>
+          <a:prstGeom prst="rect">
+            <a:avLst/>
+          </a:prstGeom>
+        </p:spPr>
+      </p:pic>
+      <p:sp>
+        <p:nvSpPr>
+          <p:cNvPr id="4" name="Rectangle 3">
+            <a:extLst>
+              <a:ext uri="{FF2B5EF4-FFF2-40B4-BE49-F238E27FC236}">
+                <a16:creationId xmlns:a16="http://schemas.microsoft.com/office/drawing/2014/main" id="{B3AECF4C-B6E2-8627-12FB-24F8C894EE9A}"/>
+              </a:ext>
+            </a:extLst>
+          </p:cNvPr>
+          <p:cNvSpPr/>
+          <p:nvPr/>
+        </p:nvSpPr>
+        <p:spPr>
+          <a:xfrm flipH="1" flipV="1">
+            <a:off x="5648326" y="3309940"/>
+            <a:ext cx="85724" cy="180970"/>
+          </a:xfrm>
+          <a:prstGeom prst="rect">
+            <a:avLst/>
+          </a:prstGeom>
+          <a:solidFill>
+            <a:schemeClr val="bg2">
+              <a:lumMod val="25000"/>
+            </a:schemeClr>
+          </a:solidFill>
+          <a:ln>
+            <a:solidFill>
+              <a:schemeClr val="tx1">
+                <a:lumMod val="75000"/>
+                <a:lumOff val="25000"/>
+              </a:schemeClr>
+            </a:solidFill>
+          </a:ln>
+        </p:spPr>
+        <p:style>
+          <a:lnRef idx="2">
+            <a:schemeClr val="dk1">
+              <a:shade val="15000"/>
+            </a:schemeClr>
+          </a:lnRef>
+          <a:fillRef idx="1">
+            <a:schemeClr val="dk1"/>
+          </a:fillRef>
+          <a:effectRef idx="0">
+            <a:schemeClr val="dk1"/>
+          </a:effectRef>
+          <a:fontRef idx="minor">
+            <a:schemeClr val="lt1"/>
+          </a:fontRef>
+        </p:style>
+        <p:txBody>
+          <a:bodyPr rtlCol="0" anchor="ctr"/>
+          <a:lstStyle/>
+          <a:p>
+            <a:pPr algn="ctr"/>
+            <a:endParaRPr lang="en-GB"/>
+          </a:p>
+        </p:txBody>
+      </p:sp>
+      <p:sp>
+        <p:nvSpPr>
+          <p:cNvPr id="5" name="Oval 4">
+            <a:extLst>
+              <a:ext uri="{FF2B5EF4-FFF2-40B4-BE49-F238E27FC236}">
+                <a16:creationId xmlns:a16="http://schemas.microsoft.com/office/drawing/2014/main" id="{7A7A5A1F-652F-77DC-67DF-9D01E7A2AB48}"/>
+              </a:ext>
+            </a:extLst>
+          </p:cNvPr>
+          <p:cNvSpPr/>
+          <p:nvPr/>
+        </p:nvSpPr>
+        <p:spPr>
+          <a:xfrm>
+            <a:off x="5648326" y="4181475"/>
+            <a:ext cx="90488" cy="90488"/>
+          </a:xfrm>
+          <a:prstGeom prst="ellipse">
+            <a:avLst/>
+          </a:prstGeom>
+          <a:solidFill>
+            <a:srgbClr val="C00000"/>
+          </a:solidFill>
+        </p:spPr>
+        <p:style>
+          <a:lnRef idx="2">
+            <a:schemeClr val="accent1">
+              <a:shade val="15000"/>
+            </a:schemeClr>
+          </a:lnRef>
+          <a:fillRef idx="1">
+            <a:schemeClr val="accent1"/>
+          </a:fillRef>
+          <a:effectRef idx="0">
+            <a:schemeClr val="accent1"/>
+          </a:effectRef>
+          <a:fontRef idx="minor">
+            <a:schemeClr val="lt1"/>
+          </a:fontRef>
+        </p:style>
+        <p:txBody>
+          <a:bodyPr rtlCol="0" anchor="ctr"/>
+          <a:lstStyle/>
+          <a:p>
+            <a:pPr algn="ctr"/>
+            <a:endParaRPr lang="en-GB"/>
+          </a:p>
+        </p:txBody>
+      </p:sp>
+      <p:cxnSp>
+        <p:nvCxnSpPr>
+          <p:cNvPr id="8" name="Straight Arrow Connector 7">
+            <a:extLst>
+              <a:ext uri="{FF2B5EF4-FFF2-40B4-BE49-F238E27FC236}">
+                <a16:creationId xmlns:a16="http://schemas.microsoft.com/office/drawing/2014/main" id="{AF50B30A-F8BB-5F91-CD14-5F7C75411A8B}"/>
+              </a:ext>
+            </a:extLst>
+          </p:cNvPr>
+          <p:cNvCxnSpPr>
+            <a:cxnSpLocks/>
+          </p:cNvCxnSpPr>
+          <p:nvPr/>
+        </p:nvCxnSpPr>
+        <p:spPr>
+          <a:xfrm>
+            <a:off x="5691187" y="3533775"/>
+            <a:ext cx="11113" cy="269875"/>
+          </a:xfrm>
+          <a:prstGeom prst="straightConnector1">
+            <a:avLst/>
+          </a:prstGeom>
+          <a:ln>
+            <a:tailEnd type="triangle"/>
+          </a:ln>
+        </p:spPr>
+        <p:style>
+          <a:lnRef idx="2">
+            <a:schemeClr val="accent1"/>
+          </a:lnRef>
+          <a:fillRef idx="0">
+            <a:schemeClr val="accent1"/>
+          </a:fillRef>
+          <a:effectRef idx="1">
+            <a:schemeClr val="accent1"/>
+          </a:effectRef>
+          <a:fontRef idx="minor">
+            <a:schemeClr val="tx1"/>
+          </a:fontRef>
+        </p:style>
+      </p:cxnSp>
     </p:spTree>
     <p:extLst>
       <p:ext uri="{BB962C8B-B14F-4D97-AF65-F5344CB8AC3E}">

</xml_diff>

<commit_message>
removed the yaw invert toggle
changed the initial input card color to mild green

pixxon and gtmw logo to be placed on the banner
it was sampled in ms ppt
</commit_message>
<xml_diff>
--- a/New Microsoft PowerPoint Presentation.pptx
+++ b/New Microsoft PowerPoint Presentation.pptx
@@ -15,6 +15,7 @@
     <p:sldId id="263" r:id="rId9"/>
     <p:sldId id="261" r:id="rId10"/>
     <p:sldId id="262" r:id="rId11"/>
+    <p:sldId id="266" r:id="rId12"/>
   </p:sldIdLst>
   <p:sldSz cx="12192000" cy="6858000"/>
   <p:notesSz cx="6858000" cy="9144000"/>
@@ -268,7 +269,7 @@
           <a:p>
             <a:fld id="{CC3F78A9-85ED-4B6C-98BF-75BF2C235F5D}" type="datetimeFigureOut">
               <a:rPr lang="en-GB" smtClean="0"/>
-              <a:t>10/10/2025</a:t>
+              <a:t>13/10/2025</a:t>
             </a:fld>
             <a:endParaRPr lang="en-GB"/>
           </a:p>
@@ -466,7 +467,7 @@
           <a:p>
             <a:fld id="{CC3F78A9-85ED-4B6C-98BF-75BF2C235F5D}" type="datetimeFigureOut">
               <a:rPr lang="en-GB" smtClean="0"/>
-              <a:t>10/10/2025</a:t>
+              <a:t>13/10/2025</a:t>
             </a:fld>
             <a:endParaRPr lang="en-GB"/>
           </a:p>
@@ -674,7 +675,7 @@
           <a:p>
             <a:fld id="{CC3F78A9-85ED-4B6C-98BF-75BF2C235F5D}" type="datetimeFigureOut">
               <a:rPr lang="en-GB" smtClean="0"/>
-              <a:t>10/10/2025</a:t>
+              <a:t>13/10/2025</a:t>
             </a:fld>
             <a:endParaRPr lang="en-GB"/>
           </a:p>
@@ -872,7 +873,7 @@
           <a:p>
             <a:fld id="{CC3F78A9-85ED-4B6C-98BF-75BF2C235F5D}" type="datetimeFigureOut">
               <a:rPr lang="en-GB" smtClean="0"/>
-              <a:t>10/10/2025</a:t>
+              <a:t>13/10/2025</a:t>
             </a:fld>
             <a:endParaRPr lang="en-GB"/>
           </a:p>
@@ -1147,7 +1148,7 @@
           <a:p>
             <a:fld id="{CC3F78A9-85ED-4B6C-98BF-75BF2C235F5D}" type="datetimeFigureOut">
               <a:rPr lang="en-GB" smtClean="0"/>
-              <a:t>10/10/2025</a:t>
+              <a:t>13/10/2025</a:t>
             </a:fld>
             <a:endParaRPr lang="en-GB"/>
           </a:p>
@@ -1412,7 +1413,7 @@
           <a:p>
             <a:fld id="{CC3F78A9-85ED-4B6C-98BF-75BF2C235F5D}" type="datetimeFigureOut">
               <a:rPr lang="en-GB" smtClean="0"/>
-              <a:t>10/10/2025</a:t>
+              <a:t>13/10/2025</a:t>
             </a:fld>
             <a:endParaRPr lang="en-GB"/>
           </a:p>
@@ -1824,7 +1825,7 @@
           <a:p>
             <a:fld id="{CC3F78A9-85ED-4B6C-98BF-75BF2C235F5D}" type="datetimeFigureOut">
               <a:rPr lang="en-GB" smtClean="0"/>
-              <a:t>10/10/2025</a:t>
+              <a:t>13/10/2025</a:t>
             </a:fld>
             <a:endParaRPr lang="en-GB"/>
           </a:p>
@@ -1965,7 +1966,7 @@
           <a:p>
             <a:fld id="{CC3F78A9-85ED-4B6C-98BF-75BF2C235F5D}" type="datetimeFigureOut">
               <a:rPr lang="en-GB" smtClean="0"/>
-              <a:t>10/10/2025</a:t>
+              <a:t>13/10/2025</a:t>
             </a:fld>
             <a:endParaRPr lang="en-GB"/>
           </a:p>
@@ -2078,7 +2079,7 @@
           <a:p>
             <a:fld id="{CC3F78A9-85ED-4B6C-98BF-75BF2C235F5D}" type="datetimeFigureOut">
               <a:rPr lang="en-GB" smtClean="0"/>
-              <a:t>10/10/2025</a:t>
+              <a:t>13/10/2025</a:t>
             </a:fld>
             <a:endParaRPr lang="en-GB"/>
           </a:p>
@@ -2389,7 +2390,7 @@
           <a:p>
             <a:fld id="{CC3F78A9-85ED-4B6C-98BF-75BF2C235F5D}" type="datetimeFigureOut">
               <a:rPr lang="en-GB" smtClean="0"/>
-              <a:t>10/10/2025</a:t>
+              <a:t>13/10/2025</a:t>
             </a:fld>
             <a:endParaRPr lang="en-GB"/>
           </a:p>
@@ -2677,7 +2678,7 @@
           <a:p>
             <a:fld id="{CC3F78A9-85ED-4B6C-98BF-75BF2C235F5D}" type="datetimeFigureOut">
               <a:rPr lang="en-GB" smtClean="0"/>
-              <a:t>10/10/2025</a:t>
+              <a:t>13/10/2025</a:t>
             </a:fld>
             <a:endParaRPr lang="en-GB"/>
           </a:p>
@@ -2918,7 +2919,7 @@
           <a:p>
             <a:fld id="{CC3F78A9-85ED-4B6C-98BF-75BF2C235F5D}" type="datetimeFigureOut">
               <a:rPr lang="en-GB" smtClean="0"/>
-              <a:t>10/10/2025</a:t>
+              <a:t>13/10/2025</a:t>
             </a:fld>
             <a:endParaRPr lang="en-GB"/>
           </a:p>
@@ -4630,6 +4631,373 @@
     <p:extLst>
       <p:ext uri="{BB962C8B-B14F-4D97-AF65-F5344CB8AC3E}">
         <p14:creationId xmlns:p14="http://schemas.microsoft.com/office/powerpoint/2010/main" val="3369075426"/>
+      </p:ext>
+    </p:extLst>
+  </p:cSld>
+  <p:clrMapOvr>
+    <a:masterClrMapping/>
+  </p:clrMapOvr>
+</p:sld>
+</file>
+
+<file path=ppt/slides/slide11.xml><?xml version="1.0" encoding="utf-8"?>
+<p:sld xmlns:a="http://schemas.openxmlformats.org/drawingml/2006/main" xmlns:r="http://schemas.openxmlformats.org/officeDocument/2006/relationships" xmlns:p="http://schemas.openxmlformats.org/presentationml/2006/main">
+  <p:cSld>
+    <p:spTree>
+      <p:nvGrpSpPr>
+        <p:cNvPr id="1" name=""/>
+        <p:cNvGrpSpPr/>
+        <p:nvPr/>
+      </p:nvGrpSpPr>
+      <p:grpSpPr>
+        <a:xfrm>
+          <a:off x="0" y="0"/>
+          <a:ext cx="0" cy="0"/>
+          <a:chOff x="0" y="0"/>
+          <a:chExt cx="0" cy="0"/>
+        </a:xfrm>
+      </p:grpSpPr>
+      <p:pic>
+        <p:nvPicPr>
+          <p:cNvPr id="14" name="Picture 13">
+            <a:extLst>
+              <a:ext uri="{FF2B5EF4-FFF2-40B4-BE49-F238E27FC236}">
+                <a16:creationId xmlns:a16="http://schemas.microsoft.com/office/drawing/2014/main" id="{538BF61B-1CCE-1E8A-F957-3EEC02096F2E}"/>
+              </a:ext>
+            </a:extLst>
+          </p:cNvPr>
+          <p:cNvPicPr>
+            <a:picLocks noChangeAspect="1"/>
+          </p:cNvPicPr>
+          <p:nvPr/>
+        </p:nvPicPr>
+        <p:blipFill>
+          <a:blip r:embed="rId2"/>
+          <a:stretch>
+            <a:fillRect/>
+          </a:stretch>
+        </p:blipFill>
+        <p:spPr>
+          <a:xfrm>
+            <a:off x="0" y="1557274"/>
+            <a:ext cx="12192000" cy="558463"/>
+          </a:xfrm>
+          <a:prstGeom prst="rect">
+            <a:avLst/>
+          </a:prstGeom>
+        </p:spPr>
+      </p:pic>
+      <p:sp>
+        <p:nvSpPr>
+          <p:cNvPr id="10" name="Rectangle: Rounded Corners 9">
+            <a:extLst>
+              <a:ext uri="{FF2B5EF4-FFF2-40B4-BE49-F238E27FC236}">
+                <a16:creationId xmlns:a16="http://schemas.microsoft.com/office/drawing/2014/main" id="{7910BB2A-86DD-E854-D409-28E116BB8CD0}"/>
+              </a:ext>
+            </a:extLst>
+          </p:cNvPr>
+          <p:cNvSpPr/>
+          <p:nvPr/>
+        </p:nvSpPr>
+        <p:spPr>
+          <a:xfrm>
+            <a:off x="703006" y="383458"/>
+            <a:ext cx="10785987" cy="629265"/>
+          </a:xfrm>
+          <a:prstGeom prst="roundRect">
+            <a:avLst/>
+          </a:prstGeom>
+          <a:solidFill>
+            <a:schemeClr val="tx1">
+              <a:lumMod val="65000"/>
+              <a:lumOff val="35000"/>
+            </a:schemeClr>
+          </a:solidFill>
+        </p:spPr>
+        <p:style>
+          <a:lnRef idx="2">
+            <a:schemeClr val="dk1"/>
+          </a:lnRef>
+          <a:fillRef idx="1">
+            <a:schemeClr val="lt1"/>
+          </a:fillRef>
+          <a:effectRef idx="0">
+            <a:schemeClr val="dk1"/>
+          </a:effectRef>
+          <a:fontRef idx="minor">
+            <a:schemeClr val="dk1"/>
+          </a:fontRef>
+        </p:style>
+        <p:txBody>
+          <a:bodyPr rtlCol="0" anchor="ctr"/>
+          <a:lstStyle/>
+          <a:p>
+            <a:pPr algn="ctr"/>
+            <a:endParaRPr lang="en-GB"/>
+          </a:p>
+        </p:txBody>
+      </p:sp>
+      <p:pic>
+        <p:nvPicPr>
+          <p:cNvPr id="5" name="Picture 4" descr="A green text on a black background&#10;&#10;AI-generated content may be incorrect.">
+            <a:extLst>
+              <a:ext uri="{FF2B5EF4-FFF2-40B4-BE49-F238E27FC236}">
+                <a16:creationId xmlns:a16="http://schemas.microsoft.com/office/drawing/2014/main" id="{36E84CFA-356F-4226-CF14-07ED2F01788E}"/>
+              </a:ext>
+            </a:extLst>
+          </p:cNvPr>
+          <p:cNvPicPr>
+            <a:picLocks noChangeAspect="1"/>
+          </p:cNvPicPr>
+          <p:nvPr/>
+        </p:nvPicPr>
+        <p:blipFill>
+          <a:blip r:embed="rId3">
+            <a:extLst>
+              <a:ext uri="{28A0092B-C50C-407E-A947-70E740481C1C}">
+                <a14:useLocalDpi xmlns:a14="http://schemas.microsoft.com/office/drawing/2010/main" val="0"/>
+              </a:ext>
+            </a:extLst>
+          </a:blip>
+          <a:stretch>
+            <a:fillRect/>
+          </a:stretch>
+        </p:blipFill>
+        <p:spPr>
+          <a:xfrm>
+            <a:off x="7483236" y="524110"/>
+            <a:ext cx="1545264" cy="416274"/>
+          </a:xfrm>
+          <a:prstGeom prst="rect">
+            <a:avLst/>
+          </a:prstGeom>
+        </p:spPr>
+      </p:pic>
+      <p:pic>
+        <p:nvPicPr>
+          <p:cNvPr id="9" name="Picture 8" descr="A white text on a black background&#10;&#10;AI-generated content may be incorrect.">
+            <a:extLst>
+              <a:ext uri="{FF2B5EF4-FFF2-40B4-BE49-F238E27FC236}">
+                <a16:creationId xmlns:a16="http://schemas.microsoft.com/office/drawing/2014/main" id="{93136A99-AE53-A523-7E87-728C3EE6907A}"/>
+              </a:ext>
+            </a:extLst>
+          </p:cNvPr>
+          <p:cNvPicPr>
+            <a:picLocks noChangeAspect="1"/>
+          </p:cNvPicPr>
+          <p:nvPr/>
+        </p:nvPicPr>
+        <p:blipFill>
+          <a:blip r:embed="rId4">
+            <a:extLst>
+              <a:ext uri="{28A0092B-C50C-407E-A947-70E740481C1C}">
+                <a14:useLocalDpi xmlns:a14="http://schemas.microsoft.com/office/drawing/2010/main" val="0"/>
+              </a:ext>
+            </a:extLst>
+          </a:blip>
+          <a:stretch>
+            <a:fillRect/>
+          </a:stretch>
+        </p:blipFill>
+        <p:spPr>
+          <a:xfrm>
+            <a:off x="9469436" y="524110"/>
+            <a:ext cx="1719122" cy="341620"/>
+          </a:xfrm>
+          <a:prstGeom prst="rect">
+            <a:avLst/>
+          </a:prstGeom>
+        </p:spPr>
+      </p:pic>
+      <p:cxnSp>
+        <p:nvCxnSpPr>
+          <p:cNvPr id="12" name="Straight Connector 11">
+            <a:extLst>
+              <a:ext uri="{FF2B5EF4-FFF2-40B4-BE49-F238E27FC236}">
+                <a16:creationId xmlns:a16="http://schemas.microsoft.com/office/drawing/2014/main" id="{BAB92113-F9F6-7146-EC6D-6AD39204CE7E}"/>
+              </a:ext>
+            </a:extLst>
+          </p:cNvPr>
+          <p:cNvCxnSpPr/>
+          <p:nvPr/>
+        </p:nvCxnSpPr>
+        <p:spPr>
+          <a:xfrm>
+            <a:off x="9328935" y="562723"/>
+            <a:ext cx="0" cy="339047"/>
+          </a:xfrm>
+          <a:prstGeom prst="line">
+            <a:avLst/>
+          </a:prstGeom>
+          <a:ln/>
+        </p:spPr>
+        <p:style>
+          <a:lnRef idx="1">
+            <a:schemeClr val="dk1"/>
+          </a:lnRef>
+          <a:fillRef idx="0">
+            <a:schemeClr val="dk1"/>
+          </a:fillRef>
+          <a:effectRef idx="0">
+            <a:schemeClr val="dk1"/>
+          </a:effectRef>
+          <a:fontRef idx="minor">
+            <a:schemeClr val="tx1"/>
+          </a:fontRef>
+        </p:style>
+      </p:cxnSp>
+      <p:pic>
+        <p:nvPicPr>
+          <p:cNvPr id="15" name="Picture 14" descr="A green text on a black background&#10;&#10;AI-generated content may be incorrect.">
+            <a:extLst>
+              <a:ext uri="{FF2B5EF4-FFF2-40B4-BE49-F238E27FC236}">
+                <a16:creationId xmlns:a16="http://schemas.microsoft.com/office/drawing/2014/main" id="{77B697E4-3221-D227-A4B7-A644C223F08A}"/>
+              </a:ext>
+            </a:extLst>
+          </p:cNvPr>
+          <p:cNvPicPr>
+            <a:picLocks noChangeAspect="1"/>
+          </p:cNvPicPr>
+          <p:nvPr/>
+        </p:nvPicPr>
+        <p:blipFill>
+          <a:blip r:embed="rId3">
+            <a:extLst>
+              <a:ext uri="{28A0092B-C50C-407E-A947-70E740481C1C}">
+                <a14:useLocalDpi xmlns:a14="http://schemas.microsoft.com/office/drawing/2010/main" val="0"/>
+              </a:ext>
+            </a:extLst>
+          </a:blip>
+          <a:stretch>
+            <a:fillRect/>
+          </a:stretch>
+        </p:blipFill>
+        <p:spPr>
+          <a:xfrm>
+            <a:off x="8161330" y="1680564"/>
+            <a:ext cx="1545264" cy="416274"/>
+          </a:xfrm>
+          <a:prstGeom prst="rect">
+            <a:avLst/>
+          </a:prstGeom>
+        </p:spPr>
+      </p:pic>
+      <p:pic>
+        <p:nvPicPr>
+          <p:cNvPr id="16" name="Picture 15" descr="A white text on a black background&#10;&#10;AI-generated content may be incorrect.">
+            <a:extLst>
+              <a:ext uri="{FF2B5EF4-FFF2-40B4-BE49-F238E27FC236}">
+                <a16:creationId xmlns:a16="http://schemas.microsoft.com/office/drawing/2014/main" id="{AF5D3AF6-D695-58AA-0A6E-8C7C943C6F3C}"/>
+              </a:ext>
+            </a:extLst>
+          </p:cNvPr>
+          <p:cNvPicPr>
+            <a:picLocks noChangeAspect="1"/>
+          </p:cNvPicPr>
+          <p:nvPr/>
+        </p:nvPicPr>
+        <p:blipFill>
+          <a:blip r:embed="rId4">
+            <a:extLst>
+              <a:ext uri="{28A0092B-C50C-407E-A947-70E740481C1C}">
+                <a14:useLocalDpi xmlns:a14="http://schemas.microsoft.com/office/drawing/2010/main" val="0"/>
+              </a:ext>
+            </a:extLst>
+          </a:blip>
+          <a:stretch>
+            <a:fillRect/>
+          </a:stretch>
+        </p:blipFill>
+        <p:spPr>
+          <a:xfrm>
+            <a:off x="10147530" y="1680564"/>
+            <a:ext cx="1719122" cy="341620"/>
+          </a:xfrm>
+          <a:prstGeom prst="rect">
+            <a:avLst/>
+          </a:prstGeom>
+        </p:spPr>
+      </p:pic>
+      <p:cxnSp>
+        <p:nvCxnSpPr>
+          <p:cNvPr id="17" name="Straight Connector 16">
+            <a:extLst>
+              <a:ext uri="{FF2B5EF4-FFF2-40B4-BE49-F238E27FC236}">
+                <a16:creationId xmlns:a16="http://schemas.microsoft.com/office/drawing/2014/main" id="{FB924F1A-7B05-035C-DFE9-A44D26BE574B}"/>
+              </a:ext>
+            </a:extLst>
+          </p:cNvPr>
+          <p:cNvCxnSpPr/>
+          <p:nvPr/>
+        </p:nvCxnSpPr>
+        <p:spPr>
+          <a:xfrm>
+            <a:off x="10007029" y="1719177"/>
+            <a:ext cx="0" cy="339047"/>
+          </a:xfrm>
+          <a:prstGeom prst="line">
+            <a:avLst/>
+          </a:prstGeom>
+          <a:ln/>
+        </p:spPr>
+        <p:style>
+          <a:lnRef idx="1">
+            <a:schemeClr val="dk1"/>
+          </a:lnRef>
+          <a:fillRef idx="0">
+            <a:schemeClr val="dk1"/>
+          </a:fillRef>
+          <a:effectRef idx="0">
+            <a:schemeClr val="dk1"/>
+          </a:effectRef>
+          <a:fontRef idx="minor">
+            <a:schemeClr val="tx1"/>
+          </a:fontRef>
+        </p:style>
+      </p:cxnSp>
+      <p:sp>
+        <p:nvSpPr>
+          <p:cNvPr id="21" name="TextBox 20">
+            <a:extLst>
+              <a:ext uri="{FF2B5EF4-FFF2-40B4-BE49-F238E27FC236}">
+                <a16:creationId xmlns:a16="http://schemas.microsoft.com/office/drawing/2014/main" id="{504D2A5D-C459-D0EF-AB8D-C1CB53DD8892}"/>
+              </a:ext>
+            </a:extLst>
+          </p:cNvPr>
+          <p:cNvSpPr txBox="1"/>
+          <p:nvPr/>
+        </p:nvSpPr>
+        <p:spPr>
+          <a:xfrm>
+            <a:off x="716707" y="478719"/>
+            <a:ext cx="4726112" cy="461665"/>
+          </a:xfrm>
+          <a:prstGeom prst="rect">
+            <a:avLst/>
+          </a:prstGeom>
+          <a:noFill/>
+        </p:spPr>
+        <p:txBody>
+          <a:bodyPr wrap="square" rtlCol="0">
+            <a:spAutoFit/>
+          </a:bodyPr>
+          <a:lstStyle/>
+          <a:p>
+            <a:r>
+              <a:rPr lang="en-GB" sz="2400" b="1" dirty="0">
+                <a:solidFill>
+                  <a:schemeClr val="bg1"/>
+                </a:solidFill>
+              </a:rPr>
+              <a:t>BLINC-IM </a:t>
+            </a:r>
+          </a:p>
+        </p:txBody>
+      </p:sp>
+    </p:spTree>
+    <p:extLst>
+      <p:ext uri="{BB962C8B-B14F-4D97-AF65-F5344CB8AC3E}">
+        <p14:creationId xmlns:p14="http://schemas.microsoft.com/office/powerpoint/2010/main" val="484130612"/>
       </p:ext>
     </p:extLst>
   </p:cSld>

</xml_diff>